<commit_message>
-add more user APIs(4-11->4-21),update plan
</commit_message>
<xml_diff>
--- a/src/main/resources/AdminPagePlanning.pptx
+++ b/src/main/resources/AdminPagePlanning.pptx
@@ -12,27 +12,30 @@
     <p:sldId id="261" r:id="rId6"/>
     <p:sldId id="269" r:id="rId7"/>
     <p:sldId id="270" r:id="rId8"/>
-    <p:sldId id="267" r:id="rId9"/>
-    <p:sldId id="271" r:id="rId10"/>
-    <p:sldId id="272" r:id="rId11"/>
-    <p:sldId id="273" r:id="rId12"/>
-    <p:sldId id="274" r:id="rId13"/>
-    <p:sldId id="275" r:id="rId14"/>
-    <p:sldId id="276" r:id="rId15"/>
-    <p:sldId id="277" r:id="rId16"/>
-    <p:sldId id="278" r:id="rId17"/>
-    <p:sldId id="279" r:id="rId18"/>
-    <p:sldId id="280" r:id="rId19"/>
-    <p:sldId id="281" r:id="rId20"/>
-    <p:sldId id="282" r:id="rId21"/>
-    <p:sldId id="283" r:id="rId22"/>
-    <p:sldId id="284" r:id="rId23"/>
-    <p:sldId id="285" r:id="rId24"/>
-    <p:sldId id="286" r:id="rId25"/>
-    <p:sldId id="287" r:id="rId26"/>
-    <p:sldId id="262" r:id="rId27"/>
-    <p:sldId id="288" r:id="rId28"/>
-    <p:sldId id="265" r:id="rId29"/>
+    <p:sldId id="289" r:id="rId9"/>
+    <p:sldId id="290" r:id="rId10"/>
+    <p:sldId id="291" r:id="rId11"/>
+    <p:sldId id="267" r:id="rId12"/>
+    <p:sldId id="271" r:id="rId13"/>
+    <p:sldId id="272" r:id="rId14"/>
+    <p:sldId id="273" r:id="rId15"/>
+    <p:sldId id="274" r:id="rId16"/>
+    <p:sldId id="275" r:id="rId17"/>
+    <p:sldId id="276" r:id="rId18"/>
+    <p:sldId id="277" r:id="rId19"/>
+    <p:sldId id="278" r:id="rId20"/>
+    <p:sldId id="279" r:id="rId21"/>
+    <p:sldId id="280" r:id="rId22"/>
+    <p:sldId id="281" r:id="rId23"/>
+    <p:sldId id="282" r:id="rId24"/>
+    <p:sldId id="283" r:id="rId25"/>
+    <p:sldId id="284" r:id="rId26"/>
+    <p:sldId id="285" r:id="rId27"/>
+    <p:sldId id="286" r:id="rId28"/>
+    <p:sldId id="287" r:id="rId29"/>
+    <p:sldId id="262" r:id="rId30"/>
+    <p:sldId id="288" r:id="rId31"/>
+    <p:sldId id="265" r:id="rId32"/>
   </p:sldIdLst>
   <p:sldSz cx="12192000" cy="6858000"/>
   <p:notesSz cx="6858000" cy="9144000"/>
@@ -286,7 +289,7 @@
           <a:p>
             <a:fld id="{C4A0A3D2-7656-4698-8352-FFD8A684DBEE}" type="datetimeFigureOut">
               <a:rPr lang="en-US" smtClean="0"/>
-              <a:t>12/30/2024</a:t>
+              <a:t>1/3/2025</a:t>
             </a:fld>
             <a:endParaRPr lang="en-US"/>
           </a:p>
@@ -484,7 +487,7 @@
           <a:p>
             <a:fld id="{C4A0A3D2-7656-4698-8352-FFD8A684DBEE}" type="datetimeFigureOut">
               <a:rPr lang="en-US" smtClean="0"/>
-              <a:t>12/30/2024</a:t>
+              <a:t>1/3/2025</a:t>
             </a:fld>
             <a:endParaRPr lang="en-US"/>
           </a:p>
@@ -692,7 +695,7 @@
           <a:p>
             <a:fld id="{C4A0A3D2-7656-4698-8352-FFD8A684DBEE}" type="datetimeFigureOut">
               <a:rPr lang="en-US" smtClean="0"/>
-              <a:t>12/30/2024</a:t>
+              <a:t>1/3/2025</a:t>
             </a:fld>
             <a:endParaRPr lang="en-US"/>
           </a:p>
@@ -890,7 +893,7 @@
           <a:p>
             <a:fld id="{C4A0A3D2-7656-4698-8352-FFD8A684DBEE}" type="datetimeFigureOut">
               <a:rPr lang="en-US" smtClean="0"/>
-              <a:t>12/30/2024</a:t>
+              <a:t>1/3/2025</a:t>
             </a:fld>
             <a:endParaRPr lang="en-US"/>
           </a:p>
@@ -1165,7 +1168,7 @@
           <a:p>
             <a:fld id="{C4A0A3D2-7656-4698-8352-FFD8A684DBEE}" type="datetimeFigureOut">
               <a:rPr lang="en-US" smtClean="0"/>
-              <a:t>12/30/2024</a:t>
+              <a:t>1/3/2025</a:t>
             </a:fld>
             <a:endParaRPr lang="en-US"/>
           </a:p>
@@ -1430,7 +1433,7 @@
           <a:p>
             <a:fld id="{C4A0A3D2-7656-4698-8352-FFD8A684DBEE}" type="datetimeFigureOut">
               <a:rPr lang="en-US" smtClean="0"/>
-              <a:t>12/30/2024</a:t>
+              <a:t>1/3/2025</a:t>
             </a:fld>
             <a:endParaRPr lang="en-US"/>
           </a:p>
@@ -1842,7 +1845,7 @@
           <a:p>
             <a:fld id="{C4A0A3D2-7656-4698-8352-FFD8A684DBEE}" type="datetimeFigureOut">
               <a:rPr lang="en-US" smtClean="0"/>
-              <a:t>12/30/2024</a:t>
+              <a:t>1/3/2025</a:t>
             </a:fld>
             <a:endParaRPr lang="en-US"/>
           </a:p>
@@ -1983,7 +1986,7 @@
           <a:p>
             <a:fld id="{C4A0A3D2-7656-4698-8352-FFD8A684DBEE}" type="datetimeFigureOut">
               <a:rPr lang="en-US" smtClean="0"/>
-              <a:t>12/30/2024</a:t>
+              <a:t>1/3/2025</a:t>
             </a:fld>
             <a:endParaRPr lang="en-US"/>
           </a:p>
@@ -2096,7 +2099,7 @@
           <a:p>
             <a:fld id="{C4A0A3D2-7656-4698-8352-FFD8A684DBEE}" type="datetimeFigureOut">
               <a:rPr lang="en-US" smtClean="0"/>
-              <a:t>12/30/2024</a:t>
+              <a:t>1/3/2025</a:t>
             </a:fld>
             <a:endParaRPr lang="en-US"/>
           </a:p>
@@ -2407,7 +2410,7 @@
           <a:p>
             <a:fld id="{C4A0A3D2-7656-4698-8352-FFD8A684DBEE}" type="datetimeFigureOut">
               <a:rPr lang="en-US" smtClean="0"/>
-              <a:t>12/30/2024</a:t>
+              <a:t>1/3/2025</a:t>
             </a:fld>
             <a:endParaRPr lang="en-US"/>
           </a:p>
@@ -2695,7 +2698,7 @@
           <a:p>
             <a:fld id="{C4A0A3D2-7656-4698-8352-FFD8A684DBEE}" type="datetimeFigureOut">
               <a:rPr lang="en-US" smtClean="0"/>
-              <a:t>12/30/2024</a:t>
+              <a:t>1/3/2025</a:t>
             </a:fld>
             <a:endParaRPr lang="en-US"/>
           </a:p>
@@ -2936,7 +2939,7 @@
           <a:p>
             <a:fld id="{C4A0A3D2-7656-4698-8352-FFD8A684DBEE}" type="datetimeFigureOut">
               <a:rPr lang="en-US" smtClean="0"/>
-              <a:t>12/30/2024</a:t>
+              <a:t>1/3/2025</a:t>
             </a:fld>
             <a:endParaRPr lang="en-US"/>
           </a:p>
@@ -3452,6 +3455,325 @@
             <p:ph type="title"/>
           </p:nvPr>
         </p:nvSpPr>
+        <p:spPr>
+          <a:xfrm>
+            <a:off x="838200" y="0"/>
+            <a:ext cx="10515600" cy="1325563"/>
+          </a:xfrm>
+        </p:spPr>
+        <p:txBody>
+          <a:bodyPr>
+            <a:normAutofit/>
+          </a:bodyPr>
+          <a:lstStyle/>
+          <a:p>
+            <a:pPr algn="ctr"/>
+            <a:r>
+              <a:rPr lang="en-US" sz="4000" b="1"/>
+              <a:t>4- Build Membership Management APIs (Day 9-20)</a:t>
+            </a:r>
+            <a:br>
+              <a:rPr lang="en-US" sz="3200" b="1"/>
+            </a:br>
+            <a:endParaRPr lang="ko-KR" altLang="en-US" sz="3200" b="1" dirty="0"/>
+          </a:p>
+        </p:txBody>
+      </p:sp>
+      <p:graphicFrame>
+        <p:nvGraphicFramePr>
+          <p:cNvPr id="7" name="내용 개체 틀 6"/>
+          <p:cNvGraphicFramePr>
+            <a:graphicFrameLocks noGrp="1"/>
+          </p:cNvGraphicFramePr>
+          <p:nvPr>
+            <p:ph idx="1"/>
+            <p:extLst>
+              <p:ext uri="{D42A27DB-BD31-4B8C-83A1-F6EECF244321}">
+                <p14:modId xmlns:p14="http://schemas.microsoft.com/office/powerpoint/2010/main" val="1899981484"/>
+              </p:ext>
+            </p:extLst>
+          </p:nvPr>
+        </p:nvGraphicFramePr>
+        <p:xfrm>
+          <a:off x="838200" y="883920"/>
+          <a:ext cx="10515600" cy="5669280"/>
+        </p:xfrm>
+        <a:graphic>
+          <a:graphicData uri="http://schemas.openxmlformats.org/drawingml/2006/table">
+            <a:tbl>
+              <a:tblPr firstRow="1" bandRow="1">
+                <a:tableStyleId>{073A0DAA-6AF3-43AB-8588-CEC1D06C72B9}</a:tableStyleId>
+              </a:tblPr>
+              <a:tblGrid>
+                <a:gridCol w="6429375">
+                  <a:extLst>
+                    <a:ext uri="{9D8B030D-6E8A-4147-A177-3AD203B41FA5}">
+                      <a16:colId xmlns:a16="http://schemas.microsoft.com/office/drawing/2014/main" val="436794892"/>
+                    </a:ext>
+                  </a:extLst>
+                </a:gridCol>
+                <a:gridCol w="4086225">
+                  <a:extLst>
+                    <a:ext uri="{9D8B030D-6E8A-4147-A177-3AD203B41FA5}">
+                      <a16:colId xmlns:a16="http://schemas.microsoft.com/office/drawing/2014/main" val="2058214037"/>
+                    </a:ext>
+                  </a:extLst>
+                </a:gridCol>
+              </a:tblGrid>
+              <a:tr h="276225">
+                <a:tc>
+                  <a:txBody>
+                    <a:bodyPr/>
+                    <a:lstStyle/>
+                    <a:p>
+                      <a:pPr algn="ctr" latinLnBrk="1"/>
+                      <a:r>
+                        <a:rPr lang="ko-KR" altLang="en-US" dirty="0"/>
+                        <a:t>요소 </a:t>
+                      </a:r>
+                      <a:r>
+                        <a:rPr lang="en-US" altLang="ko-KR" dirty="0"/>
+                        <a:t>element</a:t>
+                      </a:r>
+                      <a:endParaRPr lang="ko-KR" altLang="en-US" dirty="0"/>
+                    </a:p>
+                  </a:txBody>
+                  <a:tcPr/>
+                </a:tc>
+                <a:tc>
+                  <a:txBody>
+                    <a:bodyPr/>
+                    <a:lstStyle/>
+                    <a:p>
+                      <a:pPr algn="ctr" latinLnBrk="1"/>
+                      <a:r>
+                        <a:rPr lang="ko-KR" altLang="en-US" dirty="0"/>
+                        <a:t>설명 </a:t>
+                      </a:r>
+                      <a:r>
+                        <a:rPr lang="en-US" altLang="ko-KR" dirty="0"/>
+                        <a:t>explanation</a:t>
+                      </a:r>
+                      <a:endParaRPr lang="ko-KR" altLang="en-US" dirty="0"/>
+                    </a:p>
+                  </a:txBody>
+                  <a:tcPr/>
+                </a:tc>
+                <a:extLst>
+                  <a:ext uri="{0D108BD9-81ED-4DB2-BD59-A6C34878D82A}">
+                    <a16:rowId xmlns:a16="http://schemas.microsoft.com/office/drawing/2014/main" val="3065501436"/>
+                  </a:ext>
+                </a:extLst>
+              </a:tr>
+              <a:tr h="4011659">
+                <a:tc>
+                  <a:txBody>
+                    <a:bodyPr/>
+                    <a:lstStyle/>
+                    <a:p>
+                      <a:pPr marL="457200" lvl="1" indent="0">
+                        <a:buFont typeface="Arial" panose="020B0604020202020204" pitchFamily="34" charset="0"/>
+                        <a:buNone/>
+                      </a:pPr>
+                      <a:endParaRPr lang="en-US" altLang="ko-KR" baseline="0"/>
+                    </a:p>
+                    <a:p>
+                      <a:pPr marL="742950" lvl="1" indent="-285750">
+                        <a:buFont typeface="Arial" panose="020B0604020202020204" pitchFamily="34" charset="0"/>
+                        <a:buChar char="•"/>
+                      </a:pPr>
+                      <a:r>
+                        <a:rPr lang="en-US"/>
+                        <a:t>4-17- /user/detail?section=launch&amp;user_id=2 (Game playlist)</a:t>
+                      </a:r>
+                    </a:p>
+                    <a:p>
+                      <a:pPr marL="742950" lvl="1" indent="-285750">
+                        <a:buFont typeface="Arial" panose="020B0604020202020204" pitchFamily="34" charset="0"/>
+                        <a:buChar char="•"/>
+                      </a:pPr>
+                      <a:endParaRPr lang="en-US"/>
+                    </a:p>
+                    <a:p>
+                      <a:pPr marL="742950" lvl="1" indent="-285750">
+                        <a:buFont typeface="Arial" panose="020B0604020202020204" pitchFamily="34" charset="0"/>
+                        <a:buChar char="•"/>
+                      </a:pPr>
+                      <a:r>
+                        <a:rPr lang="en-US"/>
+                        <a:t>4-18 - /user/detail?section=game&amp;user_id=2 (Game betting details)</a:t>
+                      </a:r>
+                    </a:p>
+                    <a:p>
+                      <a:pPr marL="742950" lvl="1" indent="-285750">
+                        <a:buFont typeface="Arial" panose="020B0604020202020204" pitchFamily="34" charset="0"/>
+                        <a:buChar char="•"/>
+                      </a:pPr>
+                      <a:endParaRPr lang="en-US"/>
+                    </a:p>
+                    <a:p>
+                      <a:pPr marL="742950" marR="0" lvl="1" indent="-285750" algn="l" defTabSz="914400" rtl="0" eaLnBrk="1" fontAlgn="auto" latinLnBrk="0" hangingPunct="1">
+                        <a:lnSpc>
+                          <a:spcPct val="100000"/>
+                        </a:lnSpc>
+                        <a:spcBef>
+                          <a:spcPts val="0"/>
+                        </a:spcBef>
+                        <a:spcAft>
+                          <a:spcPts val="0"/>
+                        </a:spcAft>
+                        <a:buClrTx/>
+                        <a:buSzTx/>
+                        <a:buFont typeface="Arial" panose="020B0604020202020204" pitchFamily="34" charset="0"/>
+                        <a:buChar char="•"/>
+                        <a:tabLst/>
+                        <a:defRPr/>
+                      </a:pPr>
+                      <a:r>
+                        <a:rPr lang="en-US" b="1"/>
+                        <a:t>4-19</a:t>
+                      </a:r>
+                      <a:r>
+                        <a:rPr lang="en-US"/>
+                        <a:t> - /user/detail?section=limitgame_play&amp;user_id=2 (Limited game betting details)</a:t>
+                      </a:r>
+                    </a:p>
+                    <a:p>
+                      <a:pPr marL="742950" lvl="1" indent="-285750">
+                        <a:buFont typeface="Arial" panose="020B0604020202020204" pitchFamily="34" charset="0"/>
+                        <a:buChar char="•"/>
+                      </a:pPr>
+                      <a:endParaRPr lang="en-US"/>
+                    </a:p>
+                    <a:p>
+                      <a:pPr marL="742950" lvl="1" indent="-285750">
+                        <a:buFont typeface="Arial" panose="020B0604020202020204" pitchFamily="34" charset="0"/>
+                        <a:buChar char="•"/>
+                      </a:pPr>
+                      <a:endParaRPr lang="en-US"/>
+                    </a:p>
+                    <a:p>
+                      <a:pPr marL="742950" lvl="1" indent="-285750">
+                        <a:buFont typeface="Arial" panose="020B0604020202020204" pitchFamily="34" charset="0"/>
+                        <a:buChar char="•"/>
+                      </a:pPr>
+                      <a:r>
+                        <a:rPr lang="en-US" b="1"/>
+                        <a:t>4-20- </a:t>
+                      </a:r>
+                      <a:r>
+                        <a:rPr lang="en-US"/>
+                        <a:t> /user/detail?section=pragmatic&amp;user_id=2 (pragmatic)</a:t>
+                      </a:r>
+                    </a:p>
+                    <a:p>
+                      <a:pPr marL="742950" lvl="1" indent="-285750">
+                        <a:buFont typeface="Arial" panose="020B0604020202020204" pitchFamily="34" charset="0"/>
+                        <a:buChar char="•"/>
+                      </a:pPr>
+                      <a:endParaRPr lang="en-US"/>
+                    </a:p>
+                    <a:p>
+                      <a:pPr marL="742950" lvl="1" indent="-285750">
+                        <a:buFont typeface="Arial" panose="020B0604020202020204" pitchFamily="34" charset="0"/>
+                        <a:buChar char="•"/>
+                      </a:pPr>
+                      <a:endParaRPr lang="en-US"/>
+                    </a:p>
+                    <a:p>
+                      <a:pPr marL="742950" lvl="1" indent="-285750">
+                        <a:buFont typeface="Arial" panose="020B0604020202020204" pitchFamily="34" charset="0"/>
+                        <a:buChar char="•"/>
+                      </a:pPr>
+                      <a:r>
+                        <a:rPr lang="en-US"/>
+                        <a:t>4-21- /user/detail?section=userloginfo&amp;user_id=2 (user login info)</a:t>
+                      </a:r>
+                    </a:p>
+                    <a:p>
+                      <a:pPr marL="0" indent="0" latinLnBrk="1">
+                        <a:buFontTx/>
+                        <a:buNone/>
+                      </a:pPr>
+                      <a:br>
+                        <a:rPr lang="en-US" altLang="ko-KR" baseline="0"/>
+                      </a:br>
+                      <a:endParaRPr lang="ko-KR" altLang="en-US" dirty="0"/>
+                    </a:p>
+                  </a:txBody>
+                  <a:tcPr/>
+                </a:tc>
+                <a:tc>
+                  <a:txBody>
+                    <a:bodyPr/>
+                    <a:lstStyle/>
+                    <a:p>
+                      <a:pPr marL="285750" indent="-285750" latinLnBrk="1">
+                        <a:buFontTx/>
+                        <a:buChar char="-"/>
+                      </a:pPr>
+                      <a:endParaRPr lang="en-US" altLang="ko-KR"/>
+                    </a:p>
+                    <a:p>
+                      <a:pPr marL="285750" indent="-285750" latinLnBrk="1">
+                        <a:buFontTx/>
+                        <a:buChar char="-"/>
+                      </a:pPr>
+                      <a:endParaRPr lang="en-US" altLang="ko-KR"/>
+                    </a:p>
+                  </a:txBody>
+                  <a:tcPr/>
+                </a:tc>
+                <a:extLst>
+                  <a:ext uri="{0D108BD9-81ED-4DB2-BD59-A6C34878D82A}">
+                    <a16:rowId xmlns:a16="http://schemas.microsoft.com/office/drawing/2014/main" val="1333542250"/>
+                  </a:ext>
+                </a:extLst>
+              </a:tr>
+            </a:tbl>
+          </a:graphicData>
+        </a:graphic>
+      </p:graphicFrame>
+    </p:spTree>
+    <p:extLst>
+      <p:ext uri="{BB962C8B-B14F-4D97-AF65-F5344CB8AC3E}">
+        <p14:creationId xmlns:p14="http://schemas.microsoft.com/office/powerpoint/2010/main" val="4260187901"/>
+      </p:ext>
+    </p:extLst>
+  </p:cSld>
+  <p:clrMapOvr>
+    <a:masterClrMapping/>
+  </p:clrMapOvr>
+</p:sld>
+</file>
+
+<file path=ppt/slides/slide11.xml><?xml version="1.0" encoding="utf-8"?>
+<p:sld xmlns:a="http://schemas.openxmlformats.org/drawingml/2006/main" xmlns:r="http://schemas.openxmlformats.org/officeDocument/2006/relationships" xmlns:p="http://schemas.openxmlformats.org/presentationml/2006/main">
+  <p:cSld>
+    <p:spTree>
+      <p:nvGrpSpPr>
+        <p:cNvPr id="1" name=""/>
+        <p:cNvGrpSpPr/>
+        <p:nvPr/>
+      </p:nvGrpSpPr>
+      <p:grpSpPr>
+        <a:xfrm>
+          <a:off x="0" y="0"/>
+          <a:ext cx="0" cy="0"/>
+          <a:chOff x="0" y="0"/>
+          <a:chExt cx="0" cy="0"/>
+        </a:xfrm>
+      </p:grpSpPr>
+      <p:sp>
+        <p:nvSpPr>
+          <p:cNvPr id="2" name="제목 1"/>
+          <p:cNvSpPr>
+            <a:spLocks noGrp="1"/>
+          </p:cNvSpPr>
+          <p:nvPr>
+            <p:ph type="title"/>
+          </p:nvPr>
+        </p:nvSpPr>
         <p:spPr/>
         <p:txBody>
           <a:bodyPr>
@@ -3462,7 +3784,628 @@
             <a:pPr algn="ctr"/>
             <a:r>
               <a:rPr lang="en-US" sz="4000" b="1"/>
-              <a:t>5- Build System APIs(Day 17-23)</a:t>
+              <a:t>5- Build System APIs(Day 21-30)</a:t>
+            </a:r>
+            <a:br>
+              <a:rPr lang="en-US" sz="3200" b="1"/>
+            </a:br>
+            <a:endParaRPr lang="ko-KR" altLang="en-US" sz="3200" b="1" dirty="0"/>
+          </a:p>
+        </p:txBody>
+      </p:sp>
+      <p:graphicFrame>
+        <p:nvGraphicFramePr>
+          <p:cNvPr id="7" name="내용 개체 틀 6"/>
+          <p:cNvGraphicFramePr>
+            <a:graphicFrameLocks noGrp="1"/>
+          </p:cNvGraphicFramePr>
+          <p:nvPr>
+            <p:ph idx="1"/>
+            <p:extLst>
+              <p:ext uri="{D42A27DB-BD31-4B8C-83A1-F6EECF244321}">
+                <p14:modId xmlns:p14="http://schemas.microsoft.com/office/powerpoint/2010/main" val="1872491719"/>
+              </p:ext>
+            </p:extLst>
+          </p:nvPr>
+        </p:nvGraphicFramePr>
+        <p:xfrm>
+          <a:off x="838200" y="1276350"/>
+          <a:ext cx="10515600" cy="5120640"/>
+        </p:xfrm>
+        <a:graphic>
+          <a:graphicData uri="http://schemas.openxmlformats.org/drawingml/2006/table">
+            <a:tbl>
+              <a:tblPr firstRow="1" bandRow="1">
+                <a:tableStyleId>{073A0DAA-6AF3-43AB-8588-CEC1D06C72B9}</a:tableStyleId>
+              </a:tblPr>
+              <a:tblGrid>
+                <a:gridCol w="6515100">
+                  <a:extLst>
+                    <a:ext uri="{9D8B030D-6E8A-4147-A177-3AD203B41FA5}">
+                      <a16:colId xmlns:a16="http://schemas.microsoft.com/office/drawing/2014/main" val="436794892"/>
+                    </a:ext>
+                  </a:extLst>
+                </a:gridCol>
+                <a:gridCol w="4000500">
+                  <a:extLst>
+                    <a:ext uri="{9D8B030D-6E8A-4147-A177-3AD203B41FA5}">
+                      <a16:colId xmlns:a16="http://schemas.microsoft.com/office/drawing/2014/main" val="2058214037"/>
+                    </a:ext>
+                  </a:extLst>
+                </a:gridCol>
+              </a:tblGrid>
+              <a:tr h="332353">
+                <a:tc>
+                  <a:txBody>
+                    <a:bodyPr/>
+                    <a:lstStyle/>
+                    <a:p>
+                      <a:pPr algn="ctr" latinLnBrk="1"/>
+                      <a:r>
+                        <a:rPr lang="ko-KR" altLang="en-US" dirty="0"/>
+                        <a:t>요소 </a:t>
+                      </a:r>
+                      <a:r>
+                        <a:rPr lang="en-US" altLang="ko-KR" dirty="0"/>
+                        <a:t>element</a:t>
+                      </a:r>
+                      <a:endParaRPr lang="ko-KR" altLang="en-US" dirty="0"/>
+                    </a:p>
+                  </a:txBody>
+                  <a:tcPr/>
+                </a:tc>
+                <a:tc>
+                  <a:txBody>
+                    <a:bodyPr/>
+                    <a:lstStyle/>
+                    <a:p>
+                      <a:pPr algn="ctr" latinLnBrk="1"/>
+                      <a:r>
+                        <a:rPr lang="ko-KR" altLang="en-US" dirty="0"/>
+                        <a:t>설명 </a:t>
+                      </a:r>
+                      <a:r>
+                        <a:rPr lang="en-US" altLang="ko-KR" dirty="0"/>
+                        <a:t>explanation</a:t>
+                      </a:r>
+                      <a:endParaRPr lang="ko-KR" altLang="en-US" dirty="0"/>
+                    </a:p>
+                  </a:txBody>
+                  <a:tcPr/>
+                </a:tc>
+                <a:extLst>
+                  <a:ext uri="{0D108BD9-81ED-4DB2-BD59-A6C34878D82A}">
+                    <a16:rowId xmlns:a16="http://schemas.microsoft.com/office/drawing/2014/main" val="3065501436"/>
+                  </a:ext>
+                </a:extLst>
+              </a:tr>
+              <a:tr h="4569847">
+                <a:tc>
+                  <a:txBody>
+                    <a:bodyPr/>
+                    <a:lstStyle/>
+                    <a:p>
+                      <a:endParaRPr lang="en-US" b="1"/>
+                    </a:p>
+                    <a:p>
+                      <a:endParaRPr lang="en-US" b="1"/>
+                    </a:p>
+                    <a:p>
+                      <a:endParaRPr lang="en-US" b="1"/>
+                    </a:p>
+                    <a:p>
+                      <a:pPr marL="742950" lvl="1" indent="-285750">
+                        <a:buFont typeface="Arial" panose="020B0604020202020204" pitchFamily="34" charset="0"/>
+                        <a:buChar char="•"/>
+                      </a:pPr>
+                      <a:r>
+                        <a:rPr lang="en-US" b="1"/>
+                        <a:t>5-1- /system/notice (Announcement)</a:t>
+                      </a:r>
+                    </a:p>
+                    <a:p>
+                      <a:pPr marL="742950" lvl="1" indent="-285750">
+                        <a:buFont typeface="Arial" panose="020B0604020202020204" pitchFamily="34" charset="0"/>
+                        <a:buChar char="•"/>
+                      </a:pPr>
+                      <a:endParaRPr lang="en-US"/>
+                    </a:p>
+                    <a:p>
+                      <a:pPr marL="742950" lvl="1" indent="-285750">
+                        <a:buFont typeface="Arial" panose="020B0604020202020204" pitchFamily="34" charset="0"/>
+                        <a:buChar char="•"/>
+                      </a:pPr>
+                      <a:r>
+                        <a:rPr lang="en-US" b="1"/>
+                        <a:t>5-2-</a:t>
+                      </a:r>
+                      <a:r>
+                        <a:rPr lang="en-US"/>
+                        <a:t> /system/bank (Set up deposit account)</a:t>
+                      </a:r>
+                    </a:p>
+                    <a:p>
+                      <a:pPr marL="742950" lvl="1" indent="-285750">
+                        <a:buFont typeface="Arial" panose="020B0604020202020204" pitchFamily="34" charset="0"/>
+                        <a:buChar char="•"/>
+                      </a:pPr>
+                      <a:endParaRPr lang="en-US"/>
+                    </a:p>
+                    <a:p>
+                      <a:pPr marL="742950" lvl="1" indent="-285750">
+                        <a:buFont typeface="Arial" panose="020B0604020202020204" pitchFamily="34" charset="0"/>
+                        <a:buChar char="•"/>
+                      </a:pPr>
+                      <a:r>
+                        <a:rPr lang="en-US"/>
+                        <a:t>5-3- /system/councel (1:1 inquiry (waiting))</a:t>
+                      </a:r>
+                    </a:p>
+                    <a:p>
+                      <a:pPr marL="742950" lvl="1" indent="-285750">
+                        <a:buFont typeface="Arial" panose="020B0604020202020204" pitchFamily="34" charset="0"/>
+                        <a:buChar char="•"/>
+                      </a:pPr>
+                      <a:endParaRPr lang="en-US"/>
+                    </a:p>
+                    <a:p>
+                      <a:pPr marL="742950" lvl="1" indent="-285750">
+                        <a:buFont typeface="Arial" panose="020B0604020202020204" pitchFamily="34" charset="0"/>
+                        <a:buChar char="•"/>
+                      </a:pPr>
+                      <a:r>
+                        <a:rPr lang="en-US"/>
+                        <a:t>5-4- /system/councel/all (1:1 inquiry (All))</a:t>
+                      </a:r>
+                    </a:p>
+                    <a:p>
+                      <a:pPr marL="742950" lvl="1" indent="-285750">
+                        <a:buFont typeface="Arial" panose="020B0604020202020204" pitchFamily="34" charset="0"/>
+                        <a:buChar char="•"/>
+                      </a:pPr>
+                      <a:endParaRPr lang="en-US"/>
+                    </a:p>
+                    <a:p>
+                      <a:pPr marL="742950" lvl="1" indent="-285750">
+                        <a:buFont typeface="Arial" panose="020B0604020202020204" pitchFamily="34" charset="0"/>
+                        <a:buChar char="•"/>
+                      </a:pPr>
+                      <a:r>
+                        <a:rPr lang="en-US"/>
+                        <a:t>5-5- /system/councel/macro (  1:1 macro management)</a:t>
+                      </a:r>
+                    </a:p>
+                    <a:p>
+                      <a:pPr marL="742950" lvl="1" indent="-285750">
+                        <a:buFont typeface="Arial" panose="020B0604020202020204" pitchFamily="34" charset="0"/>
+                        <a:buChar char="•"/>
+                      </a:pPr>
+                      <a:endParaRPr lang="en-US"/>
+                    </a:p>
+                    <a:p>
+                      <a:pPr marL="742950" lvl="1" indent="-285750">
+                        <a:buFont typeface="Arial" panose="020B0604020202020204" pitchFamily="34" charset="0"/>
+                        <a:buChar char="•"/>
+                      </a:pPr>
+                      <a:endParaRPr lang="en-US"/>
+                    </a:p>
+                    <a:p>
+                      <a:pPr lvl="1"/>
+                      <a:endParaRPr lang="en-US"/>
+                    </a:p>
+                    <a:p>
+                      <a:pPr marL="0" indent="0" latinLnBrk="1">
+                        <a:buFontTx/>
+                        <a:buNone/>
+                      </a:pPr>
+                      <a:br>
+                        <a:rPr lang="en-US" altLang="ko-KR" baseline="0"/>
+                      </a:br>
+                      <a:endParaRPr lang="ko-KR" altLang="en-US" dirty="0"/>
+                    </a:p>
+                  </a:txBody>
+                  <a:tcPr/>
+                </a:tc>
+                <a:tc>
+                  <a:txBody>
+                    <a:bodyPr/>
+                    <a:lstStyle/>
+                    <a:p>
+                      <a:pPr marL="285750" indent="-285750" latinLnBrk="1">
+                        <a:buFontTx/>
+                        <a:buChar char="-"/>
+                      </a:pPr>
+                      <a:endParaRPr lang="en-US" altLang="ko-KR"/>
+                    </a:p>
+                    <a:p>
+                      <a:pPr marL="285750" indent="-285750" latinLnBrk="1">
+                        <a:buFontTx/>
+                        <a:buChar char="-"/>
+                      </a:pPr>
+                      <a:endParaRPr lang="en-US" altLang="ko-KR"/>
+                    </a:p>
+                  </a:txBody>
+                  <a:tcPr/>
+                </a:tc>
+                <a:extLst>
+                  <a:ext uri="{0D108BD9-81ED-4DB2-BD59-A6C34878D82A}">
+                    <a16:rowId xmlns:a16="http://schemas.microsoft.com/office/drawing/2014/main" val="1333542250"/>
+                  </a:ext>
+                </a:extLst>
+              </a:tr>
+            </a:tbl>
+          </a:graphicData>
+        </a:graphic>
+      </p:graphicFrame>
+    </p:spTree>
+    <p:extLst>
+      <p:ext uri="{BB962C8B-B14F-4D97-AF65-F5344CB8AC3E}">
+        <p14:creationId xmlns:p14="http://schemas.microsoft.com/office/powerpoint/2010/main" val="2066070089"/>
+      </p:ext>
+    </p:extLst>
+  </p:cSld>
+  <p:clrMapOvr>
+    <a:masterClrMapping/>
+  </p:clrMapOvr>
+</p:sld>
+</file>
+
+<file path=ppt/slides/slide12.xml><?xml version="1.0" encoding="utf-8"?>
+<p:sld xmlns:a="http://schemas.openxmlformats.org/drawingml/2006/main" xmlns:r="http://schemas.openxmlformats.org/officeDocument/2006/relationships" xmlns:p="http://schemas.openxmlformats.org/presentationml/2006/main">
+  <p:cSld>
+    <p:spTree>
+      <p:nvGrpSpPr>
+        <p:cNvPr id="1" name=""/>
+        <p:cNvGrpSpPr/>
+        <p:nvPr/>
+      </p:nvGrpSpPr>
+      <p:grpSpPr>
+        <a:xfrm>
+          <a:off x="0" y="0"/>
+          <a:ext cx="0" cy="0"/>
+          <a:chOff x="0" y="0"/>
+          <a:chExt cx="0" cy="0"/>
+        </a:xfrm>
+      </p:grpSpPr>
+      <p:sp>
+        <p:nvSpPr>
+          <p:cNvPr id="2" name="제목 1"/>
+          <p:cNvSpPr>
+            <a:spLocks noGrp="1"/>
+          </p:cNvSpPr>
+          <p:nvPr>
+            <p:ph type="title"/>
+          </p:nvPr>
+        </p:nvSpPr>
+        <p:spPr/>
+        <p:txBody>
+          <a:bodyPr>
+            <a:normAutofit/>
+          </a:bodyPr>
+          <a:lstStyle/>
+          <a:p>
+            <a:pPr algn="ctr"/>
+            <a:r>
+              <a:rPr lang="en-US" sz="4000" b="1"/>
+              <a:t>5- Build System APIs(Day 21-30)</a:t>
+            </a:r>
+            <a:br>
+              <a:rPr lang="en-US" sz="3200" b="1"/>
+            </a:br>
+            <a:endParaRPr lang="ko-KR" altLang="en-US" sz="3200" b="1" dirty="0"/>
+          </a:p>
+        </p:txBody>
+      </p:sp>
+      <p:graphicFrame>
+        <p:nvGraphicFramePr>
+          <p:cNvPr id="7" name="내용 개체 틀 6"/>
+          <p:cNvGraphicFramePr>
+            <a:graphicFrameLocks noGrp="1"/>
+          </p:cNvGraphicFramePr>
+          <p:nvPr>
+            <p:ph idx="1"/>
+            <p:extLst>
+              <p:ext uri="{D42A27DB-BD31-4B8C-83A1-F6EECF244321}">
+                <p14:modId xmlns:p14="http://schemas.microsoft.com/office/powerpoint/2010/main" val="3827885710"/>
+              </p:ext>
+            </p:extLst>
+          </p:nvPr>
+        </p:nvGraphicFramePr>
+        <p:xfrm>
+          <a:off x="838200" y="1276350"/>
+          <a:ext cx="10515600" cy="5120640"/>
+        </p:xfrm>
+        <a:graphic>
+          <a:graphicData uri="http://schemas.openxmlformats.org/drawingml/2006/table">
+            <a:tbl>
+              <a:tblPr firstRow="1" bandRow="1">
+                <a:tableStyleId>{073A0DAA-6AF3-43AB-8588-CEC1D06C72B9}</a:tableStyleId>
+              </a:tblPr>
+              <a:tblGrid>
+                <a:gridCol w="6838950">
+                  <a:extLst>
+                    <a:ext uri="{9D8B030D-6E8A-4147-A177-3AD203B41FA5}">
+                      <a16:colId xmlns:a16="http://schemas.microsoft.com/office/drawing/2014/main" val="436794892"/>
+                    </a:ext>
+                  </a:extLst>
+                </a:gridCol>
+                <a:gridCol w="3676650">
+                  <a:extLst>
+                    <a:ext uri="{9D8B030D-6E8A-4147-A177-3AD203B41FA5}">
+                      <a16:colId xmlns:a16="http://schemas.microsoft.com/office/drawing/2014/main" val="2058214037"/>
+                    </a:ext>
+                  </a:extLst>
+                </a:gridCol>
+              </a:tblGrid>
+              <a:tr h="336777">
+                <a:tc>
+                  <a:txBody>
+                    <a:bodyPr/>
+                    <a:lstStyle/>
+                    <a:p>
+                      <a:pPr algn="ctr" latinLnBrk="1"/>
+                      <a:r>
+                        <a:rPr lang="ko-KR" altLang="en-US" dirty="0"/>
+                        <a:t>요소 </a:t>
+                      </a:r>
+                      <a:r>
+                        <a:rPr lang="en-US" altLang="ko-KR" dirty="0"/>
+                        <a:t>element</a:t>
+                      </a:r>
+                      <a:endParaRPr lang="ko-KR" altLang="en-US" dirty="0"/>
+                    </a:p>
+                  </a:txBody>
+                  <a:tcPr/>
+                </a:tc>
+                <a:tc>
+                  <a:txBody>
+                    <a:bodyPr/>
+                    <a:lstStyle/>
+                    <a:p>
+                      <a:pPr algn="ctr" latinLnBrk="1"/>
+                      <a:r>
+                        <a:rPr lang="ko-KR" altLang="en-US" dirty="0"/>
+                        <a:t>설명 </a:t>
+                      </a:r>
+                      <a:r>
+                        <a:rPr lang="en-US" altLang="ko-KR" dirty="0"/>
+                        <a:t>explanation</a:t>
+                      </a:r>
+                      <a:endParaRPr lang="ko-KR" altLang="en-US" dirty="0"/>
+                    </a:p>
+                  </a:txBody>
+                  <a:tcPr/>
+                </a:tc>
+                <a:extLst>
+                  <a:ext uri="{0D108BD9-81ED-4DB2-BD59-A6C34878D82A}">
+                    <a16:rowId xmlns:a16="http://schemas.microsoft.com/office/drawing/2014/main" val="3065501436"/>
+                  </a:ext>
+                </a:extLst>
+              </a:tr>
+              <a:tr h="4378098">
+                <a:tc>
+                  <a:txBody>
+                    <a:bodyPr/>
+                    <a:lstStyle/>
+                    <a:p>
+                      <a:endParaRPr lang="en-US" b="1"/>
+                    </a:p>
+                    <a:p>
+                      <a:endParaRPr lang="en-US" b="1"/>
+                    </a:p>
+                    <a:p>
+                      <a:pPr marL="742950" lvl="1" indent="-285750">
+                        <a:buFont typeface="Arial" panose="020B0604020202020204" pitchFamily="34" charset="0"/>
+                        <a:buChar char="•"/>
+                      </a:pPr>
+                      <a:r>
+                        <a:rPr lang="en-US"/>
+                        <a:t>5-6- /system/account ( List of bank account changes)</a:t>
+                      </a:r>
+                    </a:p>
+                    <a:p>
+                      <a:pPr marL="742950" lvl="1" indent="-285750">
+                        <a:buFont typeface="Arial" panose="020B0604020202020204" pitchFamily="34" charset="0"/>
+                        <a:buChar char="•"/>
+                      </a:pPr>
+                      <a:endParaRPr lang="en-US"/>
+                    </a:p>
+                    <a:p>
+                      <a:pPr marL="742950" lvl="1" indent="-285750">
+                        <a:buFont typeface="Arial" panose="020B0604020202020204" pitchFamily="34" charset="0"/>
+                        <a:buChar char="•"/>
+                      </a:pPr>
+                      <a:endParaRPr lang="en-US"/>
+                    </a:p>
+                    <a:p>
+                      <a:pPr marL="742950" lvl="1" indent="-285750">
+                        <a:buFont typeface="Arial" panose="020B0604020202020204" pitchFamily="34" charset="0"/>
+                        <a:buChar char="•"/>
+                      </a:pPr>
+                      <a:r>
+                        <a:rPr lang="en-US" b="1"/>
+                        <a:t>5-7-</a:t>
+                      </a:r>
+                      <a:r>
+                        <a:rPr lang="en-US"/>
+                        <a:t> </a:t>
+                      </a:r>
+                      <a:r>
+                        <a:rPr lang="sv-SE"/>
+                        <a:t>/system/ip (IP block list)</a:t>
+                      </a:r>
+                    </a:p>
+                    <a:p>
+                      <a:pPr marL="742950" lvl="1" indent="-285750">
+                        <a:buFont typeface="Arial" panose="020B0604020202020204" pitchFamily="34" charset="0"/>
+                        <a:buChar char="•"/>
+                      </a:pPr>
+                      <a:endParaRPr lang="en-US"/>
+                    </a:p>
+                    <a:p>
+                      <a:pPr marL="742950" lvl="1" indent="-285750">
+                        <a:buFont typeface="Arial" panose="020B0604020202020204" pitchFamily="34" charset="0"/>
+                        <a:buChar char="•"/>
+                      </a:pPr>
+                      <a:endParaRPr lang="en-US"/>
+                    </a:p>
+                    <a:p>
+                      <a:pPr marL="742950" lvl="1" indent="-285750">
+                        <a:buFont typeface="Arial" panose="020B0604020202020204" pitchFamily="34" charset="0"/>
+                        <a:buChar char="•"/>
+                      </a:pPr>
+                      <a:r>
+                        <a:rPr lang="en-US"/>
+                        <a:t>5-8- /system/block (Blocked members and partners)</a:t>
+                      </a:r>
+                    </a:p>
+                    <a:p>
+                      <a:pPr marL="742950" lvl="1" indent="-285750">
+                        <a:buFont typeface="Arial" panose="020B0604020202020204" pitchFamily="34" charset="0"/>
+                        <a:buChar char="•"/>
+                      </a:pPr>
+                      <a:endParaRPr lang="en-US"/>
+                    </a:p>
+                    <a:p>
+                      <a:pPr marL="742950" lvl="1" indent="-285750">
+                        <a:buFont typeface="Arial" panose="020B0604020202020204" pitchFamily="34" charset="0"/>
+                        <a:buChar char="•"/>
+                      </a:pPr>
+                      <a:endParaRPr lang="en-US"/>
+                    </a:p>
+                    <a:p>
+                      <a:pPr marL="742950" lvl="1" indent="-285750">
+                        <a:buFont typeface="Arial" panose="020B0604020202020204" pitchFamily="34" charset="0"/>
+                        <a:buChar char="•"/>
+                      </a:pPr>
+                      <a:r>
+                        <a:rPr lang="en-US"/>
+                        <a:t>5-9- </a:t>
+                      </a:r>
+                      <a:r>
+                        <a:rPr lang="en-US" b="1"/>
+                        <a:t>/system/councel/all (1:1 inquiry (All))</a:t>
+                      </a:r>
+                    </a:p>
+                    <a:p>
+                      <a:pPr marL="742950" lvl="1" indent="-285750">
+                        <a:buFont typeface="Arial" panose="020B0604020202020204" pitchFamily="34" charset="0"/>
+                        <a:buChar char="•"/>
+                      </a:pPr>
+                      <a:endParaRPr lang="en-US"/>
+                    </a:p>
+                    <a:p>
+                      <a:pPr marL="742950" lvl="1" indent="-285750">
+                        <a:buFont typeface="Arial" panose="020B0604020202020204" pitchFamily="34" charset="0"/>
+                        <a:buChar char="•"/>
+                      </a:pPr>
+                      <a:endParaRPr lang="en-US"/>
+                    </a:p>
+                    <a:p>
+                      <a:pPr marL="742950" lvl="1" indent="-285750">
+                        <a:buFont typeface="Arial" panose="020B0604020202020204" pitchFamily="34" charset="0"/>
+                        <a:buChar char="•"/>
+                      </a:pPr>
+                      <a:r>
+                        <a:rPr lang="en-US"/>
+                        <a:t>5-10- /system/limit_provider (game company restrictions)</a:t>
+                      </a:r>
+                    </a:p>
+                    <a:p>
+                      <a:pPr marL="0" indent="0" latinLnBrk="1">
+                        <a:buFontTx/>
+                        <a:buNone/>
+                      </a:pPr>
+                      <a:br>
+                        <a:rPr lang="en-US" altLang="ko-KR" baseline="0"/>
+                      </a:br>
+                      <a:endParaRPr lang="ko-KR" altLang="en-US" dirty="0"/>
+                    </a:p>
+                  </a:txBody>
+                  <a:tcPr/>
+                </a:tc>
+                <a:tc>
+                  <a:txBody>
+                    <a:bodyPr/>
+                    <a:lstStyle/>
+                    <a:p>
+                      <a:pPr marL="285750" indent="-285750" latinLnBrk="1">
+                        <a:buFontTx/>
+                        <a:buChar char="-"/>
+                      </a:pPr>
+                      <a:endParaRPr lang="en-US" altLang="ko-KR"/>
+                    </a:p>
+                    <a:p>
+                      <a:pPr marL="285750" indent="-285750" latinLnBrk="1">
+                        <a:buFontTx/>
+                        <a:buChar char="-"/>
+                      </a:pPr>
+                      <a:endParaRPr lang="en-US" altLang="ko-KR"/>
+                    </a:p>
+                  </a:txBody>
+                  <a:tcPr/>
+                </a:tc>
+                <a:extLst>
+                  <a:ext uri="{0D108BD9-81ED-4DB2-BD59-A6C34878D82A}">
+                    <a16:rowId xmlns:a16="http://schemas.microsoft.com/office/drawing/2014/main" val="1333542250"/>
+                  </a:ext>
+                </a:extLst>
+              </a:tr>
+            </a:tbl>
+          </a:graphicData>
+        </a:graphic>
+      </p:graphicFrame>
+    </p:spTree>
+    <p:extLst>
+      <p:ext uri="{BB962C8B-B14F-4D97-AF65-F5344CB8AC3E}">
+        <p14:creationId xmlns:p14="http://schemas.microsoft.com/office/powerpoint/2010/main" val="1790297973"/>
+      </p:ext>
+    </p:extLst>
+  </p:cSld>
+  <p:clrMapOvr>
+    <a:masterClrMapping/>
+  </p:clrMapOvr>
+</p:sld>
+</file>
+
+<file path=ppt/slides/slide13.xml><?xml version="1.0" encoding="utf-8"?>
+<p:sld xmlns:a="http://schemas.openxmlformats.org/drawingml/2006/main" xmlns:r="http://schemas.openxmlformats.org/officeDocument/2006/relationships" xmlns:p="http://schemas.openxmlformats.org/presentationml/2006/main">
+  <p:cSld>
+    <p:spTree>
+      <p:nvGrpSpPr>
+        <p:cNvPr id="1" name=""/>
+        <p:cNvGrpSpPr/>
+        <p:nvPr/>
+      </p:nvGrpSpPr>
+      <p:grpSpPr>
+        <a:xfrm>
+          <a:off x="0" y="0"/>
+          <a:ext cx="0" cy="0"/>
+          <a:chOff x="0" y="0"/>
+          <a:chExt cx="0" cy="0"/>
+        </a:xfrm>
+      </p:grpSpPr>
+      <p:sp>
+        <p:nvSpPr>
+          <p:cNvPr id="2" name="제목 1"/>
+          <p:cNvSpPr>
+            <a:spLocks noGrp="1"/>
+          </p:cNvSpPr>
+          <p:nvPr>
+            <p:ph type="title"/>
+          </p:nvPr>
+        </p:nvSpPr>
+        <p:spPr/>
+        <p:txBody>
+          <a:bodyPr>
+            <a:normAutofit/>
+          </a:bodyPr>
+          <a:lstStyle/>
+          <a:p>
+            <a:pPr algn="ctr"/>
+            <a:r>
+              <a:rPr lang="en-US" sz="4000" b="1"/>
+              <a:t>5- Build System APIs(Day 21-30)</a:t>
             </a:r>
             <a:br>
               <a:rPr lang="en-US" sz="3200" b="1"/>
@@ -3713,7 +4656,7 @@
 </p:sld>
 </file>
 
-<file path=ppt/slides/slide11.xml><?xml version="1.0" encoding="utf-8"?>
+<file path=ppt/slides/slide14.xml><?xml version="1.0" encoding="utf-8"?>
 <p:sld xmlns:a="http://schemas.openxmlformats.org/drawingml/2006/main" xmlns:r="http://schemas.openxmlformats.org/officeDocument/2006/relationships" xmlns:p="http://schemas.openxmlformats.org/presentationml/2006/main">
   <p:cSld>
     <p:spTree>
@@ -3750,7 +4693,7 @@
             <a:pPr algn="ctr"/>
             <a:r>
               <a:rPr lang="en-US" sz="4000" b="1"/>
-              <a:t>6-Build Pre Recharging APIs(Day 24-31)</a:t>
+              <a:t>6-Build Pre Recharging APIs(Day 31-40)</a:t>
             </a:r>
             <a:br>
               <a:rPr lang="en-US" sz="3200" b="1"/>
@@ -3989,7 +4932,7 @@
 </p:sld>
 </file>
 
-<file path=ppt/slides/slide12.xml><?xml version="1.0" encoding="utf-8"?>
+<file path=ppt/slides/slide15.xml><?xml version="1.0" encoding="utf-8"?>
 <p:sld xmlns:a="http://schemas.openxmlformats.org/drawingml/2006/main" xmlns:r="http://schemas.openxmlformats.org/officeDocument/2006/relationships" xmlns:p="http://schemas.openxmlformats.org/presentationml/2006/main">
   <p:cSld>
     <p:spTree>
@@ -4026,7 +4969,7 @@
             <a:pPr algn="ctr"/>
             <a:r>
               <a:rPr lang="en-US" sz="4000" b="1"/>
-              <a:t>6-Build Pre Recharging APIs(Day 24-31)</a:t>
+              <a:t>6-Build Pre Recharging APIs(Day 31-40)</a:t>
             </a:r>
             <a:br>
               <a:rPr lang="en-US" sz="3200" b="1"/>
@@ -4249,7 +5192,7 @@
 </p:sld>
 </file>
 
-<file path=ppt/slides/slide13.xml><?xml version="1.0" encoding="utf-8"?>
+<file path=ppt/slides/slide16.xml><?xml version="1.0" encoding="utf-8"?>
 <p:sld xmlns:a="http://schemas.openxmlformats.org/drawingml/2006/main" xmlns:r="http://schemas.openxmlformats.org/officeDocument/2006/relationships" xmlns:p="http://schemas.openxmlformats.org/presentationml/2006/main">
   <p:cSld>
     <p:spTree>
@@ -4286,7 +5229,7 @@
             <a:pPr algn="ctr"/>
             <a:r>
               <a:rPr lang="en-US" sz="4000" b="1"/>
-              <a:t>7-Build Partner Management APIs(Day 32-39)</a:t>
+              <a:t>7-Build Partner Management APIs(Day 31-40)</a:t>
             </a:r>
             <a:br>
               <a:rPr lang="en-US" sz="3200" b="1"/>
@@ -4546,7 +5489,7 @@
 </p:sld>
 </file>
 
-<file path=ppt/slides/slide14.xml><?xml version="1.0" encoding="utf-8"?>
+<file path=ppt/slides/slide17.xml><?xml version="1.0" encoding="utf-8"?>
 <p:sld xmlns:a="http://schemas.openxmlformats.org/drawingml/2006/main" xmlns:r="http://schemas.openxmlformats.org/officeDocument/2006/relationships" xmlns:p="http://schemas.openxmlformats.org/presentationml/2006/main">
   <p:cSld>
     <p:spTree>
@@ -4583,7 +5526,7 @@
             <a:pPr algn="ctr"/>
             <a:r>
               <a:rPr lang="en-US" sz="4000" b="1"/>
-              <a:t>7-Build Partner Management APIs(Day 32-39)</a:t>
+              <a:t>7-Build Partner Management APIs(Day 41-50)</a:t>
             </a:r>
             <a:br>
               <a:rPr lang="en-US" sz="3200" b="1"/>
@@ -4809,7 +5752,7 @@
 </p:sld>
 </file>
 
-<file path=ppt/slides/slide15.xml><?xml version="1.0" encoding="utf-8"?>
+<file path=ppt/slides/slide18.xml><?xml version="1.0" encoding="utf-8"?>
 <p:sld xmlns:a="http://schemas.openxmlformats.org/drawingml/2006/main" xmlns:r="http://schemas.openxmlformats.org/officeDocument/2006/relationships" xmlns:p="http://schemas.openxmlformats.org/presentationml/2006/main">
   <p:cSld>
     <p:spTree>
@@ -4846,7 +5789,7 @@
             <a:pPr algn="ctr"/>
             <a:r>
               <a:rPr lang="en-US" sz="4000" b="1"/>
-              <a:t>7-Build Partner Management APIs(Day 32-39)</a:t>
+              <a:t>7-Build Partner Management APIs(Day 41-50)</a:t>
             </a:r>
             <a:br>
               <a:rPr lang="en-US" sz="3200" b="1"/>
@@ -5068,7 +6011,7 @@
 </p:sld>
 </file>
 
-<file path=ppt/slides/slide16.xml><?xml version="1.0" encoding="utf-8"?>
+<file path=ppt/slides/slide19.xml><?xml version="1.0" encoding="utf-8"?>
 <p:sld xmlns:a="http://schemas.openxmlformats.org/drawingml/2006/main" xmlns:r="http://schemas.openxmlformats.org/officeDocument/2006/relationships" xmlns:p="http://schemas.openxmlformats.org/presentationml/2006/main">
   <p:cSld>
     <p:spTree>
@@ -5105,7 +6048,7 @@
             <a:pPr algn="ctr"/>
             <a:r>
               <a:rPr lang="en-US" sz="4000" b="1"/>
-              <a:t>7-Build Partner Management APIs(Day 32-39)</a:t>
+              <a:t>7-Build Partner Management APIs(Day 41-50)</a:t>
             </a:r>
             <a:br>
               <a:rPr lang="en-US" sz="3200" b="1"/>
@@ -5318,832 +6261,6 @@
     <p:extLst>
       <p:ext uri="{BB962C8B-B14F-4D97-AF65-F5344CB8AC3E}">
         <p14:creationId xmlns:p14="http://schemas.microsoft.com/office/powerpoint/2010/main" val="3584444667"/>
-      </p:ext>
-    </p:extLst>
-  </p:cSld>
-  <p:clrMapOvr>
-    <a:masterClrMapping/>
-  </p:clrMapOvr>
-</p:sld>
-</file>
-
-<file path=ppt/slides/slide17.xml><?xml version="1.0" encoding="utf-8"?>
-<p:sld xmlns:a="http://schemas.openxmlformats.org/drawingml/2006/main" xmlns:r="http://schemas.openxmlformats.org/officeDocument/2006/relationships" xmlns:p="http://schemas.openxmlformats.org/presentationml/2006/main">
-  <p:cSld>
-    <p:spTree>
-      <p:nvGrpSpPr>
-        <p:cNvPr id="1" name=""/>
-        <p:cNvGrpSpPr/>
-        <p:nvPr/>
-      </p:nvGrpSpPr>
-      <p:grpSpPr>
-        <a:xfrm>
-          <a:off x="0" y="0"/>
-          <a:ext cx="0" cy="0"/>
-          <a:chOff x="0" y="0"/>
-          <a:chExt cx="0" cy="0"/>
-        </a:xfrm>
-      </p:grpSpPr>
-      <p:sp>
-        <p:nvSpPr>
-          <p:cNvPr id="2" name="제목 1"/>
-          <p:cNvSpPr>
-            <a:spLocks noGrp="1"/>
-          </p:cNvSpPr>
-          <p:nvPr>
-            <p:ph type="title"/>
-          </p:nvPr>
-        </p:nvSpPr>
-        <p:spPr/>
-        <p:txBody>
-          <a:bodyPr>
-            <a:normAutofit/>
-          </a:bodyPr>
-          <a:lstStyle/>
-          <a:p>
-            <a:pPr algn="ctr"/>
-            <a:r>
-              <a:rPr lang="en-US" sz="4000" b="1"/>
-              <a:t>8-Build Betting &amp; Rolling APIs(Day 40-47)</a:t>
-            </a:r>
-            <a:br>
-              <a:rPr lang="en-US" sz="3200" b="1"/>
-            </a:br>
-            <a:endParaRPr lang="ko-KR" altLang="en-US" sz="3200" b="1" dirty="0"/>
-          </a:p>
-        </p:txBody>
-      </p:sp>
-      <p:graphicFrame>
-        <p:nvGraphicFramePr>
-          <p:cNvPr id="7" name="내용 개체 틀 6"/>
-          <p:cNvGraphicFramePr>
-            <a:graphicFrameLocks noGrp="1"/>
-          </p:cNvGraphicFramePr>
-          <p:nvPr>
-            <p:ph idx="1"/>
-            <p:extLst>
-              <p:ext uri="{D42A27DB-BD31-4B8C-83A1-F6EECF244321}">
-                <p14:modId xmlns:p14="http://schemas.microsoft.com/office/powerpoint/2010/main" val="3934616726"/>
-              </p:ext>
-            </p:extLst>
-          </p:nvPr>
-        </p:nvGraphicFramePr>
-        <p:xfrm>
-          <a:off x="838200" y="1276350"/>
-          <a:ext cx="10515600" cy="4743858"/>
-        </p:xfrm>
-        <a:graphic>
-          <a:graphicData uri="http://schemas.openxmlformats.org/drawingml/2006/table">
-            <a:tbl>
-              <a:tblPr firstRow="1" bandRow="1">
-                <a:tableStyleId>{073A0DAA-6AF3-43AB-8588-CEC1D06C72B9}</a:tableStyleId>
-              </a:tblPr>
-              <a:tblGrid>
-                <a:gridCol w="7820025">
-                  <a:extLst>
-                    <a:ext uri="{9D8B030D-6E8A-4147-A177-3AD203B41FA5}">
-                      <a16:colId xmlns:a16="http://schemas.microsoft.com/office/drawing/2014/main" val="436794892"/>
-                    </a:ext>
-                  </a:extLst>
-                </a:gridCol>
-                <a:gridCol w="2695575">
-                  <a:extLst>
-                    <a:ext uri="{9D8B030D-6E8A-4147-A177-3AD203B41FA5}">
-                      <a16:colId xmlns:a16="http://schemas.microsoft.com/office/drawing/2014/main" val="2058214037"/>
-                    </a:ext>
-                  </a:extLst>
-                </a:gridCol>
-              </a:tblGrid>
-              <a:tr h="336777">
-                <a:tc>
-                  <a:txBody>
-                    <a:bodyPr/>
-                    <a:lstStyle/>
-                    <a:p>
-                      <a:pPr algn="ctr" latinLnBrk="1"/>
-                      <a:r>
-                        <a:rPr lang="ko-KR" altLang="en-US" dirty="0"/>
-                        <a:t>요소 </a:t>
-                      </a:r>
-                      <a:r>
-                        <a:rPr lang="en-US" altLang="ko-KR" dirty="0"/>
-                        <a:t>element</a:t>
-                      </a:r>
-                      <a:endParaRPr lang="ko-KR" altLang="en-US" dirty="0"/>
-                    </a:p>
-                  </a:txBody>
-                  <a:tcPr/>
-                </a:tc>
-                <a:tc>
-                  <a:txBody>
-                    <a:bodyPr/>
-                    <a:lstStyle/>
-                    <a:p>
-                      <a:pPr algn="ctr" latinLnBrk="1"/>
-                      <a:r>
-                        <a:rPr lang="ko-KR" altLang="en-US" dirty="0"/>
-                        <a:t>설명 </a:t>
-                      </a:r>
-                      <a:r>
-                        <a:rPr lang="en-US" altLang="ko-KR" dirty="0"/>
-                        <a:t>explanation</a:t>
-                      </a:r>
-                      <a:endParaRPr lang="ko-KR" altLang="en-US" dirty="0"/>
-                    </a:p>
-                  </a:txBody>
-                  <a:tcPr/>
-                </a:tc>
-                <a:extLst>
-                  <a:ext uri="{0D108BD9-81ED-4DB2-BD59-A6C34878D82A}">
-                    <a16:rowId xmlns:a16="http://schemas.microsoft.com/office/drawing/2014/main" val="3065501436"/>
-                  </a:ext>
-                </a:extLst>
-              </a:tr>
-              <a:tr h="4378098">
-                <a:tc>
-                  <a:txBody>
-                    <a:bodyPr/>
-                    <a:lstStyle/>
-                    <a:p>
-                      <a:endParaRPr lang="en-US" b="1"/>
-                    </a:p>
-                    <a:p>
-                      <a:endParaRPr lang="en-US" b="1"/>
-                    </a:p>
-                    <a:p>
-                      <a:pPr marL="742950" lvl="1" indent="-285750">
-                        <a:buFont typeface="Arial" panose="020B0604020202020204" pitchFamily="34" charset="0"/>
-                        <a:buChar char="•"/>
-                      </a:pPr>
-                      <a:r>
-                        <a:rPr lang="en-US"/>
-                        <a:t>8-1- /betting/slot/lists (betting status -Slots)</a:t>
-                      </a:r>
-                    </a:p>
-                    <a:p>
-                      <a:pPr marL="742950" lvl="1" indent="-285750">
-                        <a:buFont typeface="Arial" panose="020B0604020202020204" pitchFamily="34" charset="0"/>
-                        <a:buChar char="•"/>
-                      </a:pPr>
-                      <a:endParaRPr lang="en-US"/>
-                    </a:p>
-                    <a:p>
-                      <a:pPr marL="742950" lvl="1" indent="-285750">
-                        <a:buFont typeface="Arial" panose="020B0604020202020204" pitchFamily="34" charset="0"/>
-                        <a:buChar char="•"/>
-                      </a:pPr>
-                      <a:endParaRPr lang="en-US"/>
-                    </a:p>
-                    <a:p>
-                      <a:pPr marL="742950" lvl="1" indent="-285750">
-                        <a:buFont typeface="Arial" panose="020B0604020202020204" pitchFamily="34" charset="0"/>
-                        <a:buChar char="•"/>
-                      </a:pPr>
-                      <a:r>
-                        <a:rPr lang="en-US" b="1"/>
-                        <a:t>8-2-</a:t>
-                      </a:r>
-                      <a:r>
-                        <a:rPr lang="en-US"/>
-                        <a:t> /betting/casino/lists (betting status -Casino)</a:t>
-                      </a:r>
-                    </a:p>
-                    <a:p>
-                      <a:pPr marL="742950" lvl="1" indent="-285750">
-                        <a:buFont typeface="Arial" panose="020B0604020202020204" pitchFamily="34" charset="0"/>
-                        <a:buChar char="•"/>
-                      </a:pPr>
-                      <a:endParaRPr lang="en-US"/>
-                    </a:p>
-                    <a:p>
-                      <a:pPr marL="742950" lvl="1" indent="-285750">
-                        <a:buFont typeface="Arial" panose="020B0604020202020204" pitchFamily="34" charset="0"/>
-                        <a:buChar char="•"/>
-                      </a:pPr>
-                      <a:endParaRPr lang="en-US"/>
-                    </a:p>
-                    <a:p>
-                      <a:pPr marL="742950" lvl="1" indent="-285750">
-                        <a:buFont typeface="Arial" panose="020B0604020202020204" pitchFamily="34" charset="0"/>
-                        <a:buChar char="•"/>
-                      </a:pPr>
-                      <a:r>
-                        <a:rPr lang="en-US"/>
-                        <a:t>8-3- /betting/loss (Loss Adjustment (Sleep))</a:t>
-                      </a:r>
-                    </a:p>
-                    <a:p>
-                      <a:pPr marL="742950" lvl="1" indent="-285750">
-                        <a:buFont typeface="Arial" panose="020B0604020202020204" pitchFamily="34" charset="0"/>
-                        <a:buChar char="•"/>
-                      </a:pPr>
-                      <a:endParaRPr lang="en-US"/>
-                    </a:p>
-                    <a:p>
-                      <a:pPr marL="742950" lvl="1" indent="-285750">
-                        <a:buFont typeface="Arial" panose="020B0604020202020204" pitchFamily="34" charset="0"/>
-                        <a:buChar char="•"/>
-                      </a:pPr>
-                      <a:endParaRPr lang="en-US"/>
-                    </a:p>
-                    <a:p>
-                      <a:pPr marL="742950" lvl="1" indent="-285750">
-                        <a:buFont typeface="Arial" panose="020B0604020202020204" pitchFamily="34" charset="0"/>
-                        <a:buChar char="•"/>
-                      </a:pPr>
-                      <a:r>
-                        <a:rPr lang="en-US"/>
-                        <a:t>8-4- </a:t>
-                      </a:r>
-                      <a:r>
-                        <a:rPr lang="en-US" b="0"/>
-                        <a:t>/betting/lossr (loss recovery)</a:t>
-                      </a:r>
-                    </a:p>
-                    <a:p>
-                      <a:pPr marL="742950" lvl="1" indent="-285750">
-                        <a:buFont typeface="Arial" panose="020B0604020202020204" pitchFamily="34" charset="0"/>
-                        <a:buChar char="•"/>
-                      </a:pPr>
-                      <a:endParaRPr lang="en-US" b="0"/>
-                    </a:p>
-                  </a:txBody>
-                  <a:tcPr/>
-                </a:tc>
-                <a:tc>
-                  <a:txBody>
-                    <a:bodyPr/>
-                    <a:lstStyle/>
-                    <a:p>
-                      <a:pPr marL="285750" indent="-285750" latinLnBrk="1">
-                        <a:buFontTx/>
-                        <a:buChar char="-"/>
-                      </a:pPr>
-                      <a:endParaRPr lang="en-US" altLang="ko-KR"/>
-                    </a:p>
-                    <a:p>
-                      <a:pPr marL="285750" indent="-285750" latinLnBrk="1">
-                        <a:buFontTx/>
-                        <a:buChar char="-"/>
-                      </a:pPr>
-                      <a:endParaRPr lang="en-US" altLang="ko-KR"/>
-                    </a:p>
-                  </a:txBody>
-                  <a:tcPr/>
-                </a:tc>
-                <a:extLst>
-                  <a:ext uri="{0D108BD9-81ED-4DB2-BD59-A6C34878D82A}">
-                    <a16:rowId xmlns:a16="http://schemas.microsoft.com/office/drawing/2014/main" val="1333542250"/>
-                  </a:ext>
-                </a:extLst>
-              </a:tr>
-            </a:tbl>
-          </a:graphicData>
-        </a:graphic>
-      </p:graphicFrame>
-    </p:spTree>
-    <p:extLst>
-      <p:ext uri="{BB962C8B-B14F-4D97-AF65-F5344CB8AC3E}">
-        <p14:creationId xmlns:p14="http://schemas.microsoft.com/office/powerpoint/2010/main" val="2297010901"/>
-      </p:ext>
-    </p:extLst>
-  </p:cSld>
-  <p:clrMapOvr>
-    <a:masterClrMapping/>
-  </p:clrMapOvr>
-</p:sld>
-</file>
-
-<file path=ppt/slides/slide18.xml><?xml version="1.0" encoding="utf-8"?>
-<p:sld xmlns:a="http://schemas.openxmlformats.org/drawingml/2006/main" xmlns:r="http://schemas.openxmlformats.org/officeDocument/2006/relationships" xmlns:p="http://schemas.openxmlformats.org/presentationml/2006/main">
-  <p:cSld>
-    <p:spTree>
-      <p:nvGrpSpPr>
-        <p:cNvPr id="1" name=""/>
-        <p:cNvGrpSpPr/>
-        <p:nvPr/>
-      </p:nvGrpSpPr>
-      <p:grpSpPr>
-        <a:xfrm>
-          <a:off x="0" y="0"/>
-          <a:ext cx="0" cy="0"/>
-          <a:chOff x="0" y="0"/>
-          <a:chExt cx="0" cy="0"/>
-        </a:xfrm>
-      </p:grpSpPr>
-      <p:sp>
-        <p:nvSpPr>
-          <p:cNvPr id="2" name="제목 1"/>
-          <p:cNvSpPr>
-            <a:spLocks noGrp="1"/>
-          </p:cNvSpPr>
-          <p:nvPr>
-            <p:ph type="title"/>
-          </p:nvPr>
-        </p:nvSpPr>
-        <p:spPr/>
-        <p:txBody>
-          <a:bodyPr>
-            <a:normAutofit/>
-          </a:bodyPr>
-          <a:lstStyle/>
-          <a:p>
-            <a:pPr algn="ctr"/>
-            <a:r>
-              <a:rPr lang="en-US" sz="4000" b="1"/>
-              <a:t>8-Build Betting &amp; Rolling APIs(Day 40-47)</a:t>
-            </a:r>
-            <a:br>
-              <a:rPr lang="en-US" sz="3200" b="1"/>
-            </a:br>
-            <a:endParaRPr lang="ko-KR" altLang="en-US" sz="3200" b="1" dirty="0"/>
-          </a:p>
-        </p:txBody>
-      </p:sp>
-      <p:graphicFrame>
-        <p:nvGraphicFramePr>
-          <p:cNvPr id="7" name="내용 개체 틀 6"/>
-          <p:cNvGraphicFramePr>
-            <a:graphicFrameLocks noGrp="1"/>
-          </p:cNvGraphicFramePr>
-          <p:nvPr>
-            <p:ph idx="1"/>
-            <p:extLst>
-              <p:ext uri="{D42A27DB-BD31-4B8C-83A1-F6EECF244321}">
-                <p14:modId xmlns:p14="http://schemas.microsoft.com/office/powerpoint/2010/main" val="4229664590"/>
-              </p:ext>
-            </p:extLst>
-          </p:nvPr>
-        </p:nvGraphicFramePr>
-        <p:xfrm>
-          <a:off x="838200" y="1276350"/>
-          <a:ext cx="10515600" cy="4743858"/>
-        </p:xfrm>
-        <a:graphic>
-          <a:graphicData uri="http://schemas.openxmlformats.org/drawingml/2006/table">
-            <a:tbl>
-              <a:tblPr firstRow="1" bandRow="1">
-                <a:tableStyleId>{073A0DAA-6AF3-43AB-8588-CEC1D06C72B9}</a:tableStyleId>
-              </a:tblPr>
-              <a:tblGrid>
-                <a:gridCol w="7820025">
-                  <a:extLst>
-                    <a:ext uri="{9D8B030D-6E8A-4147-A177-3AD203B41FA5}">
-                      <a16:colId xmlns:a16="http://schemas.microsoft.com/office/drawing/2014/main" val="436794892"/>
-                    </a:ext>
-                  </a:extLst>
-                </a:gridCol>
-                <a:gridCol w="2695575">
-                  <a:extLst>
-                    <a:ext uri="{9D8B030D-6E8A-4147-A177-3AD203B41FA5}">
-                      <a16:colId xmlns:a16="http://schemas.microsoft.com/office/drawing/2014/main" val="2058214037"/>
-                    </a:ext>
-                  </a:extLst>
-                </a:gridCol>
-              </a:tblGrid>
-              <a:tr h="336777">
-                <a:tc>
-                  <a:txBody>
-                    <a:bodyPr/>
-                    <a:lstStyle/>
-                    <a:p>
-                      <a:pPr algn="ctr" latinLnBrk="1"/>
-                      <a:r>
-                        <a:rPr lang="ko-KR" altLang="en-US" dirty="0"/>
-                        <a:t>요소 </a:t>
-                      </a:r>
-                      <a:r>
-                        <a:rPr lang="en-US" altLang="ko-KR" dirty="0"/>
-                        <a:t>element</a:t>
-                      </a:r>
-                      <a:endParaRPr lang="ko-KR" altLang="en-US" dirty="0"/>
-                    </a:p>
-                  </a:txBody>
-                  <a:tcPr/>
-                </a:tc>
-                <a:tc>
-                  <a:txBody>
-                    <a:bodyPr/>
-                    <a:lstStyle/>
-                    <a:p>
-                      <a:pPr algn="ctr" latinLnBrk="1"/>
-                      <a:r>
-                        <a:rPr lang="ko-KR" altLang="en-US" dirty="0"/>
-                        <a:t>설명 </a:t>
-                      </a:r>
-                      <a:r>
-                        <a:rPr lang="en-US" altLang="ko-KR" dirty="0"/>
-                        <a:t>explanation</a:t>
-                      </a:r>
-                      <a:endParaRPr lang="ko-KR" altLang="en-US" dirty="0"/>
-                    </a:p>
-                  </a:txBody>
-                  <a:tcPr/>
-                </a:tc>
-                <a:extLst>
-                  <a:ext uri="{0D108BD9-81ED-4DB2-BD59-A6C34878D82A}">
-                    <a16:rowId xmlns:a16="http://schemas.microsoft.com/office/drawing/2014/main" val="3065501436"/>
-                  </a:ext>
-                </a:extLst>
-              </a:tr>
-              <a:tr h="4378098">
-                <a:tc>
-                  <a:txBody>
-                    <a:bodyPr/>
-                    <a:lstStyle/>
-                    <a:p>
-                      <a:endParaRPr lang="en-US" b="1"/>
-                    </a:p>
-                    <a:p>
-                      <a:endParaRPr lang="en-US" b="1"/>
-                    </a:p>
-                    <a:p>
-                      <a:pPr marL="742950" lvl="1" indent="-285750">
-                        <a:buFont typeface="Arial" panose="020B0604020202020204" pitchFamily="34" charset="0"/>
-                        <a:buChar char="•"/>
-                      </a:pPr>
-                      <a:r>
-                        <a:rPr lang="en-US"/>
-                        <a:t>8-5- /betting/limitgameplay/limitgameplay_list(Limited game betting status)</a:t>
-                      </a:r>
-                    </a:p>
-                    <a:p>
-                      <a:pPr marL="742950" lvl="1" indent="-285750">
-                        <a:buFont typeface="Arial" panose="020B0604020202020204" pitchFamily="34" charset="0"/>
-                        <a:buChar char="•"/>
-                      </a:pPr>
-                      <a:endParaRPr lang="en-US"/>
-                    </a:p>
-                    <a:p>
-                      <a:pPr marL="742950" lvl="1" indent="-285750">
-                        <a:buFont typeface="Arial" panose="020B0604020202020204" pitchFamily="34" charset="0"/>
-                        <a:buChar char="•"/>
-                      </a:pPr>
-                      <a:r>
-                        <a:rPr lang="en-US" b="1"/>
-                        <a:t>8-6-</a:t>
-                      </a:r>
-                      <a:r>
-                        <a:rPr lang="en-US"/>
-                        <a:t> /betting/quickslot/quicklists (Quick Bet Status (Slots))</a:t>
-                      </a:r>
-                    </a:p>
-                    <a:p>
-                      <a:pPr marL="742950" lvl="1" indent="-285750">
-                        <a:buFont typeface="Arial" panose="020B0604020202020204" pitchFamily="34" charset="0"/>
-                        <a:buChar char="•"/>
-                      </a:pPr>
-                      <a:endParaRPr lang="en-US"/>
-                    </a:p>
-                    <a:p>
-                      <a:pPr marL="742950" lvl="1" indent="-285750">
-                        <a:buFont typeface="Arial" panose="020B0604020202020204" pitchFamily="34" charset="0"/>
-                        <a:buChar char="•"/>
-                      </a:pPr>
-                      <a:endParaRPr lang="en-US"/>
-                    </a:p>
-                    <a:p>
-                      <a:pPr marL="742950" lvl="1" indent="-285750">
-                        <a:buFont typeface="Arial" panose="020B0604020202020204" pitchFamily="34" charset="0"/>
-                        <a:buChar char="•"/>
-                      </a:pPr>
-                      <a:r>
-                        <a:rPr lang="en-US"/>
-                        <a:t>8-7- /betting/quickcasino/quicklists( Quick Betting Status (Casino))</a:t>
-                      </a:r>
-                    </a:p>
-                    <a:p>
-                      <a:pPr marL="742950" lvl="1" indent="-285750">
-                        <a:buFont typeface="Arial" panose="020B0604020202020204" pitchFamily="34" charset="0"/>
-                        <a:buChar char="•"/>
-                      </a:pPr>
-                      <a:endParaRPr lang="en-US"/>
-                    </a:p>
-                    <a:p>
-                      <a:pPr marL="742950" lvl="1" indent="-285750">
-                        <a:buFont typeface="Arial" panose="020B0604020202020204" pitchFamily="34" charset="0"/>
-                        <a:buChar char="•"/>
-                      </a:pPr>
-                      <a:endParaRPr lang="en-US"/>
-                    </a:p>
-                    <a:p>
-                      <a:pPr marL="742950" lvl="1" indent="-285750">
-                        <a:buFont typeface="Arial" panose="020B0604020202020204" pitchFamily="34" charset="0"/>
-                        <a:buChar char="•"/>
-                      </a:pPr>
-                      <a:r>
-                        <a:rPr lang="en-US"/>
-                        <a:t>8-8- </a:t>
-                      </a:r>
-                      <a:r>
-                        <a:rPr lang="en-US" b="0"/>
-                        <a:t>/betting/quickall/quicklists Quick Betting Status (SL+KA)</a:t>
-                      </a:r>
-                    </a:p>
-                    <a:p>
-                      <a:pPr marL="742950" lvl="1" indent="-285750">
-                        <a:buFont typeface="Arial" panose="020B0604020202020204" pitchFamily="34" charset="0"/>
-                        <a:buChar char="•"/>
-                      </a:pPr>
-                      <a:endParaRPr lang="en-US" b="0"/>
-                    </a:p>
-                  </a:txBody>
-                  <a:tcPr/>
-                </a:tc>
-                <a:tc>
-                  <a:txBody>
-                    <a:bodyPr/>
-                    <a:lstStyle/>
-                    <a:p>
-                      <a:pPr marL="285750" indent="-285750" latinLnBrk="1">
-                        <a:buFontTx/>
-                        <a:buChar char="-"/>
-                      </a:pPr>
-                      <a:endParaRPr lang="en-US" altLang="ko-KR"/>
-                    </a:p>
-                    <a:p>
-                      <a:pPr marL="285750" indent="-285750" latinLnBrk="1">
-                        <a:buFontTx/>
-                        <a:buChar char="-"/>
-                      </a:pPr>
-                      <a:endParaRPr lang="en-US" altLang="ko-KR"/>
-                    </a:p>
-                  </a:txBody>
-                  <a:tcPr/>
-                </a:tc>
-                <a:extLst>
-                  <a:ext uri="{0D108BD9-81ED-4DB2-BD59-A6C34878D82A}">
-                    <a16:rowId xmlns:a16="http://schemas.microsoft.com/office/drawing/2014/main" val="1333542250"/>
-                  </a:ext>
-                </a:extLst>
-              </a:tr>
-            </a:tbl>
-          </a:graphicData>
-        </a:graphic>
-      </p:graphicFrame>
-    </p:spTree>
-    <p:extLst>
-      <p:ext uri="{BB962C8B-B14F-4D97-AF65-F5344CB8AC3E}">
-        <p14:creationId xmlns:p14="http://schemas.microsoft.com/office/powerpoint/2010/main" val="2134913886"/>
-      </p:ext>
-    </p:extLst>
-  </p:cSld>
-  <p:clrMapOvr>
-    <a:masterClrMapping/>
-  </p:clrMapOvr>
-</p:sld>
-</file>
-
-<file path=ppt/slides/slide19.xml><?xml version="1.0" encoding="utf-8"?>
-<p:sld xmlns:a="http://schemas.openxmlformats.org/drawingml/2006/main" xmlns:r="http://schemas.openxmlformats.org/officeDocument/2006/relationships" xmlns:p="http://schemas.openxmlformats.org/presentationml/2006/main">
-  <p:cSld>
-    <p:spTree>
-      <p:nvGrpSpPr>
-        <p:cNvPr id="1" name=""/>
-        <p:cNvGrpSpPr/>
-        <p:nvPr/>
-      </p:nvGrpSpPr>
-      <p:grpSpPr>
-        <a:xfrm>
-          <a:off x="0" y="0"/>
-          <a:ext cx="0" cy="0"/>
-          <a:chOff x="0" y="0"/>
-          <a:chExt cx="0" cy="0"/>
-        </a:xfrm>
-      </p:grpSpPr>
-      <p:sp>
-        <p:nvSpPr>
-          <p:cNvPr id="2" name="제목 1"/>
-          <p:cNvSpPr>
-            <a:spLocks noGrp="1"/>
-          </p:cNvSpPr>
-          <p:nvPr>
-            <p:ph type="title"/>
-          </p:nvPr>
-        </p:nvSpPr>
-        <p:spPr/>
-        <p:txBody>
-          <a:bodyPr>
-            <a:normAutofit/>
-          </a:bodyPr>
-          <a:lstStyle/>
-          <a:p>
-            <a:pPr algn="ctr"/>
-            <a:r>
-              <a:rPr lang="en-US" sz="4000" b="1"/>
-              <a:t>8-Build Betting &amp; Rolling APIs(Day 40-47)</a:t>
-            </a:r>
-            <a:br>
-              <a:rPr lang="en-US" sz="3200" b="1"/>
-            </a:br>
-            <a:endParaRPr lang="ko-KR" altLang="en-US" sz="3200" b="1" dirty="0"/>
-          </a:p>
-        </p:txBody>
-      </p:sp>
-      <p:graphicFrame>
-        <p:nvGraphicFramePr>
-          <p:cNvPr id="7" name="내용 개체 틀 6"/>
-          <p:cNvGraphicFramePr>
-            <a:graphicFrameLocks noGrp="1"/>
-          </p:cNvGraphicFramePr>
-          <p:nvPr>
-            <p:ph idx="1"/>
-            <p:extLst>
-              <p:ext uri="{D42A27DB-BD31-4B8C-83A1-F6EECF244321}">
-                <p14:modId xmlns:p14="http://schemas.microsoft.com/office/powerpoint/2010/main" val="3337551697"/>
-              </p:ext>
-            </p:extLst>
-          </p:nvPr>
-        </p:nvGraphicFramePr>
-        <p:xfrm>
-          <a:off x="838200" y="1276350"/>
-          <a:ext cx="10515600" cy="4743858"/>
-        </p:xfrm>
-        <a:graphic>
-          <a:graphicData uri="http://schemas.openxmlformats.org/drawingml/2006/table">
-            <a:tbl>
-              <a:tblPr firstRow="1" bandRow="1">
-                <a:tableStyleId>{073A0DAA-6AF3-43AB-8588-CEC1D06C72B9}</a:tableStyleId>
-              </a:tblPr>
-              <a:tblGrid>
-                <a:gridCol w="7820025">
-                  <a:extLst>
-                    <a:ext uri="{9D8B030D-6E8A-4147-A177-3AD203B41FA5}">
-                      <a16:colId xmlns:a16="http://schemas.microsoft.com/office/drawing/2014/main" val="436794892"/>
-                    </a:ext>
-                  </a:extLst>
-                </a:gridCol>
-                <a:gridCol w="2695575">
-                  <a:extLst>
-                    <a:ext uri="{9D8B030D-6E8A-4147-A177-3AD203B41FA5}">
-                      <a16:colId xmlns:a16="http://schemas.microsoft.com/office/drawing/2014/main" val="2058214037"/>
-                    </a:ext>
-                  </a:extLst>
-                </a:gridCol>
-              </a:tblGrid>
-              <a:tr h="336777">
-                <a:tc>
-                  <a:txBody>
-                    <a:bodyPr/>
-                    <a:lstStyle/>
-                    <a:p>
-                      <a:pPr algn="ctr" latinLnBrk="1"/>
-                      <a:r>
-                        <a:rPr lang="ko-KR" altLang="en-US" dirty="0"/>
-                        <a:t>요소 </a:t>
-                      </a:r>
-                      <a:r>
-                        <a:rPr lang="en-US" altLang="ko-KR" dirty="0"/>
-                        <a:t>element</a:t>
-                      </a:r>
-                      <a:endParaRPr lang="ko-KR" altLang="en-US" dirty="0"/>
-                    </a:p>
-                  </a:txBody>
-                  <a:tcPr/>
-                </a:tc>
-                <a:tc>
-                  <a:txBody>
-                    <a:bodyPr/>
-                    <a:lstStyle/>
-                    <a:p>
-                      <a:pPr algn="ctr" latinLnBrk="1"/>
-                      <a:r>
-                        <a:rPr lang="ko-KR" altLang="en-US" dirty="0"/>
-                        <a:t>설명 </a:t>
-                      </a:r>
-                      <a:r>
-                        <a:rPr lang="en-US" altLang="ko-KR" dirty="0"/>
-                        <a:t>explanation</a:t>
-                      </a:r>
-                      <a:endParaRPr lang="ko-KR" altLang="en-US" dirty="0"/>
-                    </a:p>
-                  </a:txBody>
-                  <a:tcPr/>
-                </a:tc>
-                <a:extLst>
-                  <a:ext uri="{0D108BD9-81ED-4DB2-BD59-A6C34878D82A}">
-                    <a16:rowId xmlns:a16="http://schemas.microsoft.com/office/drawing/2014/main" val="3065501436"/>
-                  </a:ext>
-                </a:extLst>
-              </a:tr>
-              <a:tr h="4378098">
-                <a:tc>
-                  <a:txBody>
-                    <a:bodyPr/>
-                    <a:lstStyle/>
-                    <a:p>
-                      <a:endParaRPr lang="en-US" b="1"/>
-                    </a:p>
-                    <a:p>
-                      <a:endParaRPr lang="en-US" b="1"/>
-                    </a:p>
-                    <a:p>
-                      <a:pPr marL="742950" lvl="1" indent="-285750">
-                        <a:buFont typeface="Arial" panose="020B0604020202020204" pitchFamily="34" charset="0"/>
-                        <a:buChar char="•"/>
-                      </a:pPr>
-                      <a:r>
-                        <a:rPr lang="en-US"/>
-                        <a:t>8-9- /betting/slot/lists?date_from=2024-12-31&amp;date_to=2024-12-31 (search slots)</a:t>
-                      </a:r>
-                    </a:p>
-                    <a:p>
-                      <a:pPr marL="742950" lvl="1" indent="-285750">
-                        <a:buFont typeface="Arial" panose="020B0604020202020204" pitchFamily="34" charset="0"/>
-                        <a:buChar char="•"/>
-                      </a:pPr>
-                      <a:endParaRPr lang="en-US"/>
-                    </a:p>
-                    <a:p>
-                      <a:pPr marL="742950" lvl="1" indent="-285750">
-                        <a:buFont typeface="Arial" panose="020B0604020202020204" pitchFamily="34" charset="0"/>
-                        <a:buChar char="•"/>
-                      </a:pPr>
-                      <a:endParaRPr lang="en-US"/>
-                    </a:p>
-                    <a:p>
-                      <a:pPr marL="742950" lvl="1" indent="-285750">
-                        <a:buFont typeface="Arial" panose="020B0604020202020204" pitchFamily="34" charset="0"/>
-                        <a:buChar char="•"/>
-                      </a:pPr>
-                      <a:r>
-                        <a:rPr lang="en-US" b="1"/>
-                        <a:t>8-10-</a:t>
-                      </a:r>
-                      <a:r>
-                        <a:rPr lang="en-US"/>
-                        <a:t> /betting/casino/lists?date_from=2024-12-31&amp;date_to=2024-12-31&amp;username=undefined&amp;min_win=undefined(search casion)</a:t>
-                      </a:r>
-                    </a:p>
-                    <a:p>
-                      <a:pPr marL="742950" lvl="1" indent="-285750">
-                        <a:buFont typeface="Arial" panose="020B0604020202020204" pitchFamily="34" charset="0"/>
-                        <a:buChar char="•"/>
-                      </a:pPr>
-                      <a:endParaRPr lang="en-US"/>
-                    </a:p>
-                    <a:p>
-                      <a:pPr marL="742950" lvl="1" indent="-285750">
-                        <a:buFont typeface="Arial" panose="020B0604020202020204" pitchFamily="34" charset="0"/>
-                        <a:buChar char="•"/>
-                      </a:pPr>
-                      <a:r>
-                        <a:rPr lang="en-US"/>
-                        <a:t>8-11- /betting/quickall/quicklists?date_from=2024-12-31&amp;date_to=2024-12-31 </a:t>
-                      </a:r>
-                    </a:p>
-                    <a:p>
-                      <a:pPr marL="742950" lvl="1" indent="-285750">
-                        <a:buFont typeface="Arial" panose="020B0604020202020204" pitchFamily="34" charset="0"/>
-                        <a:buChar char="•"/>
-                      </a:pPr>
-                      <a:endParaRPr lang="en-US"/>
-                    </a:p>
-                    <a:p>
-                      <a:pPr marL="742950" lvl="1" indent="-285750">
-                        <a:buFont typeface="Arial" panose="020B0604020202020204" pitchFamily="34" charset="0"/>
-                        <a:buChar char="•"/>
-                      </a:pPr>
-                      <a:endParaRPr lang="en-US" b="0"/>
-                    </a:p>
-                  </a:txBody>
-                  <a:tcPr/>
-                </a:tc>
-                <a:tc>
-                  <a:txBody>
-                    <a:bodyPr/>
-                    <a:lstStyle/>
-                    <a:p>
-                      <a:pPr marL="285750" indent="-285750" latinLnBrk="1">
-                        <a:buFontTx/>
-                        <a:buChar char="-"/>
-                      </a:pPr>
-                      <a:endParaRPr lang="en-US" altLang="ko-KR"/>
-                    </a:p>
-                    <a:p>
-                      <a:pPr marL="285750" indent="-285750" latinLnBrk="1">
-                        <a:buFontTx/>
-                        <a:buChar char="-"/>
-                      </a:pPr>
-                      <a:endParaRPr lang="en-US" altLang="ko-KR"/>
-                    </a:p>
-                  </a:txBody>
-                  <a:tcPr/>
-                </a:tc>
-                <a:extLst>
-                  <a:ext uri="{0D108BD9-81ED-4DB2-BD59-A6C34878D82A}">
-                    <a16:rowId xmlns:a16="http://schemas.microsoft.com/office/drawing/2014/main" val="1333542250"/>
-                  </a:ext>
-                </a:extLst>
-              </a:tr>
-            </a:tbl>
-          </a:graphicData>
-        </a:graphic>
-      </p:graphicFrame>
-    </p:spTree>
-    <p:extLst>
-      <p:ext uri="{BB962C8B-B14F-4D97-AF65-F5344CB8AC3E}">
-        <p14:creationId xmlns:p14="http://schemas.microsoft.com/office/powerpoint/2010/main" val="2572778241"/>
       </p:ext>
     </p:extLst>
   </p:cSld>
@@ -6519,7 +6636,833 @@
             <a:pPr algn="ctr"/>
             <a:r>
               <a:rPr lang="en-US" sz="4000" b="1"/>
-              <a:t>9-Build Game Stattistic APIs(Day 48-55)</a:t>
+              <a:t>8-Build Betting &amp; Rolling APIs(Day 51-60)</a:t>
+            </a:r>
+            <a:br>
+              <a:rPr lang="en-US" sz="3200" b="1"/>
+            </a:br>
+            <a:endParaRPr lang="ko-KR" altLang="en-US" sz="3200" b="1" dirty="0"/>
+          </a:p>
+        </p:txBody>
+      </p:sp>
+      <p:graphicFrame>
+        <p:nvGraphicFramePr>
+          <p:cNvPr id="7" name="내용 개체 틀 6"/>
+          <p:cNvGraphicFramePr>
+            <a:graphicFrameLocks noGrp="1"/>
+          </p:cNvGraphicFramePr>
+          <p:nvPr>
+            <p:ph idx="1"/>
+            <p:extLst>
+              <p:ext uri="{D42A27DB-BD31-4B8C-83A1-F6EECF244321}">
+                <p14:modId xmlns:p14="http://schemas.microsoft.com/office/powerpoint/2010/main" val="3934616726"/>
+              </p:ext>
+            </p:extLst>
+          </p:nvPr>
+        </p:nvGraphicFramePr>
+        <p:xfrm>
+          <a:off x="838200" y="1276350"/>
+          <a:ext cx="10515600" cy="4743858"/>
+        </p:xfrm>
+        <a:graphic>
+          <a:graphicData uri="http://schemas.openxmlformats.org/drawingml/2006/table">
+            <a:tbl>
+              <a:tblPr firstRow="1" bandRow="1">
+                <a:tableStyleId>{073A0DAA-6AF3-43AB-8588-CEC1D06C72B9}</a:tableStyleId>
+              </a:tblPr>
+              <a:tblGrid>
+                <a:gridCol w="7820025">
+                  <a:extLst>
+                    <a:ext uri="{9D8B030D-6E8A-4147-A177-3AD203B41FA5}">
+                      <a16:colId xmlns:a16="http://schemas.microsoft.com/office/drawing/2014/main" val="436794892"/>
+                    </a:ext>
+                  </a:extLst>
+                </a:gridCol>
+                <a:gridCol w="2695575">
+                  <a:extLst>
+                    <a:ext uri="{9D8B030D-6E8A-4147-A177-3AD203B41FA5}">
+                      <a16:colId xmlns:a16="http://schemas.microsoft.com/office/drawing/2014/main" val="2058214037"/>
+                    </a:ext>
+                  </a:extLst>
+                </a:gridCol>
+              </a:tblGrid>
+              <a:tr h="336777">
+                <a:tc>
+                  <a:txBody>
+                    <a:bodyPr/>
+                    <a:lstStyle/>
+                    <a:p>
+                      <a:pPr algn="ctr" latinLnBrk="1"/>
+                      <a:r>
+                        <a:rPr lang="ko-KR" altLang="en-US" dirty="0"/>
+                        <a:t>요소 </a:t>
+                      </a:r>
+                      <a:r>
+                        <a:rPr lang="en-US" altLang="ko-KR" dirty="0"/>
+                        <a:t>element</a:t>
+                      </a:r>
+                      <a:endParaRPr lang="ko-KR" altLang="en-US" dirty="0"/>
+                    </a:p>
+                  </a:txBody>
+                  <a:tcPr/>
+                </a:tc>
+                <a:tc>
+                  <a:txBody>
+                    <a:bodyPr/>
+                    <a:lstStyle/>
+                    <a:p>
+                      <a:pPr algn="ctr" latinLnBrk="1"/>
+                      <a:r>
+                        <a:rPr lang="ko-KR" altLang="en-US" dirty="0"/>
+                        <a:t>설명 </a:t>
+                      </a:r>
+                      <a:r>
+                        <a:rPr lang="en-US" altLang="ko-KR" dirty="0"/>
+                        <a:t>explanation</a:t>
+                      </a:r>
+                      <a:endParaRPr lang="ko-KR" altLang="en-US" dirty="0"/>
+                    </a:p>
+                  </a:txBody>
+                  <a:tcPr/>
+                </a:tc>
+                <a:extLst>
+                  <a:ext uri="{0D108BD9-81ED-4DB2-BD59-A6C34878D82A}">
+                    <a16:rowId xmlns:a16="http://schemas.microsoft.com/office/drawing/2014/main" val="3065501436"/>
+                  </a:ext>
+                </a:extLst>
+              </a:tr>
+              <a:tr h="4378098">
+                <a:tc>
+                  <a:txBody>
+                    <a:bodyPr/>
+                    <a:lstStyle/>
+                    <a:p>
+                      <a:endParaRPr lang="en-US" b="1"/>
+                    </a:p>
+                    <a:p>
+                      <a:endParaRPr lang="en-US" b="1"/>
+                    </a:p>
+                    <a:p>
+                      <a:pPr marL="742950" lvl="1" indent="-285750">
+                        <a:buFont typeface="Arial" panose="020B0604020202020204" pitchFamily="34" charset="0"/>
+                        <a:buChar char="•"/>
+                      </a:pPr>
+                      <a:r>
+                        <a:rPr lang="en-US"/>
+                        <a:t>8-1- /betting/slot/lists (betting status -Slots)</a:t>
+                      </a:r>
+                    </a:p>
+                    <a:p>
+                      <a:pPr marL="742950" lvl="1" indent="-285750">
+                        <a:buFont typeface="Arial" panose="020B0604020202020204" pitchFamily="34" charset="0"/>
+                        <a:buChar char="•"/>
+                      </a:pPr>
+                      <a:endParaRPr lang="en-US"/>
+                    </a:p>
+                    <a:p>
+                      <a:pPr marL="742950" lvl="1" indent="-285750">
+                        <a:buFont typeface="Arial" panose="020B0604020202020204" pitchFamily="34" charset="0"/>
+                        <a:buChar char="•"/>
+                      </a:pPr>
+                      <a:endParaRPr lang="en-US"/>
+                    </a:p>
+                    <a:p>
+                      <a:pPr marL="742950" lvl="1" indent="-285750">
+                        <a:buFont typeface="Arial" panose="020B0604020202020204" pitchFamily="34" charset="0"/>
+                        <a:buChar char="•"/>
+                      </a:pPr>
+                      <a:r>
+                        <a:rPr lang="en-US" b="1"/>
+                        <a:t>8-2-</a:t>
+                      </a:r>
+                      <a:r>
+                        <a:rPr lang="en-US"/>
+                        <a:t> /betting/casino/lists (betting status -Casino)</a:t>
+                      </a:r>
+                    </a:p>
+                    <a:p>
+                      <a:pPr marL="742950" lvl="1" indent="-285750">
+                        <a:buFont typeface="Arial" panose="020B0604020202020204" pitchFamily="34" charset="0"/>
+                        <a:buChar char="•"/>
+                      </a:pPr>
+                      <a:endParaRPr lang="en-US"/>
+                    </a:p>
+                    <a:p>
+                      <a:pPr marL="742950" lvl="1" indent="-285750">
+                        <a:buFont typeface="Arial" panose="020B0604020202020204" pitchFamily="34" charset="0"/>
+                        <a:buChar char="•"/>
+                      </a:pPr>
+                      <a:endParaRPr lang="en-US"/>
+                    </a:p>
+                    <a:p>
+                      <a:pPr marL="742950" lvl="1" indent="-285750">
+                        <a:buFont typeface="Arial" panose="020B0604020202020204" pitchFamily="34" charset="0"/>
+                        <a:buChar char="•"/>
+                      </a:pPr>
+                      <a:r>
+                        <a:rPr lang="en-US"/>
+                        <a:t>8-3- /betting/loss (Loss Adjustment (Sleep))</a:t>
+                      </a:r>
+                    </a:p>
+                    <a:p>
+                      <a:pPr marL="742950" lvl="1" indent="-285750">
+                        <a:buFont typeface="Arial" panose="020B0604020202020204" pitchFamily="34" charset="0"/>
+                        <a:buChar char="•"/>
+                      </a:pPr>
+                      <a:endParaRPr lang="en-US"/>
+                    </a:p>
+                    <a:p>
+                      <a:pPr marL="742950" lvl="1" indent="-285750">
+                        <a:buFont typeface="Arial" panose="020B0604020202020204" pitchFamily="34" charset="0"/>
+                        <a:buChar char="•"/>
+                      </a:pPr>
+                      <a:endParaRPr lang="en-US"/>
+                    </a:p>
+                    <a:p>
+                      <a:pPr marL="742950" lvl="1" indent="-285750">
+                        <a:buFont typeface="Arial" panose="020B0604020202020204" pitchFamily="34" charset="0"/>
+                        <a:buChar char="•"/>
+                      </a:pPr>
+                      <a:r>
+                        <a:rPr lang="en-US"/>
+                        <a:t>8-4- </a:t>
+                      </a:r>
+                      <a:r>
+                        <a:rPr lang="en-US" b="0"/>
+                        <a:t>/betting/lossr (loss recovery)</a:t>
+                      </a:r>
+                    </a:p>
+                    <a:p>
+                      <a:pPr marL="742950" lvl="1" indent="-285750">
+                        <a:buFont typeface="Arial" panose="020B0604020202020204" pitchFamily="34" charset="0"/>
+                        <a:buChar char="•"/>
+                      </a:pPr>
+                      <a:endParaRPr lang="en-US" b="0"/>
+                    </a:p>
+                  </a:txBody>
+                  <a:tcPr/>
+                </a:tc>
+                <a:tc>
+                  <a:txBody>
+                    <a:bodyPr/>
+                    <a:lstStyle/>
+                    <a:p>
+                      <a:pPr marL="285750" indent="-285750" latinLnBrk="1">
+                        <a:buFontTx/>
+                        <a:buChar char="-"/>
+                      </a:pPr>
+                      <a:endParaRPr lang="en-US" altLang="ko-KR"/>
+                    </a:p>
+                    <a:p>
+                      <a:pPr marL="285750" indent="-285750" latinLnBrk="1">
+                        <a:buFontTx/>
+                        <a:buChar char="-"/>
+                      </a:pPr>
+                      <a:endParaRPr lang="en-US" altLang="ko-KR"/>
+                    </a:p>
+                  </a:txBody>
+                  <a:tcPr/>
+                </a:tc>
+                <a:extLst>
+                  <a:ext uri="{0D108BD9-81ED-4DB2-BD59-A6C34878D82A}">
+                    <a16:rowId xmlns:a16="http://schemas.microsoft.com/office/drawing/2014/main" val="1333542250"/>
+                  </a:ext>
+                </a:extLst>
+              </a:tr>
+            </a:tbl>
+          </a:graphicData>
+        </a:graphic>
+      </p:graphicFrame>
+    </p:spTree>
+    <p:extLst>
+      <p:ext uri="{BB962C8B-B14F-4D97-AF65-F5344CB8AC3E}">
+        <p14:creationId xmlns:p14="http://schemas.microsoft.com/office/powerpoint/2010/main" val="2297010901"/>
+      </p:ext>
+    </p:extLst>
+  </p:cSld>
+  <p:clrMapOvr>
+    <a:masterClrMapping/>
+  </p:clrMapOvr>
+</p:sld>
+</file>
+
+<file path=ppt/slides/slide21.xml><?xml version="1.0" encoding="utf-8"?>
+<p:sld xmlns:a="http://schemas.openxmlformats.org/drawingml/2006/main" xmlns:r="http://schemas.openxmlformats.org/officeDocument/2006/relationships" xmlns:p="http://schemas.openxmlformats.org/presentationml/2006/main">
+  <p:cSld>
+    <p:spTree>
+      <p:nvGrpSpPr>
+        <p:cNvPr id="1" name=""/>
+        <p:cNvGrpSpPr/>
+        <p:nvPr/>
+      </p:nvGrpSpPr>
+      <p:grpSpPr>
+        <a:xfrm>
+          <a:off x="0" y="0"/>
+          <a:ext cx="0" cy="0"/>
+          <a:chOff x="0" y="0"/>
+          <a:chExt cx="0" cy="0"/>
+        </a:xfrm>
+      </p:grpSpPr>
+      <p:sp>
+        <p:nvSpPr>
+          <p:cNvPr id="2" name="제목 1"/>
+          <p:cNvSpPr>
+            <a:spLocks noGrp="1"/>
+          </p:cNvSpPr>
+          <p:nvPr>
+            <p:ph type="title"/>
+          </p:nvPr>
+        </p:nvSpPr>
+        <p:spPr/>
+        <p:txBody>
+          <a:bodyPr>
+            <a:normAutofit/>
+          </a:bodyPr>
+          <a:lstStyle/>
+          <a:p>
+            <a:pPr algn="ctr"/>
+            <a:r>
+              <a:rPr lang="en-US" sz="4000" b="1"/>
+              <a:t>8-Build Betting &amp; Rolling APIs(Day 51-60)</a:t>
+            </a:r>
+            <a:br>
+              <a:rPr lang="en-US" sz="3200" b="1"/>
+            </a:br>
+            <a:endParaRPr lang="ko-KR" altLang="en-US" sz="3200" b="1" dirty="0"/>
+          </a:p>
+        </p:txBody>
+      </p:sp>
+      <p:graphicFrame>
+        <p:nvGraphicFramePr>
+          <p:cNvPr id="7" name="내용 개체 틀 6"/>
+          <p:cNvGraphicFramePr>
+            <a:graphicFrameLocks noGrp="1"/>
+          </p:cNvGraphicFramePr>
+          <p:nvPr>
+            <p:ph idx="1"/>
+            <p:extLst>
+              <p:ext uri="{D42A27DB-BD31-4B8C-83A1-F6EECF244321}">
+                <p14:modId xmlns:p14="http://schemas.microsoft.com/office/powerpoint/2010/main" val="4229664590"/>
+              </p:ext>
+            </p:extLst>
+          </p:nvPr>
+        </p:nvGraphicFramePr>
+        <p:xfrm>
+          <a:off x="838200" y="1276350"/>
+          <a:ext cx="10515600" cy="4743858"/>
+        </p:xfrm>
+        <a:graphic>
+          <a:graphicData uri="http://schemas.openxmlformats.org/drawingml/2006/table">
+            <a:tbl>
+              <a:tblPr firstRow="1" bandRow="1">
+                <a:tableStyleId>{073A0DAA-6AF3-43AB-8588-CEC1D06C72B9}</a:tableStyleId>
+              </a:tblPr>
+              <a:tblGrid>
+                <a:gridCol w="7820025">
+                  <a:extLst>
+                    <a:ext uri="{9D8B030D-6E8A-4147-A177-3AD203B41FA5}">
+                      <a16:colId xmlns:a16="http://schemas.microsoft.com/office/drawing/2014/main" val="436794892"/>
+                    </a:ext>
+                  </a:extLst>
+                </a:gridCol>
+                <a:gridCol w="2695575">
+                  <a:extLst>
+                    <a:ext uri="{9D8B030D-6E8A-4147-A177-3AD203B41FA5}">
+                      <a16:colId xmlns:a16="http://schemas.microsoft.com/office/drawing/2014/main" val="2058214037"/>
+                    </a:ext>
+                  </a:extLst>
+                </a:gridCol>
+              </a:tblGrid>
+              <a:tr h="336777">
+                <a:tc>
+                  <a:txBody>
+                    <a:bodyPr/>
+                    <a:lstStyle/>
+                    <a:p>
+                      <a:pPr algn="ctr" latinLnBrk="1"/>
+                      <a:r>
+                        <a:rPr lang="ko-KR" altLang="en-US" dirty="0"/>
+                        <a:t>요소 </a:t>
+                      </a:r>
+                      <a:r>
+                        <a:rPr lang="en-US" altLang="ko-KR" dirty="0"/>
+                        <a:t>element</a:t>
+                      </a:r>
+                      <a:endParaRPr lang="ko-KR" altLang="en-US" dirty="0"/>
+                    </a:p>
+                  </a:txBody>
+                  <a:tcPr/>
+                </a:tc>
+                <a:tc>
+                  <a:txBody>
+                    <a:bodyPr/>
+                    <a:lstStyle/>
+                    <a:p>
+                      <a:pPr algn="ctr" latinLnBrk="1"/>
+                      <a:r>
+                        <a:rPr lang="ko-KR" altLang="en-US" dirty="0"/>
+                        <a:t>설명 </a:t>
+                      </a:r>
+                      <a:r>
+                        <a:rPr lang="en-US" altLang="ko-KR" dirty="0"/>
+                        <a:t>explanation</a:t>
+                      </a:r>
+                      <a:endParaRPr lang="ko-KR" altLang="en-US" dirty="0"/>
+                    </a:p>
+                  </a:txBody>
+                  <a:tcPr/>
+                </a:tc>
+                <a:extLst>
+                  <a:ext uri="{0D108BD9-81ED-4DB2-BD59-A6C34878D82A}">
+                    <a16:rowId xmlns:a16="http://schemas.microsoft.com/office/drawing/2014/main" val="3065501436"/>
+                  </a:ext>
+                </a:extLst>
+              </a:tr>
+              <a:tr h="4378098">
+                <a:tc>
+                  <a:txBody>
+                    <a:bodyPr/>
+                    <a:lstStyle/>
+                    <a:p>
+                      <a:endParaRPr lang="en-US" b="1"/>
+                    </a:p>
+                    <a:p>
+                      <a:endParaRPr lang="en-US" b="1"/>
+                    </a:p>
+                    <a:p>
+                      <a:pPr marL="742950" lvl="1" indent="-285750">
+                        <a:buFont typeface="Arial" panose="020B0604020202020204" pitchFamily="34" charset="0"/>
+                        <a:buChar char="•"/>
+                      </a:pPr>
+                      <a:r>
+                        <a:rPr lang="en-US"/>
+                        <a:t>8-5- /betting/limitgameplay/limitgameplay_list(Limited game betting status)</a:t>
+                      </a:r>
+                    </a:p>
+                    <a:p>
+                      <a:pPr marL="742950" lvl="1" indent="-285750">
+                        <a:buFont typeface="Arial" panose="020B0604020202020204" pitchFamily="34" charset="0"/>
+                        <a:buChar char="•"/>
+                      </a:pPr>
+                      <a:endParaRPr lang="en-US"/>
+                    </a:p>
+                    <a:p>
+                      <a:pPr marL="742950" lvl="1" indent="-285750">
+                        <a:buFont typeface="Arial" panose="020B0604020202020204" pitchFamily="34" charset="0"/>
+                        <a:buChar char="•"/>
+                      </a:pPr>
+                      <a:r>
+                        <a:rPr lang="en-US" b="1"/>
+                        <a:t>8-6-</a:t>
+                      </a:r>
+                      <a:r>
+                        <a:rPr lang="en-US"/>
+                        <a:t> /betting/quickslot/quicklists (Quick Bet Status (Slots))</a:t>
+                      </a:r>
+                    </a:p>
+                    <a:p>
+                      <a:pPr marL="742950" lvl="1" indent="-285750">
+                        <a:buFont typeface="Arial" panose="020B0604020202020204" pitchFamily="34" charset="0"/>
+                        <a:buChar char="•"/>
+                      </a:pPr>
+                      <a:endParaRPr lang="en-US"/>
+                    </a:p>
+                    <a:p>
+                      <a:pPr marL="742950" lvl="1" indent="-285750">
+                        <a:buFont typeface="Arial" panose="020B0604020202020204" pitchFamily="34" charset="0"/>
+                        <a:buChar char="•"/>
+                      </a:pPr>
+                      <a:endParaRPr lang="en-US"/>
+                    </a:p>
+                    <a:p>
+                      <a:pPr marL="742950" lvl="1" indent="-285750">
+                        <a:buFont typeface="Arial" panose="020B0604020202020204" pitchFamily="34" charset="0"/>
+                        <a:buChar char="•"/>
+                      </a:pPr>
+                      <a:r>
+                        <a:rPr lang="en-US"/>
+                        <a:t>8-7- /betting/quickcasino/quicklists( Quick Betting Status (Casino))</a:t>
+                      </a:r>
+                    </a:p>
+                    <a:p>
+                      <a:pPr marL="742950" lvl="1" indent="-285750">
+                        <a:buFont typeface="Arial" panose="020B0604020202020204" pitchFamily="34" charset="0"/>
+                        <a:buChar char="•"/>
+                      </a:pPr>
+                      <a:endParaRPr lang="en-US"/>
+                    </a:p>
+                    <a:p>
+                      <a:pPr marL="742950" lvl="1" indent="-285750">
+                        <a:buFont typeface="Arial" panose="020B0604020202020204" pitchFamily="34" charset="0"/>
+                        <a:buChar char="•"/>
+                      </a:pPr>
+                      <a:endParaRPr lang="en-US"/>
+                    </a:p>
+                    <a:p>
+                      <a:pPr marL="742950" lvl="1" indent="-285750">
+                        <a:buFont typeface="Arial" panose="020B0604020202020204" pitchFamily="34" charset="0"/>
+                        <a:buChar char="•"/>
+                      </a:pPr>
+                      <a:r>
+                        <a:rPr lang="en-US"/>
+                        <a:t>8-8- </a:t>
+                      </a:r>
+                      <a:r>
+                        <a:rPr lang="en-US" b="0"/>
+                        <a:t>/betting/quickall/quicklists Quick Betting Status (SL+KA)</a:t>
+                      </a:r>
+                    </a:p>
+                    <a:p>
+                      <a:pPr marL="742950" lvl="1" indent="-285750">
+                        <a:buFont typeface="Arial" panose="020B0604020202020204" pitchFamily="34" charset="0"/>
+                        <a:buChar char="•"/>
+                      </a:pPr>
+                      <a:endParaRPr lang="en-US" b="0"/>
+                    </a:p>
+                  </a:txBody>
+                  <a:tcPr/>
+                </a:tc>
+                <a:tc>
+                  <a:txBody>
+                    <a:bodyPr/>
+                    <a:lstStyle/>
+                    <a:p>
+                      <a:pPr marL="285750" indent="-285750" latinLnBrk="1">
+                        <a:buFontTx/>
+                        <a:buChar char="-"/>
+                      </a:pPr>
+                      <a:endParaRPr lang="en-US" altLang="ko-KR"/>
+                    </a:p>
+                    <a:p>
+                      <a:pPr marL="285750" indent="-285750" latinLnBrk="1">
+                        <a:buFontTx/>
+                        <a:buChar char="-"/>
+                      </a:pPr>
+                      <a:endParaRPr lang="en-US" altLang="ko-KR"/>
+                    </a:p>
+                  </a:txBody>
+                  <a:tcPr/>
+                </a:tc>
+                <a:extLst>
+                  <a:ext uri="{0D108BD9-81ED-4DB2-BD59-A6C34878D82A}">
+                    <a16:rowId xmlns:a16="http://schemas.microsoft.com/office/drawing/2014/main" val="1333542250"/>
+                  </a:ext>
+                </a:extLst>
+              </a:tr>
+            </a:tbl>
+          </a:graphicData>
+        </a:graphic>
+      </p:graphicFrame>
+    </p:spTree>
+    <p:extLst>
+      <p:ext uri="{BB962C8B-B14F-4D97-AF65-F5344CB8AC3E}">
+        <p14:creationId xmlns:p14="http://schemas.microsoft.com/office/powerpoint/2010/main" val="2134913886"/>
+      </p:ext>
+    </p:extLst>
+  </p:cSld>
+  <p:clrMapOvr>
+    <a:masterClrMapping/>
+  </p:clrMapOvr>
+</p:sld>
+</file>
+
+<file path=ppt/slides/slide22.xml><?xml version="1.0" encoding="utf-8"?>
+<p:sld xmlns:a="http://schemas.openxmlformats.org/drawingml/2006/main" xmlns:r="http://schemas.openxmlformats.org/officeDocument/2006/relationships" xmlns:p="http://schemas.openxmlformats.org/presentationml/2006/main">
+  <p:cSld>
+    <p:spTree>
+      <p:nvGrpSpPr>
+        <p:cNvPr id="1" name=""/>
+        <p:cNvGrpSpPr/>
+        <p:nvPr/>
+      </p:nvGrpSpPr>
+      <p:grpSpPr>
+        <a:xfrm>
+          <a:off x="0" y="0"/>
+          <a:ext cx="0" cy="0"/>
+          <a:chOff x="0" y="0"/>
+          <a:chExt cx="0" cy="0"/>
+        </a:xfrm>
+      </p:grpSpPr>
+      <p:sp>
+        <p:nvSpPr>
+          <p:cNvPr id="2" name="제목 1"/>
+          <p:cNvSpPr>
+            <a:spLocks noGrp="1"/>
+          </p:cNvSpPr>
+          <p:nvPr>
+            <p:ph type="title"/>
+          </p:nvPr>
+        </p:nvSpPr>
+        <p:spPr/>
+        <p:txBody>
+          <a:bodyPr>
+            <a:normAutofit/>
+          </a:bodyPr>
+          <a:lstStyle/>
+          <a:p>
+            <a:pPr algn="ctr"/>
+            <a:r>
+              <a:rPr lang="en-US" sz="4000" b="1"/>
+              <a:t>8-Build Betting &amp; Rolling APIs(Day 51-60)</a:t>
+            </a:r>
+            <a:br>
+              <a:rPr lang="en-US" sz="3200" b="1"/>
+            </a:br>
+            <a:endParaRPr lang="ko-KR" altLang="en-US" sz="3200" b="1" dirty="0"/>
+          </a:p>
+        </p:txBody>
+      </p:sp>
+      <p:graphicFrame>
+        <p:nvGraphicFramePr>
+          <p:cNvPr id="7" name="내용 개체 틀 6"/>
+          <p:cNvGraphicFramePr>
+            <a:graphicFrameLocks noGrp="1"/>
+          </p:cNvGraphicFramePr>
+          <p:nvPr>
+            <p:ph idx="1"/>
+            <p:extLst>
+              <p:ext uri="{D42A27DB-BD31-4B8C-83A1-F6EECF244321}">
+                <p14:modId xmlns:p14="http://schemas.microsoft.com/office/powerpoint/2010/main" val="3337551697"/>
+              </p:ext>
+            </p:extLst>
+          </p:nvPr>
+        </p:nvGraphicFramePr>
+        <p:xfrm>
+          <a:off x="838200" y="1276350"/>
+          <a:ext cx="10515600" cy="4743858"/>
+        </p:xfrm>
+        <a:graphic>
+          <a:graphicData uri="http://schemas.openxmlformats.org/drawingml/2006/table">
+            <a:tbl>
+              <a:tblPr firstRow="1" bandRow="1">
+                <a:tableStyleId>{073A0DAA-6AF3-43AB-8588-CEC1D06C72B9}</a:tableStyleId>
+              </a:tblPr>
+              <a:tblGrid>
+                <a:gridCol w="7820025">
+                  <a:extLst>
+                    <a:ext uri="{9D8B030D-6E8A-4147-A177-3AD203B41FA5}">
+                      <a16:colId xmlns:a16="http://schemas.microsoft.com/office/drawing/2014/main" val="436794892"/>
+                    </a:ext>
+                  </a:extLst>
+                </a:gridCol>
+                <a:gridCol w="2695575">
+                  <a:extLst>
+                    <a:ext uri="{9D8B030D-6E8A-4147-A177-3AD203B41FA5}">
+                      <a16:colId xmlns:a16="http://schemas.microsoft.com/office/drawing/2014/main" val="2058214037"/>
+                    </a:ext>
+                  </a:extLst>
+                </a:gridCol>
+              </a:tblGrid>
+              <a:tr h="336777">
+                <a:tc>
+                  <a:txBody>
+                    <a:bodyPr/>
+                    <a:lstStyle/>
+                    <a:p>
+                      <a:pPr algn="ctr" latinLnBrk="1"/>
+                      <a:r>
+                        <a:rPr lang="ko-KR" altLang="en-US" dirty="0"/>
+                        <a:t>요소 </a:t>
+                      </a:r>
+                      <a:r>
+                        <a:rPr lang="en-US" altLang="ko-KR" dirty="0"/>
+                        <a:t>element</a:t>
+                      </a:r>
+                      <a:endParaRPr lang="ko-KR" altLang="en-US" dirty="0"/>
+                    </a:p>
+                  </a:txBody>
+                  <a:tcPr/>
+                </a:tc>
+                <a:tc>
+                  <a:txBody>
+                    <a:bodyPr/>
+                    <a:lstStyle/>
+                    <a:p>
+                      <a:pPr algn="ctr" latinLnBrk="1"/>
+                      <a:r>
+                        <a:rPr lang="ko-KR" altLang="en-US" dirty="0"/>
+                        <a:t>설명 </a:t>
+                      </a:r>
+                      <a:r>
+                        <a:rPr lang="en-US" altLang="ko-KR" dirty="0"/>
+                        <a:t>explanation</a:t>
+                      </a:r>
+                      <a:endParaRPr lang="ko-KR" altLang="en-US" dirty="0"/>
+                    </a:p>
+                  </a:txBody>
+                  <a:tcPr/>
+                </a:tc>
+                <a:extLst>
+                  <a:ext uri="{0D108BD9-81ED-4DB2-BD59-A6C34878D82A}">
+                    <a16:rowId xmlns:a16="http://schemas.microsoft.com/office/drawing/2014/main" val="3065501436"/>
+                  </a:ext>
+                </a:extLst>
+              </a:tr>
+              <a:tr h="4378098">
+                <a:tc>
+                  <a:txBody>
+                    <a:bodyPr/>
+                    <a:lstStyle/>
+                    <a:p>
+                      <a:endParaRPr lang="en-US" b="1"/>
+                    </a:p>
+                    <a:p>
+                      <a:endParaRPr lang="en-US" b="1"/>
+                    </a:p>
+                    <a:p>
+                      <a:pPr marL="742950" lvl="1" indent="-285750">
+                        <a:buFont typeface="Arial" panose="020B0604020202020204" pitchFamily="34" charset="0"/>
+                        <a:buChar char="•"/>
+                      </a:pPr>
+                      <a:r>
+                        <a:rPr lang="en-US"/>
+                        <a:t>8-9- /betting/slot/lists?date_from=2024-12-31&amp;date_to=2024-12-31 (search slots)</a:t>
+                      </a:r>
+                    </a:p>
+                    <a:p>
+                      <a:pPr marL="742950" lvl="1" indent="-285750">
+                        <a:buFont typeface="Arial" panose="020B0604020202020204" pitchFamily="34" charset="0"/>
+                        <a:buChar char="•"/>
+                      </a:pPr>
+                      <a:endParaRPr lang="en-US"/>
+                    </a:p>
+                    <a:p>
+                      <a:pPr marL="742950" lvl="1" indent="-285750">
+                        <a:buFont typeface="Arial" panose="020B0604020202020204" pitchFamily="34" charset="0"/>
+                        <a:buChar char="•"/>
+                      </a:pPr>
+                      <a:endParaRPr lang="en-US"/>
+                    </a:p>
+                    <a:p>
+                      <a:pPr marL="742950" lvl="1" indent="-285750">
+                        <a:buFont typeface="Arial" panose="020B0604020202020204" pitchFamily="34" charset="0"/>
+                        <a:buChar char="•"/>
+                      </a:pPr>
+                      <a:r>
+                        <a:rPr lang="en-US" b="1"/>
+                        <a:t>8-10-</a:t>
+                      </a:r>
+                      <a:r>
+                        <a:rPr lang="en-US"/>
+                        <a:t> /betting/casino/lists?date_from=2024-12-31&amp;date_to=2024-12-31&amp;username=undefined&amp;min_win=undefined(search casion)</a:t>
+                      </a:r>
+                    </a:p>
+                    <a:p>
+                      <a:pPr marL="742950" lvl="1" indent="-285750">
+                        <a:buFont typeface="Arial" panose="020B0604020202020204" pitchFamily="34" charset="0"/>
+                        <a:buChar char="•"/>
+                      </a:pPr>
+                      <a:endParaRPr lang="en-US"/>
+                    </a:p>
+                    <a:p>
+                      <a:pPr marL="742950" lvl="1" indent="-285750">
+                        <a:buFont typeface="Arial" panose="020B0604020202020204" pitchFamily="34" charset="0"/>
+                        <a:buChar char="•"/>
+                      </a:pPr>
+                      <a:r>
+                        <a:rPr lang="en-US"/>
+                        <a:t>8-11- /betting/quickall/quicklists?date_from=2024-12-31&amp;date_to=2024-12-31 </a:t>
+                      </a:r>
+                    </a:p>
+                    <a:p>
+                      <a:pPr marL="742950" lvl="1" indent="-285750">
+                        <a:buFont typeface="Arial" panose="020B0604020202020204" pitchFamily="34" charset="0"/>
+                        <a:buChar char="•"/>
+                      </a:pPr>
+                      <a:endParaRPr lang="en-US"/>
+                    </a:p>
+                    <a:p>
+                      <a:pPr marL="742950" lvl="1" indent="-285750">
+                        <a:buFont typeface="Arial" panose="020B0604020202020204" pitchFamily="34" charset="0"/>
+                        <a:buChar char="•"/>
+                      </a:pPr>
+                      <a:endParaRPr lang="en-US" b="0"/>
+                    </a:p>
+                  </a:txBody>
+                  <a:tcPr/>
+                </a:tc>
+                <a:tc>
+                  <a:txBody>
+                    <a:bodyPr/>
+                    <a:lstStyle/>
+                    <a:p>
+                      <a:pPr marL="285750" indent="-285750" latinLnBrk="1">
+                        <a:buFontTx/>
+                        <a:buChar char="-"/>
+                      </a:pPr>
+                      <a:endParaRPr lang="en-US" altLang="ko-KR"/>
+                    </a:p>
+                    <a:p>
+                      <a:pPr marL="285750" indent="-285750" latinLnBrk="1">
+                        <a:buFontTx/>
+                        <a:buChar char="-"/>
+                      </a:pPr>
+                      <a:endParaRPr lang="en-US" altLang="ko-KR"/>
+                    </a:p>
+                  </a:txBody>
+                  <a:tcPr/>
+                </a:tc>
+                <a:extLst>
+                  <a:ext uri="{0D108BD9-81ED-4DB2-BD59-A6C34878D82A}">
+                    <a16:rowId xmlns:a16="http://schemas.microsoft.com/office/drawing/2014/main" val="1333542250"/>
+                  </a:ext>
+                </a:extLst>
+              </a:tr>
+            </a:tbl>
+          </a:graphicData>
+        </a:graphic>
+      </p:graphicFrame>
+    </p:spTree>
+    <p:extLst>
+      <p:ext uri="{BB962C8B-B14F-4D97-AF65-F5344CB8AC3E}">
+        <p14:creationId xmlns:p14="http://schemas.microsoft.com/office/powerpoint/2010/main" val="2572778241"/>
+      </p:ext>
+    </p:extLst>
+  </p:cSld>
+  <p:clrMapOvr>
+    <a:masterClrMapping/>
+  </p:clrMapOvr>
+</p:sld>
+</file>
+
+<file path=ppt/slides/slide23.xml><?xml version="1.0" encoding="utf-8"?>
+<p:sld xmlns:a="http://schemas.openxmlformats.org/drawingml/2006/main" xmlns:r="http://schemas.openxmlformats.org/officeDocument/2006/relationships" xmlns:p="http://schemas.openxmlformats.org/presentationml/2006/main">
+  <p:cSld>
+    <p:spTree>
+      <p:nvGrpSpPr>
+        <p:cNvPr id="1" name=""/>
+        <p:cNvGrpSpPr/>
+        <p:nvPr/>
+      </p:nvGrpSpPr>
+      <p:grpSpPr>
+        <a:xfrm>
+          <a:off x="0" y="0"/>
+          <a:ext cx="0" cy="0"/>
+          <a:chOff x="0" y="0"/>
+          <a:chExt cx="0" cy="0"/>
+        </a:xfrm>
+      </p:grpSpPr>
+      <p:sp>
+        <p:nvSpPr>
+          <p:cNvPr id="2" name="제목 1"/>
+          <p:cNvSpPr>
+            <a:spLocks noGrp="1"/>
+          </p:cNvSpPr>
+          <p:nvPr>
+            <p:ph type="title"/>
+          </p:nvPr>
+        </p:nvSpPr>
+        <p:spPr/>
+        <p:txBody>
+          <a:bodyPr>
+            <a:normAutofit/>
+          </a:bodyPr>
+          <a:lstStyle/>
+          <a:p>
+            <a:pPr algn="ctr"/>
+            <a:r>
+              <a:rPr lang="en-US" sz="4000" b="1"/>
+              <a:t>9-Build Game Stattistic APIs(Day 61-67)</a:t>
             </a:r>
             <a:br>
               <a:rPr lang="en-US" sz="3200" b="1"/>
@@ -6776,7 +7719,7 @@
 </p:sld>
 </file>
 
-<file path=ppt/slides/slide21.xml><?xml version="1.0" encoding="utf-8"?>
+<file path=ppt/slides/slide24.xml><?xml version="1.0" encoding="utf-8"?>
 <p:sld xmlns:a="http://schemas.openxmlformats.org/drawingml/2006/main" xmlns:r="http://schemas.openxmlformats.org/officeDocument/2006/relationships" xmlns:p="http://schemas.openxmlformats.org/presentationml/2006/main">
   <p:cSld>
     <p:spTree>
@@ -6813,7 +7756,7 @@
             <a:pPr algn="ctr"/>
             <a:r>
               <a:rPr lang="en-US" sz="4000" b="1"/>
-              <a:t>9-Build Game Stattistic APIs(Day 48-55)</a:t>
+              <a:t>9-Build Game Stattistic APIs(Day 61-67)</a:t>
             </a:r>
             <a:br>
               <a:rPr lang="en-US" sz="3200" b="1"/>
@@ -7070,7 +8013,7 @@
 </p:sld>
 </file>
 
-<file path=ppt/slides/slide22.xml><?xml version="1.0" encoding="utf-8"?>
+<file path=ppt/slides/slide25.xml><?xml version="1.0" encoding="utf-8"?>
 <p:sld xmlns:a="http://schemas.openxmlformats.org/drawingml/2006/main" xmlns:r="http://schemas.openxmlformats.org/officeDocument/2006/relationships" xmlns:p="http://schemas.openxmlformats.org/presentationml/2006/main">
   <p:cSld>
     <p:spTree>
@@ -7107,7 +8050,7 @@
             <a:pPr algn="ctr"/>
             <a:r>
               <a:rPr lang="en-US" sz="4000" b="1"/>
-              <a:t>9-Build Game Stattistic APIs(Day 48-55)</a:t>
+              <a:t>9-Build Game Stattistic APIs(Day 61-67)</a:t>
             </a:r>
             <a:br>
               <a:rPr lang="en-US" sz="3200" b="1"/>
@@ -7357,7 +8300,7 @@
 </p:sld>
 </file>
 
-<file path=ppt/slides/slide23.xml><?xml version="1.0" encoding="utf-8"?>
+<file path=ppt/slides/slide26.xml><?xml version="1.0" encoding="utf-8"?>
 <p:sld xmlns:a="http://schemas.openxmlformats.org/drawingml/2006/main" xmlns:r="http://schemas.openxmlformats.org/officeDocument/2006/relationships" xmlns:p="http://schemas.openxmlformats.org/presentationml/2006/main">
   <p:cSld>
     <p:spTree>
@@ -7394,7 +8337,7 @@
             <a:pPr algn="ctr"/>
             <a:r>
               <a:rPr lang="en-US" sz="4000" b="1"/>
-              <a:t>9-Build Game Stattistic APIs(Day 48-55)</a:t>
+              <a:t>9-Build Game Stattistic APIs(Day 61-67)</a:t>
             </a:r>
             <a:br>
               <a:rPr lang="en-US" sz="3200" b="1"/>
@@ -7623,7 +8566,7 @@
 </p:sld>
 </file>
 
-<file path=ppt/slides/slide24.xml><?xml version="1.0" encoding="utf-8"?>
+<file path=ppt/slides/slide27.xml><?xml version="1.0" encoding="utf-8"?>
 <p:sld xmlns:a="http://schemas.openxmlformats.org/drawingml/2006/main" xmlns:r="http://schemas.openxmlformats.org/officeDocument/2006/relationships" xmlns:p="http://schemas.openxmlformats.org/presentationml/2006/main">
   <p:cSld>
     <p:spTree>
@@ -7660,7 +8603,7 @@
             <a:pPr algn="ctr"/>
             <a:r>
               <a:rPr lang="en-US" sz="4000" b="1"/>
-              <a:t>10-Build Luiing Settlement APIs(Day 56-60)</a:t>
+              <a:t>10-Build Luiing Settlement APIs(Day 68-72)</a:t>
             </a:r>
             <a:br>
               <a:rPr lang="en-US" sz="3200" b="1"/>
@@ -7892,7 +8835,7 @@
 </p:sld>
 </file>
 
-<file path=ppt/slides/slide25.xml><?xml version="1.0" encoding="utf-8"?>
+<file path=ppt/slides/slide28.xml><?xml version="1.0" encoding="utf-8"?>
 <p:sld xmlns:a="http://schemas.openxmlformats.org/drawingml/2006/main" xmlns:r="http://schemas.openxmlformats.org/officeDocument/2006/relationships" xmlns:p="http://schemas.openxmlformats.org/presentationml/2006/main">
   <p:cSld>
     <p:spTree>
@@ -7929,7 +8872,7 @@
             <a:pPr algn="ctr"/>
             <a:r>
               <a:rPr lang="en-US" sz="4000" b="1"/>
-              <a:t>11-Build Domain &amp; Setting APIs(Day 61-64)</a:t>
+              <a:t>11-Build Domain &amp; Setting APIs(Day 73-80)</a:t>
             </a:r>
             <a:br>
               <a:rPr lang="en-US" sz="3200" b="1"/>
@@ -8161,7 +9104,7 @@
 </p:sld>
 </file>
 
-<file path=ppt/slides/slide26.xml><?xml version="1.0" encoding="utf-8"?>
+<file path=ppt/slides/slide29.xml><?xml version="1.0" encoding="utf-8"?>
 <p:sld xmlns:a="http://schemas.openxmlformats.org/drawingml/2006/main" xmlns:r="http://schemas.openxmlformats.org/officeDocument/2006/relationships" xmlns:p="http://schemas.openxmlformats.org/presentationml/2006/main">
   <p:cSld>
     <p:spTree>
@@ -8198,7 +9141,7 @@
             <a:pPr algn="ctr"/>
             <a:r>
               <a:rPr lang="en-US" sz="4000" b="1"/>
-              <a:t>12- Building the Frontend Integrate Frontend with Backend (Day 64-78)</a:t>
+              <a:t>12- Building the Frontend Integrate Frontend with Backend (Day 81-86)</a:t>
             </a:r>
             <a:br>
               <a:rPr lang="en-US" sz="3200" b="1"/>
@@ -8425,609 +9368,6 @@
     <p:extLst>
       <p:ext uri="{BB962C8B-B14F-4D97-AF65-F5344CB8AC3E}">
         <p14:creationId xmlns:p14="http://schemas.microsoft.com/office/powerpoint/2010/main" val="3216553939"/>
-      </p:ext>
-    </p:extLst>
-  </p:cSld>
-  <p:clrMapOvr>
-    <a:masterClrMapping/>
-  </p:clrMapOvr>
-</p:sld>
-</file>
-
-<file path=ppt/slides/slide27.xml><?xml version="1.0" encoding="utf-8"?>
-<p:sld xmlns:a="http://schemas.openxmlformats.org/drawingml/2006/main" xmlns:r="http://schemas.openxmlformats.org/officeDocument/2006/relationships" xmlns:p="http://schemas.openxmlformats.org/presentationml/2006/main">
-  <p:cSld>
-    <p:spTree>
-      <p:nvGrpSpPr>
-        <p:cNvPr id="1" name=""/>
-        <p:cNvGrpSpPr/>
-        <p:nvPr/>
-      </p:nvGrpSpPr>
-      <p:grpSpPr>
-        <a:xfrm>
-          <a:off x="0" y="0"/>
-          <a:ext cx="0" cy="0"/>
-          <a:chOff x="0" y="0"/>
-          <a:chExt cx="0" cy="0"/>
-        </a:xfrm>
-      </p:grpSpPr>
-      <p:sp>
-        <p:nvSpPr>
-          <p:cNvPr id="2" name="제목 1"/>
-          <p:cNvSpPr>
-            <a:spLocks noGrp="1"/>
-          </p:cNvSpPr>
-          <p:nvPr>
-            <p:ph type="title"/>
-          </p:nvPr>
-        </p:nvSpPr>
-        <p:spPr/>
-        <p:txBody>
-          <a:bodyPr>
-            <a:normAutofit fontScale="90000"/>
-          </a:bodyPr>
-          <a:lstStyle/>
-          <a:p>
-            <a:pPr algn="ctr"/>
-            <a:r>
-              <a:rPr lang="en-US" sz="4000" b="1"/>
-              <a:t>12- Building the Frontend Integrate Frontend with Backend (Day 64-78)</a:t>
-            </a:r>
-            <a:br>
-              <a:rPr lang="en-US" sz="3200" b="1"/>
-            </a:br>
-            <a:endParaRPr lang="ko-KR" altLang="en-US" sz="3600" b="1" dirty="0"/>
-          </a:p>
-        </p:txBody>
-      </p:sp>
-      <p:graphicFrame>
-        <p:nvGraphicFramePr>
-          <p:cNvPr id="7" name="내용 개체 틀 6"/>
-          <p:cNvGraphicFramePr>
-            <a:graphicFrameLocks noGrp="1"/>
-          </p:cNvGraphicFramePr>
-          <p:nvPr>
-            <p:ph idx="1"/>
-            <p:extLst>
-              <p:ext uri="{D42A27DB-BD31-4B8C-83A1-F6EECF244321}">
-                <p14:modId xmlns:p14="http://schemas.microsoft.com/office/powerpoint/2010/main" val="3055701146"/>
-              </p:ext>
-            </p:extLst>
-          </p:nvPr>
-        </p:nvGraphicFramePr>
-        <p:xfrm>
-          <a:off x="838200" y="1825622"/>
-          <a:ext cx="10515600" cy="4398197"/>
-        </p:xfrm>
-        <a:graphic>
-          <a:graphicData uri="http://schemas.openxmlformats.org/drawingml/2006/table">
-            <a:tbl>
-              <a:tblPr firstRow="1" bandRow="1">
-                <a:tableStyleId>{073A0DAA-6AF3-43AB-8588-CEC1D06C72B9}</a:tableStyleId>
-              </a:tblPr>
-              <a:tblGrid>
-                <a:gridCol w="5781675">
-                  <a:extLst>
-                    <a:ext uri="{9D8B030D-6E8A-4147-A177-3AD203B41FA5}">
-                      <a16:colId xmlns:a16="http://schemas.microsoft.com/office/drawing/2014/main" val="436794892"/>
-                    </a:ext>
-                  </a:extLst>
-                </a:gridCol>
-                <a:gridCol w="4733925">
-                  <a:extLst>
-                    <a:ext uri="{9D8B030D-6E8A-4147-A177-3AD203B41FA5}">
-                      <a16:colId xmlns:a16="http://schemas.microsoft.com/office/drawing/2014/main" val="2058214037"/>
-                    </a:ext>
-                  </a:extLst>
-                </a:gridCol>
-              </a:tblGrid>
-              <a:tr h="386538">
-                <a:tc>
-                  <a:txBody>
-                    <a:bodyPr/>
-                    <a:lstStyle/>
-                    <a:p>
-                      <a:pPr algn="ctr" latinLnBrk="1"/>
-                      <a:r>
-                        <a:rPr lang="ko-KR" altLang="en-US" dirty="0"/>
-                        <a:t>요소 </a:t>
-                      </a:r>
-                      <a:r>
-                        <a:rPr lang="en-US" altLang="ko-KR" dirty="0"/>
-                        <a:t>element</a:t>
-                      </a:r>
-                      <a:endParaRPr lang="ko-KR" altLang="en-US" dirty="0"/>
-                    </a:p>
-                  </a:txBody>
-                  <a:tcPr/>
-                </a:tc>
-                <a:tc>
-                  <a:txBody>
-                    <a:bodyPr/>
-                    <a:lstStyle/>
-                    <a:p>
-                      <a:pPr algn="ctr" latinLnBrk="1"/>
-                      <a:r>
-                        <a:rPr lang="ko-KR" altLang="en-US" dirty="0"/>
-                        <a:t>설명 </a:t>
-                      </a:r>
-                      <a:r>
-                        <a:rPr lang="en-US" altLang="ko-KR" dirty="0"/>
-                        <a:t>explanation</a:t>
-                      </a:r>
-                      <a:endParaRPr lang="ko-KR" altLang="en-US" dirty="0"/>
-                    </a:p>
-                  </a:txBody>
-                  <a:tcPr/>
-                </a:tc>
-                <a:extLst>
-                  <a:ext uri="{0D108BD9-81ED-4DB2-BD59-A6C34878D82A}">
-                    <a16:rowId xmlns:a16="http://schemas.microsoft.com/office/drawing/2014/main" val="3065501436"/>
-                  </a:ext>
-                </a:extLst>
-              </a:tr>
-              <a:tr h="4011659">
-                <a:tc>
-                  <a:txBody>
-                    <a:bodyPr/>
-                    <a:lstStyle/>
-                    <a:p>
-                      <a:pPr marL="457200" lvl="1" indent="0">
-                        <a:buFont typeface="Arial" panose="020B0604020202020204" pitchFamily="34" charset="0"/>
-                        <a:buNone/>
-                      </a:pPr>
-                      <a:endParaRPr lang="en-US"/>
-                    </a:p>
-                    <a:p>
-                      <a:pPr marL="285750" indent="-285750">
-                        <a:buFont typeface="Arial" panose="020B0604020202020204" pitchFamily="34" charset="0"/>
-                        <a:buChar char="•"/>
-                      </a:pPr>
-                      <a:endParaRPr lang="en-US"/>
-                    </a:p>
-                    <a:p>
-                      <a:r>
-                        <a:rPr lang="en-US" b="1"/>
-                        <a:t>12-2 Admin Dashboard:</a:t>
-                      </a:r>
-                      <a:endParaRPr lang="en-US"/>
-                    </a:p>
-                    <a:p>
-                      <a:pPr marL="742950" lvl="1" indent="-285750">
-                        <a:buFont typeface="Arial" panose="020B0604020202020204" pitchFamily="34" charset="0"/>
-                        <a:buChar char="•"/>
-                      </a:pPr>
-                      <a:r>
-                        <a:rPr lang="en-US" b="1"/>
-                        <a:t>12-2-1</a:t>
-                      </a:r>
-                      <a:r>
-                        <a:rPr lang="en-US"/>
-                        <a:t> Sidebar menu: Include sections like User Management, Transactions, Statistics.</a:t>
-                      </a:r>
-                    </a:p>
-                    <a:p>
-                      <a:pPr marL="742950" lvl="1" indent="-285750">
-                        <a:buFont typeface="Arial" panose="020B0604020202020204" pitchFamily="34" charset="0"/>
-                        <a:buChar char="•"/>
-                      </a:pPr>
-                      <a:endParaRPr lang="en-US"/>
-                    </a:p>
-                    <a:p>
-                      <a:pPr marL="742950" lvl="1" indent="-285750">
-                        <a:buFont typeface="Arial" panose="020B0604020202020204" pitchFamily="34" charset="0"/>
-                        <a:buChar char="•"/>
-                      </a:pPr>
-                      <a:r>
-                        <a:rPr lang="en-US" b="1"/>
-                        <a:t>12-2-2</a:t>
-                      </a:r>
-                      <a:r>
-                        <a:rPr lang="en-US"/>
-                        <a:t> Overview cards: Display summarized data (e.g., total users, balance, transactions).</a:t>
-                      </a:r>
-                    </a:p>
-                    <a:p>
-                      <a:pPr marL="742950" lvl="1" indent="-285750">
-                        <a:buFont typeface="Arial" panose="020B0604020202020204" pitchFamily="34" charset="0"/>
-                        <a:buChar char="•"/>
-                      </a:pPr>
-                      <a:endParaRPr lang="en-US"/>
-                    </a:p>
-                    <a:p>
-                      <a:pPr marL="742950" lvl="1" indent="-285750">
-                        <a:buFont typeface="Arial" panose="020B0604020202020204" pitchFamily="34" charset="0"/>
-                        <a:buChar char="•"/>
-                      </a:pPr>
-                      <a:r>
-                        <a:rPr lang="en-US" b="1"/>
-                        <a:t>12-2-3</a:t>
-                      </a:r>
-                      <a:r>
-                        <a:rPr lang="en-US"/>
-                        <a:t> Data tables: Show detailed lists of users and transactions.</a:t>
-                      </a:r>
-                    </a:p>
-                    <a:p>
-                      <a:pPr marL="0" indent="0" latinLnBrk="1">
-                        <a:buFontTx/>
-                        <a:buNone/>
-                      </a:pPr>
-                      <a:br>
-                        <a:rPr lang="en-US" altLang="ko-KR" baseline="0"/>
-                      </a:br>
-                      <a:endParaRPr lang="ko-KR" altLang="en-US" dirty="0"/>
-                    </a:p>
-                  </a:txBody>
-                  <a:tcPr/>
-                </a:tc>
-                <a:tc>
-                  <a:txBody>
-                    <a:bodyPr/>
-                    <a:lstStyle/>
-                    <a:p>
-                      <a:pPr marL="285750" indent="-285750" latinLnBrk="1">
-                        <a:buFontTx/>
-                        <a:buChar char="-"/>
-                      </a:pPr>
-                      <a:endParaRPr lang="en-US" altLang="ko-KR"/>
-                    </a:p>
-                    <a:p>
-                      <a:pPr marL="285750" indent="-285750" latinLnBrk="1">
-                        <a:buFontTx/>
-                        <a:buChar char="-"/>
-                      </a:pPr>
-                      <a:endParaRPr lang="en-US" altLang="ko-KR"/>
-                    </a:p>
-                  </a:txBody>
-                  <a:tcPr/>
-                </a:tc>
-                <a:extLst>
-                  <a:ext uri="{0D108BD9-81ED-4DB2-BD59-A6C34878D82A}">
-                    <a16:rowId xmlns:a16="http://schemas.microsoft.com/office/drawing/2014/main" val="1333542250"/>
-                  </a:ext>
-                </a:extLst>
-              </a:tr>
-            </a:tbl>
-          </a:graphicData>
-        </a:graphic>
-      </p:graphicFrame>
-    </p:spTree>
-    <p:extLst>
-      <p:ext uri="{BB962C8B-B14F-4D97-AF65-F5344CB8AC3E}">
-        <p14:creationId xmlns:p14="http://schemas.microsoft.com/office/powerpoint/2010/main" val="3196258819"/>
-      </p:ext>
-    </p:extLst>
-  </p:cSld>
-  <p:clrMapOvr>
-    <a:masterClrMapping/>
-  </p:clrMapOvr>
-</p:sld>
-</file>
-
-<file path=ppt/slides/slide28.xml><?xml version="1.0" encoding="utf-8"?>
-<p:sld xmlns:a="http://schemas.openxmlformats.org/drawingml/2006/main" xmlns:r="http://schemas.openxmlformats.org/officeDocument/2006/relationships" xmlns:p="http://schemas.openxmlformats.org/presentationml/2006/main">
-  <p:cSld>
-    <p:spTree>
-      <p:nvGrpSpPr>
-        <p:cNvPr id="1" name=""/>
-        <p:cNvGrpSpPr/>
-        <p:nvPr/>
-      </p:nvGrpSpPr>
-      <p:grpSpPr>
-        <a:xfrm>
-          <a:off x="0" y="0"/>
-          <a:ext cx="0" cy="0"/>
-          <a:chOff x="0" y="0"/>
-          <a:chExt cx="0" cy="0"/>
-        </a:xfrm>
-      </p:grpSpPr>
-      <p:sp>
-        <p:nvSpPr>
-          <p:cNvPr id="2" name="제목 1"/>
-          <p:cNvSpPr>
-            <a:spLocks noGrp="1"/>
-          </p:cNvSpPr>
-          <p:nvPr>
-            <p:ph type="title"/>
-          </p:nvPr>
-        </p:nvSpPr>
-        <p:spPr/>
-        <p:txBody>
-          <a:bodyPr>
-            <a:normAutofit/>
-          </a:bodyPr>
-          <a:lstStyle/>
-          <a:p>
-            <a:pPr algn="ctr"/>
-            <a:r>
-              <a:rPr lang="en-US" sz="4000" b="1"/>
-              <a:t>13- Test APIs and Frontend(Day 79-81)</a:t>
-            </a:r>
-            <a:br>
-              <a:rPr lang="en-US" sz="3200" b="1"/>
-            </a:br>
-            <a:endParaRPr lang="ko-KR" altLang="en-US" sz="3200" b="1" dirty="0"/>
-          </a:p>
-        </p:txBody>
-      </p:sp>
-      <p:graphicFrame>
-        <p:nvGraphicFramePr>
-          <p:cNvPr id="7" name="내용 개체 틀 6"/>
-          <p:cNvGraphicFramePr>
-            <a:graphicFrameLocks noGrp="1"/>
-          </p:cNvGraphicFramePr>
-          <p:nvPr>
-            <p:ph idx="1"/>
-            <p:extLst>
-              <p:ext uri="{D42A27DB-BD31-4B8C-83A1-F6EECF244321}">
-                <p14:modId xmlns:p14="http://schemas.microsoft.com/office/powerpoint/2010/main" val="2114409859"/>
-              </p:ext>
-            </p:extLst>
-          </p:nvPr>
-        </p:nvGraphicFramePr>
-        <p:xfrm>
-          <a:off x="838200" y="1825622"/>
-          <a:ext cx="10515600" cy="5415738"/>
-        </p:xfrm>
-        <a:graphic>
-          <a:graphicData uri="http://schemas.openxmlformats.org/drawingml/2006/table">
-            <a:tbl>
-              <a:tblPr firstRow="1" bandRow="1">
-                <a:tableStyleId>{073A0DAA-6AF3-43AB-8588-CEC1D06C72B9}</a:tableStyleId>
-              </a:tblPr>
-              <a:tblGrid>
-                <a:gridCol w="5257800">
-                  <a:extLst>
-                    <a:ext uri="{9D8B030D-6E8A-4147-A177-3AD203B41FA5}">
-                      <a16:colId xmlns:a16="http://schemas.microsoft.com/office/drawing/2014/main" val="436794892"/>
-                    </a:ext>
-                  </a:extLst>
-                </a:gridCol>
-                <a:gridCol w="5257800">
-                  <a:extLst>
-                    <a:ext uri="{9D8B030D-6E8A-4147-A177-3AD203B41FA5}">
-                      <a16:colId xmlns:a16="http://schemas.microsoft.com/office/drawing/2014/main" val="2058214037"/>
-                    </a:ext>
-                  </a:extLst>
-                </a:gridCol>
-              </a:tblGrid>
-              <a:tr h="386538">
-                <a:tc>
-                  <a:txBody>
-                    <a:bodyPr/>
-                    <a:lstStyle/>
-                    <a:p>
-                      <a:pPr algn="ctr" latinLnBrk="1"/>
-                      <a:r>
-                        <a:rPr lang="ko-KR" altLang="en-US" dirty="0"/>
-                        <a:t>요소 </a:t>
-                      </a:r>
-                      <a:r>
-                        <a:rPr lang="en-US" altLang="ko-KR" dirty="0"/>
-                        <a:t>element</a:t>
-                      </a:r>
-                      <a:endParaRPr lang="ko-KR" altLang="en-US" dirty="0"/>
-                    </a:p>
-                  </a:txBody>
-                  <a:tcPr/>
-                </a:tc>
-                <a:tc>
-                  <a:txBody>
-                    <a:bodyPr/>
-                    <a:lstStyle/>
-                    <a:p>
-                      <a:pPr algn="ctr" latinLnBrk="1"/>
-                      <a:r>
-                        <a:rPr lang="ko-KR" altLang="en-US" dirty="0"/>
-                        <a:t>설명 </a:t>
-                      </a:r>
-                      <a:r>
-                        <a:rPr lang="en-US" altLang="ko-KR" dirty="0"/>
-                        <a:t>explanation</a:t>
-                      </a:r>
-                      <a:endParaRPr lang="ko-KR" altLang="en-US" dirty="0"/>
-                    </a:p>
-                  </a:txBody>
-                  <a:tcPr/>
-                </a:tc>
-                <a:extLst>
-                  <a:ext uri="{0D108BD9-81ED-4DB2-BD59-A6C34878D82A}">
-                    <a16:rowId xmlns:a16="http://schemas.microsoft.com/office/drawing/2014/main" val="3065501436"/>
-                  </a:ext>
-                </a:extLst>
-              </a:tr>
-              <a:tr h="4011659">
-                <a:tc>
-                  <a:txBody>
-                    <a:bodyPr/>
-                    <a:lstStyle/>
-                    <a:p>
-                      <a:r>
-                        <a:rPr lang="en-US" sz="1800" b="1"/>
-                        <a:t>13</a:t>
-                      </a:r>
-                      <a:r>
-                        <a:rPr lang="en-US" b="1"/>
-                        <a:t>-1- Test APIs:</a:t>
-                      </a:r>
-                      <a:endParaRPr lang="en-US"/>
-                    </a:p>
-                    <a:p>
-                      <a:pPr marL="742950" lvl="1" indent="-285750">
-                        <a:buFont typeface="Arial" panose="020B0604020202020204" pitchFamily="34" charset="0"/>
-                        <a:buChar char="•"/>
-                      </a:pPr>
-                      <a:r>
-                        <a:rPr lang="en-US" b="1"/>
-                        <a:t>13-1-1 </a:t>
-                      </a:r>
-                      <a:r>
-                        <a:rPr lang="en-US"/>
-                        <a:t>Use </a:t>
-                      </a:r>
-                      <a:r>
-                        <a:rPr lang="en-US" b="1"/>
-                        <a:t>Postman</a:t>
-                      </a:r>
-                      <a:r>
-                        <a:rPr lang="en-US"/>
-                        <a:t> to test all endpoints (Login, User, Transaction, Dashboard).</a:t>
-                      </a:r>
-                    </a:p>
-                    <a:p>
-                      <a:pPr marL="742950" lvl="1" indent="-285750">
-                        <a:buFont typeface="Arial" panose="020B0604020202020204" pitchFamily="34" charset="0"/>
-                        <a:buChar char="•"/>
-                      </a:pPr>
-                      <a:r>
-                        <a:rPr lang="en-US" b="1"/>
-                        <a:t>13-1-2</a:t>
-                      </a:r>
-                      <a:r>
-                        <a:rPr lang="en-US"/>
-                        <a:t> Verify role-based access with Spring Security (admin, user, etc.).</a:t>
-                      </a:r>
-                    </a:p>
-                    <a:p>
-                      <a:pPr marL="742950" lvl="1" indent="-285750">
-                        <a:buFont typeface="Arial" panose="020B0604020202020204" pitchFamily="34" charset="0"/>
-                        <a:buChar char="•"/>
-                      </a:pPr>
-                      <a:endParaRPr lang="en-US"/>
-                    </a:p>
-                    <a:p>
-                      <a:r>
-                        <a:rPr lang="en-US" b="1"/>
-                        <a:t>13-2- Test Frontend:</a:t>
-                      </a:r>
-                      <a:endParaRPr lang="en-US"/>
-                    </a:p>
-                    <a:p>
-                      <a:pPr marL="742950" lvl="1" indent="-285750">
-                        <a:buFont typeface="Arial" panose="020B0604020202020204" pitchFamily="34" charset="0"/>
-                        <a:buChar char="•"/>
-                      </a:pPr>
-                      <a:r>
-                        <a:rPr lang="en-US" b="1"/>
-                        <a:t>7-2-1</a:t>
-                      </a:r>
-                      <a:r>
-                        <a:rPr lang="en-US"/>
-                        <a:t> Ensure UI properly displays data fetched from the APIs.</a:t>
-                      </a:r>
-                    </a:p>
-                    <a:p>
-                      <a:pPr marL="742950" lvl="1" indent="-285750">
-                        <a:buFont typeface="Arial" panose="020B0604020202020204" pitchFamily="34" charset="0"/>
-                        <a:buChar char="•"/>
-                      </a:pPr>
-                      <a:r>
-                        <a:rPr lang="en-US" b="1"/>
-                        <a:t>13-2-2</a:t>
-                      </a:r>
-                      <a:r>
-                        <a:rPr lang="en-US"/>
-                        <a:t> Handle errors such as expired JWT tokens.</a:t>
-                      </a:r>
-                    </a:p>
-                    <a:p>
-                      <a:pPr marL="742950" lvl="1" indent="-285750">
-                        <a:buFont typeface="Arial" panose="020B0604020202020204" pitchFamily="34" charset="0"/>
-                        <a:buChar char="•"/>
-                      </a:pPr>
-                      <a:endParaRPr lang="en-US"/>
-                    </a:p>
-                    <a:p>
-                      <a:r>
-                        <a:rPr lang="en-US" b="1"/>
-                        <a:t>13-3- API Performance Optimization:</a:t>
-                      </a:r>
-                      <a:endParaRPr lang="en-US"/>
-                    </a:p>
-                    <a:p>
-                      <a:pPr marL="742950" lvl="1" indent="-285750">
-                        <a:buFont typeface="Arial" panose="020B0604020202020204" pitchFamily="34" charset="0"/>
-                        <a:buChar char="•"/>
-                      </a:pPr>
-                      <a:r>
-                        <a:rPr lang="en-US" b="1"/>
-                        <a:t>13-3-1</a:t>
-                      </a:r>
-                      <a:r>
-                        <a:rPr lang="en-US"/>
-                        <a:t> Optimize JPA queries.</a:t>
-                      </a:r>
-                    </a:p>
-                    <a:p>
-                      <a:pPr marL="742950" lvl="1" indent="-285750">
-                        <a:buFont typeface="Arial" panose="020B0604020202020204" pitchFamily="34" charset="0"/>
-                        <a:buChar char="•"/>
-                      </a:pPr>
-                      <a:r>
-                        <a:rPr lang="en-US" b="1"/>
-                        <a:t>13-3-2</a:t>
-                      </a:r>
-                      <a:r>
-                        <a:rPr lang="en-US"/>
-                        <a:t> Use caching if required.</a:t>
-                      </a:r>
-                    </a:p>
-                    <a:p>
-                      <a:pPr marL="457200" lvl="1" indent="0">
-                        <a:buFont typeface="Arial" panose="020B0604020202020204" pitchFamily="34" charset="0"/>
-                        <a:buNone/>
-                      </a:pPr>
-                      <a:endParaRPr lang="en-US"/>
-                    </a:p>
-                    <a:p>
-                      <a:pPr marL="0" indent="0" latinLnBrk="1">
-                        <a:buFontTx/>
-                        <a:buNone/>
-                      </a:pPr>
-                      <a:br>
-                        <a:rPr lang="en-US" altLang="ko-KR" baseline="0"/>
-                      </a:br>
-                      <a:endParaRPr lang="ko-KR" altLang="en-US" dirty="0"/>
-                    </a:p>
-                  </a:txBody>
-                  <a:tcPr/>
-                </a:tc>
-                <a:tc>
-                  <a:txBody>
-                    <a:bodyPr/>
-                    <a:lstStyle/>
-                    <a:p>
-                      <a:pPr marL="285750" indent="-285750" latinLnBrk="1">
-                        <a:buFontTx/>
-                        <a:buChar char="-"/>
-                      </a:pPr>
-                      <a:endParaRPr lang="en-US" altLang="ko-KR"/>
-                    </a:p>
-                    <a:p>
-                      <a:pPr marL="285750" indent="-285750" latinLnBrk="1">
-                        <a:buFontTx/>
-                        <a:buChar char="-"/>
-                      </a:pPr>
-                      <a:endParaRPr lang="en-US" altLang="ko-KR"/>
-                    </a:p>
-                  </a:txBody>
-                  <a:tcPr/>
-                </a:tc>
-                <a:extLst>
-                  <a:ext uri="{0D108BD9-81ED-4DB2-BD59-A6C34878D82A}">
-                    <a16:rowId xmlns:a16="http://schemas.microsoft.com/office/drawing/2014/main" val="1333542250"/>
-                  </a:ext>
-                </a:extLst>
-              </a:tr>
-            </a:tbl>
-          </a:graphicData>
-        </a:graphic>
-      </p:graphicFrame>
-    </p:spTree>
-    <p:extLst>
-      <p:ext uri="{BB962C8B-B14F-4D97-AF65-F5344CB8AC3E}">
-        <p14:creationId xmlns:p14="http://schemas.microsoft.com/office/powerpoint/2010/main" val="3010800604"/>
       </p:ext>
     </p:extLst>
   </p:cSld>
@@ -9377,6 +9717,609 @@
 </p:sld>
 </file>
 
+<file path=ppt/slides/slide30.xml><?xml version="1.0" encoding="utf-8"?>
+<p:sld xmlns:a="http://schemas.openxmlformats.org/drawingml/2006/main" xmlns:r="http://schemas.openxmlformats.org/officeDocument/2006/relationships" xmlns:p="http://schemas.openxmlformats.org/presentationml/2006/main">
+  <p:cSld>
+    <p:spTree>
+      <p:nvGrpSpPr>
+        <p:cNvPr id="1" name=""/>
+        <p:cNvGrpSpPr/>
+        <p:nvPr/>
+      </p:nvGrpSpPr>
+      <p:grpSpPr>
+        <a:xfrm>
+          <a:off x="0" y="0"/>
+          <a:ext cx="0" cy="0"/>
+          <a:chOff x="0" y="0"/>
+          <a:chExt cx="0" cy="0"/>
+        </a:xfrm>
+      </p:grpSpPr>
+      <p:sp>
+        <p:nvSpPr>
+          <p:cNvPr id="2" name="제목 1"/>
+          <p:cNvSpPr>
+            <a:spLocks noGrp="1"/>
+          </p:cNvSpPr>
+          <p:nvPr>
+            <p:ph type="title"/>
+          </p:nvPr>
+        </p:nvSpPr>
+        <p:spPr/>
+        <p:txBody>
+          <a:bodyPr>
+            <a:normAutofit fontScale="90000"/>
+          </a:bodyPr>
+          <a:lstStyle/>
+          <a:p>
+            <a:pPr algn="ctr"/>
+            <a:r>
+              <a:rPr lang="en-US" sz="4000" b="1"/>
+              <a:t>12- Building the Frontend Integrate Frontend with Backend (Day 81-86)</a:t>
+            </a:r>
+            <a:br>
+              <a:rPr lang="en-US" sz="3200" b="1"/>
+            </a:br>
+            <a:endParaRPr lang="ko-KR" altLang="en-US" sz="3600" b="1" dirty="0"/>
+          </a:p>
+        </p:txBody>
+      </p:sp>
+      <p:graphicFrame>
+        <p:nvGraphicFramePr>
+          <p:cNvPr id="7" name="내용 개체 틀 6"/>
+          <p:cNvGraphicFramePr>
+            <a:graphicFrameLocks noGrp="1"/>
+          </p:cNvGraphicFramePr>
+          <p:nvPr>
+            <p:ph idx="1"/>
+            <p:extLst>
+              <p:ext uri="{D42A27DB-BD31-4B8C-83A1-F6EECF244321}">
+                <p14:modId xmlns:p14="http://schemas.microsoft.com/office/powerpoint/2010/main" val="3055701146"/>
+              </p:ext>
+            </p:extLst>
+          </p:nvPr>
+        </p:nvGraphicFramePr>
+        <p:xfrm>
+          <a:off x="838200" y="1825622"/>
+          <a:ext cx="10515600" cy="4398197"/>
+        </p:xfrm>
+        <a:graphic>
+          <a:graphicData uri="http://schemas.openxmlformats.org/drawingml/2006/table">
+            <a:tbl>
+              <a:tblPr firstRow="1" bandRow="1">
+                <a:tableStyleId>{073A0DAA-6AF3-43AB-8588-CEC1D06C72B9}</a:tableStyleId>
+              </a:tblPr>
+              <a:tblGrid>
+                <a:gridCol w="5781675">
+                  <a:extLst>
+                    <a:ext uri="{9D8B030D-6E8A-4147-A177-3AD203B41FA5}">
+                      <a16:colId xmlns:a16="http://schemas.microsoft.com/office/drawing/2014/main" val="436794892"/>
+                    </a:ext>
+                  </a:extLst>
+                </a:gridCol>
+                <a:gridCol w="4733925">
+                  <a:extLst>
+                    <a:ext uri="{9D8B030D-6E8A-4147-A177-3AD203B41FA5}">
+                      <a16:colId xmlns:a16="http://schemas.microsoft.com/office/drawing/2014/main" val="2058214037"/>
+                    </a:ext>
+                  </a:extLst>
+                </a:gridCol>
+              </a:tblGrid>
+              <a:tr h="386538">
+                <a:tc>
+                  <a:txBody>
+                    <a:bodyPr/>
+                    <a:lstStyle/>
+                    <a:p>
+                      <a:pPr algn="ctr" latinLnBrk="1"/>
+                      <a:r>
+                        <a:rPr lang="ko-KR" altLang="en-US" dirty="0"/>
+                        <a:t>요소 </a:t>
+                      </a:r>
+                      <a:r>
+                        <a:rPr lang="en-US" altLang="ko-KR" dirty="0"/>
+                        <a:t>element</a:t>
+                      </a:r>
+                      <a:endParaRPr lang="ko-KR" altLang="en-US" dirty="0"/>
+                    </a:p>
+                  </a:txBody>
+                  <a:tcPr/>
+                </a:tc>
+                <a:tc>
+                  <a:txBody>
+                    <a:bodyPr/>
+                    <a:lstStyle/>
+                    <a:p>
+                      <a:pPr algn="ctr" latinLnBrk="1"/>
+                      <a:r>
+                        <a:rPr lang="ko-KR" altLang="en-US" dirty="0"/>
+                        <a:t>설명 </a:t>
+                      </a:r>
+                      <a:r>
+                        <a:rPr lang="en-US" altLang="ko-KR" dirty="0"/>
+                        <a:t>explanation</a:t>
+                      </a:r>
+                      <a:endParaRPr lang="ko-KR" altLang="en-US" dirty="0"/>
+                    </a:p>
+                  </a:txBody>
+                  <a:tcPr/>
+                </a:tc>
+                <a:extLst>
+                  <a:ext uri="{0D108BD9-81ED-4DB2-BD59-A6C34878D82A}">
+                    <a16:rowId xmlns:a16="http://schemas.microsoft.com/office/drawing/2014/main" val="3065501436"/>
+                  </a:ext>
+                </a:extLst>
+              </a:tr>
+              <a:tr h="4011659">
+                <a:tc>
+                  <a:txBody>
+                    <a:bodyPr/>
+                    <a:lstStyle/>
+                    <a:p>
+                      <a:pPr marL="457200" lvl="1" indent="0">
+                        <a:buFont typeface="Arial" panose="020B0604020202020204" pitchFamily="34" charset="0"/>
+                        <a:buNone/>
+                      </a:pPr>
+                      <a:endParaRPr lang="en-US"/>
+                    </a:p>
+                    <a:p>
+                      <a:pPr marL="285750" indent="-285750">
+                        <a:buFont typeface="Arial" panose="020B0604020202020204" pitchFamily="34" charset="0"/>
+                        <a:buChar char="•"/>
+                      </a:pPr>
+                      <a:endParaRPr lang="en-US"/>
+                    </a:p>
+                    <a:p>
+                      <a:r>
+                        <a:rPr lang="en-US" b="1"/>
+                        <a:t>12-2 Admin Dashboard:</a:t>
+                      </a:r>
+                      <a:endParaRPr lang="en-US"/>
+                    </a:p>
+                    <a:p>
+                      <a:pPr marL="742950" lvl="1" indent="-285750">
+                        <a:buFont typeface="Arial" panose="020B0604020202020204" pitchFamily="34" charset="0"/>
+                        <a:buChar char="•"/>
+                      </a:pPr>
+                      <a:r>
+                        <a:rPr lang="en-US" b="1"/>
+                        <a:t>12-2-1</a:t>
+                      </a:r>
+                      <a:r>
+                        <a:rPr lang="en-US"/>
+                        <a:t> Sidebar menu: Include sections like User Management, Transactions, Statistics.</a:t>
+                      </a:r>
+                    </a:p>
+                    <a:p>
+                      <a:pPr marL="742950" lvl="1" indent="-285750">
+                        <a:buFont typeface="Arial" panose="020B0604020202020204" pitchFamily="34" charset="0"/>
+                        <a:buChar char="•"/>
+                      </a:pPr>
+                      <a:endParaRPr lang="en-US"/>
+                    </a:p>
+                    <a:p>
+                      <a:pPr marL="742950" lvl="1" indent="-285750">
+                        <a:buFont typeface="Arial" panose="020B0604020202020204" pitchFamily="34" charset="0"/>
+                        <a:buChar char="•"/>
+                      </a:pPr>
+                      <a:r>
+                        <a:rPr lang="en-US" b="1"/>
+                        <a:t>12-2-2</a:t>
+                      </a:r>
+                      <a:r>
+                        <a:rPr lang="en-US"/>
+                        <a:t> Overview cards: Display summarized data (e.g., total users, balance, transactions).</a:t>
+                      </a:r>
+                    </a:p>
+                    <a:p>
+                      <a:pPr marL="742950" lvl="1" indent="-285750">
+                        <a:buFont typeface="Arial" panose="020B0604020202020204" pitchFamily="34" charset="0"/>
+                        <a:buChar char="•"/>
+                      </a:pPr>
+                      <a:endParaRPr lang="en-US"/>
+                    </a:p>
+                    <a:p>
+                      <a:pPr marL="742950" lvl="1" indent="-285750">
+                        <a:buFont typeface="Arial" panose="020B0604020202020204" pitchFamily="34" charset="0"/>
+                        <a:buChar char="•"/>
+                      </a:pPr>
+                      <a:r>
+                        <a:rPr lang="en-US" b="1"/>
+                        <a:t>12-2-3</a:t>
+                      </a:r>
+                      <a:r>
+                        <a:rPr lang="en-US"/>
+                        <a:t> Data tables: Show detailed lists of users and transactions.</a:t>
+                      </a:r>
+                    </a:p>
+                    <a:p>
+                      <a:pPr marL="0" indent="0" latinLnBrk="1">
+                        <a:buFontTx/>
+                        <a:buNone/>
+                      </a:pPr>
+                      <a:br>
+                        <a:rPr lang="en-US" altLang="ko-KR" baseline="0"/>
+                      </a:br>
+                      <a:endParaRPr lang="ko-KR" altLang="en-US" dirty="0"/>
+                    </a:p>
+                  </a:txBody>
+                  <a:tcPr/>
+                </a:tc>
+                <a:tc>
+                  <a:txBody>
+                    <a:bodyPr/>
+                    <a:lstStyle/>
+                    <a:p>
+                      <a:pPr marL="285750" indent="-285750" latinLnBrk="1">
+                        <a:buFontTx/>
+                        <a:buChar char="-"/>
+                      </a:pPr>
+                      <a:endParaRPr lang="en-US" altLang="ko-KR"/>
+                    </a:p>
+                    <a:p>
+                      <a:pPr marL="285750" indent="-285750" latinLnBrk="1">
+                        <a:buFontTx/>
+                        <a:buChar char="-"/>
+                      </a:pPr>
+                      <a:endParaRPr lang="en-US" altLang="ko-KR"/>
+                    </a:p>
+                  </a:txBody>
+                  <a:tcPr/>
+                </a:tc>
+                <a:extLst>
+                  <a:ext uri="{0D108BD9-81ED-4DB2-BD59-A6C34878D82A}">
+                    <a16:rowId xmlns:a16="http://schemas.microsoft.com/office/drawing/2014/main" val="1333542250"/>
+                  </a:ext>
+                </a:extLst>
+              </a:tr>
+            </a:tbl>
+          </a:graphicData>
+        </a:graphic>
+      </p:graphicFrame>
+    </p:spTree>
+    <p:extLst>
+      <p:ext uri="{BB962C8B-B14F-4D97-AF65-F5344CB8AC3E}">
+        <p14:creationId xmlns:p14="http://schemas.microsoft.com/office/powerpoint/2010/main" val="3196258819"/>
+      </p:ext>
+    </p:extLst>
+  </p:cSld>
+  <p:clrMapOvr>
+    <a:masterClrMapping/>
+  </p:clrMapOvr>
+</p:sld>
+</file>
+
+<file path=ppt/slides/slide31.xml><?xml version="1.0" encoding="utf-8"?>
+<p:sld xmlns:a="http://schemas.openxmlformats.org/drawingml/2006/main" xmlns:r="http://schemas.openxmlformats.org/officeDocument/2006/relationships" xmlns:p="http://schemas.openxmlformats.org/presentationml/2006/main">
+  <p:cSld>
+    <p:spTree>
+      <p:nvGrpSpPr>
+        <p:cNvPr id="1" name=""/>
+        <p:cNvGrpSpPr/>
+        <p:nvPr/>
+      </p:nvGrpSpPr>
+      <p:grpSpPr>
+        <a:xfrm>
+          <a:off x="0" y="0"/>
+          <a:ext cx="0" cy="0"/>
+          <a:chOff x="0" y="0"/>
+          <a:chExt cx="0" cy="0"/>
+        </a:xfrm>
+      </p:grpSpPr>
+      <p:sp>
+        <p:nvSpPr>
+          <p:cNvPr id="2" name="제목 1"/>
+          <p:cNvSpPr>
+            <a:spLocks noGrp="1"/>
+          </p:cNvSpPr>
+          <p:nvPr>
+            <p:ph type="title"/>
+          </p:nvPr>
+        </p:nvSpPr>
+        <p:spPr/>
+        <p:txBody>
+          <a:bodyPr>
+            <a:normAutofit/>
+          </a:bodyPr>
+          <a:lstStyle/>
+          <a:p>
+            <a:pPr algn="ctr"/>
+            <a:r>
+              <a:rPr lang="en-US" sz="4000" b="1"/>
+              <a:t>13- Test APIs and Frontend(Day 87-90)</a:t>
+            </a:r>
+            <a:br>
+              <a:rPr lang="en-US" sz="3200" b="1"/>
+            </a:br>
+            <a:endParaRPr lang="ko-KR" altLang="en-US" sz="3200" b="1" dirty="0"/>
+          </a:p>
+        </p:txBody>
+      </p:sp>
+      <p:graphicFrame>
+        <p:nvGraphicFramePr>
+          <p:cNvPr id="7" name="내용 개체 틀 6"/>
+          <p:cNvGraphicFramePr>
+            <a:graphicFrameLocks noGrp="1"/>
+          </p:cNvGraphicFramePr>
+          <p:nvPr>
+            <p:ph idx="1"/>
+            <p:extLst>
+              <p:ext uri="{D42A27DB-BD31-4B8C-83A1-F6EECF244321}">
+                <p14:modId xmlns:p14="http://schemas.microsoft.com/office/powerpoint/2010/main" val="2114409859"/>
+              </p:ext>
+            </p:extLst>
+          </p:nvPr>
+        </p:nvGraphicFramePr>
+        <p:xfrm>
+          <a:off x="838200" y="1825622"/>
+          <a:ext cx="10515600" cy="5415738"/>
+        </p:xfrm>
+        <a:graphic>
+          <a:graphicData uri="http://schemas.openxmlformats.org/drawingml/2006/table">
+            <a:tbl>
+              <a:tblPr firstRow="1" bandRow="1">
+                <a:tableStyleId>{073A0DAA-6AF3-43AB-8588-CEC1D06C72B9}</a:tableStyleId>
+              </a:tblPr>
+              <a:tblGrid>
+                <a:gridCol w="5257800">
+                  <a:extLst>
+                    <a:ext uri="{9D8B030D-6E8A-4147-A177-3AD203B41FA5}">
+                      <a16:colId xmlns:a16="http://schemas.microsoft.com/office/drawing/2014/main" val="436794892"/>
+                    </a:ext>
+                  </a:extLst>
+                </a:gridCol>
+                <a:gridCol w="5257800">
+                  <a:extLst>
+                    <a:ext uri="{9D8B030D-6E8A-4147-A177-3AD203B41FA5}">
+                      <a16:colId xmlns:a16="http://schemas.microsoft.com/office/drawing/2014/main" val="2058214037"/>
+                    </a:ext>
+                  </a:extLst>
+                </a:gridCol>
+              </a:tblGrid>
+              <a:tr h="386538">
+                <a:tc>
+                  <a:txBody>
+                    <a:bodyPr/>
+                    <a:lstStyle/>
+                    <a:p>
+                      <a:pPr algn="ctr" latinLnBrk="1"/>
+                      <a:r>
+                        <a:rPr lang="ko-KR" altLang="en-US" dirty="0"/>
+                        <a:t>요소 </a:t>
+                      </a:r>
+                      <a:r>
+                        <a:rPr lang="en-US" altLang="ko-KR" dirty="0"/>
+                        <a:t>element</a:t>
+                      </a:r>
+                      <a:endParaRPr lang="ko-KR" altLang="en-US" dirty="0"/>
+                    </a:p>
+                  </a:txBody>
+                  <a:tcPr/>
+                </a:tc>
+                <a:tc>
+                  <a:txBody>
+                    <a:bodyPr/>
+                    <a:lstStyle/>
+                    <a:p>
+                      <a:pPr algn="ctr" latinLnBrk="1"/>
+                      <a:r>
+                        <a:rPr lang="ko-KR" altLang="en-US" dirty="0"/>
+                        <a:t>설명 </a:t>
+                      </a:r>
+                      <a:r>
+                        <a:rPr lang="en-US" altLang="ko-KR" dirty="0"/>
+                        <a:t>explanation</a:t>
+                      </a:r>
+                      <a:endParaRPr lang="ko-KR" altLang="en-US" dirty="0"/>
+                    </a:p>
+                  </a:txBody>
+                  <a:tcPr/>
+                </a:tc>
+                <a:extLst>
+                  <a:ext uri="{0D108BD9-81ED-4DB2-BD59-A6C34878D82A}">
+                    <a16:rowId xmlns:a16="http://schemas.microsoft.com/office/drawing/2014/main" val="3065501436"/>
+                  </a:ext>
+                </a:extLst>
+              </a:tr>
+              <a:tr h="4011659">
+                <a:tc>
+                  <a:txBody>
+                    <a:bodyPr/>
+                    <a:lstStyle/>
+                    <a:p>
+                      <a:r>
+                        <a:rPr lang="en-US" sz="1800" b="1"/>
+                        <a:t>13</a:t>
+                      </a:r>
+                      <a:r>
+                        <a:rPr lang="en-US" b="1"/>
+                        <a:t>-1- Test APIs:</a:t>
+                      </a:r>
+                      <a:endParaRPr lang="en-US"/>
+                    </a:p>
+                    <a:p>
+                      <a:pPr marL="742950" lvl="1" indent="-285750">
+                        <a:buFont typeface="Arial" panose="020B0604020202020204" pitchFamily="34" charset="0"/>
+                        <a:buChar char="•"/>
+                      </a:pPr>
+                      <a:r>
+                        <a:rPr lang="en-US" b="1"/>
+                        <a:t>13-1-1 </a:t>
+                      </a:r>
+                      <a:r>
+                        <a:rPr lang="en-US"/>
+                        <a:t>Use </a:t>
+                      </a:r>
+                      <a:r>
+                        <a:rPr lang="en-US" b="1"/>
+                        <a:t>Postman</a:t>
+                      </a:r>
+                      <a:r>
+                        <a:rPr lang="en-US"/>
+                        <a:t> to test all endpoints (Login, User, Transaction, Dashboard).</a:t>
+                      </a:r>
+                    </a:p>
+                    <a:p>
+                      <a:pPr marL="742950" lvl="1" indent="-285750">
+                        <a:buFont typeface="Arial" panose="020B0604020202020204" pitchFamily="34" charset="0"/>
+                        <a:buChar char="•"/>
+                      </a:pPr>
+                      <a:r>
+                        <a:rPr lang="en-US" b="1"/>
+                        <a:t>13-1-2</a:t>
+                      </a:r>
+                      <a:r>
+                        <a:rPr lang="en-US"/>
+                        <a:t> Verify role-based access with Spring Security (admin, user, etc.).</a:t>
+                      </a:r>
+                    </a:p>
+                    <a:p>
+                      <a:pPr marL="742950" lvl="1" indent="-285750">
+                        <a:buFont typeface="Arial" panose="020B0604020202020204" pitchFamily="34" charset="0"/>
+                        <a:buChar char="•"/>
+                      </a:pPr>
+                      <a:endParaRPr lang="en-US"/>
+                    </a:p>
+                    <a:p>
+                      <a:r>
+                        <a:rPr lang="en-US" b="1"/>
+                        <a:t>13-2- Test Frontend:</a:t>
+                      </a:r>
+                      <a:endParaRPr lang="en-US"/>
+                    </a:p>
+                    <a:p>
+                      <a:pPr marL="742950" lvl="1" indent="-285750">
+                        <a:buFont typeface="Arial" panose="020B0604020202020204" pitchFamily="34" charset="0"/>
+                        <a:buChar char="•"/>
+                      </a:pPr>
+                      <a:r>
+                        <a:rPr lang="en-US" b="1"/>
+                        <a:t>7-2-1</a:t>
+                      </a:r>
+                      <a:r>
+                        <a:rPr lang="en-US"/>
+                        <a:t> Ensure UI properly displays data fetched from the APIs.</a:t>
+                      </a:r>
+                    </a:p>
+                    <a:p>
+                      <a:pPr marL="742950" lvl="1" indent="-285750">
+                        <a:buFont typeface="Arial" panose="020B0604020202020204" pitchFamily="34" charset="0"/>
+                        <a:buChar char="•"/>
+                      </a:pPr>
+                      <a:r>
+                        <a:rPr lang="en-US" b="1"/>
+                        <a:t>13-2-2</a:t>
+                      </a:r>
+                      <a:r>
+                        <a:rPr lang="en-US"/>
+                        <a:t> Handle errors such as expired JWT tokens.</a:t>
+                      </a:r>
+                    </a:p>
+                    <a:p>
+                      <a:pPr marL="742950" lvl="1" indent="-285750">
+                        <a:buFont typeface="Arial" panose="020B0604020202020204" pitchFamily="34" charset="0"/>
+                        <a:buChar char="•"/>
+                      </a:pPr>
+                      <a:endParaRPr lang="en-US"/>
+                    </a:p>
+                    <a:p>
+                      <a:r>
+                        <a:rPr lang="en-US" b="1"/>
+                        <a:t>13-3- API Performance Optimization:</a:t>
+                      </a:r>
+                      <a:endParaRPr lang="en-US"/>
+                    </a:p>
+                    <a:p>
+                      <a:pPr marL="742950" lvl="1" indent="-285750">
+                        <a:buFont typeface="Arial" panose="020B0604020202020204" pitchFamily="34" charset="0"/>
+                        <a:buChar char="•"/>
+                      </a:pPr>
+                      <a:r>
+                        <a:rPr lang="en-US" b="1"/>
+                        <a:t>13-3-1</a:t>
+                      </a:r>
+                      <a:r>
+                        <a:rPr lang="en-US"/>
+                        <a:t> Optimize JPA queries.</a:t>
+                      </a:r>
+                    </a:p>
+                    <a:p>
+                      <a:pPr marL="742950" lvl="1" indent="-285750">
+                        <a:buFont typeface="Arial" panose="020B0604020202020204" pitchFamily="34" charset="0"/>
+                        <a:buChar char="•"/>
+                      </a:pPr>
+                      <a:r>
+                        <a:rPr lang="en-US" b="1"/>
+                        <a:t>13-3-2</a:t>
+                      </a:r>
+                      <a:r>
+                        <a:rPr lang="en-US"/>
+                        <a:t> Use caching if required.</a:t>
+                      </a:r>
+                    </a:p>
+                    <a:p>
+                      <a:pPr marL="457200" lvl="1" indent="0">
+                        <a:buFont typeface="Arial" panose="020B0604020202020204" pitchFamily="34" charset="0"/>
+                        <a:buNone/>
+                      </a:pPr>
+                      <a:endParaRPr lang="en-US"/>
+                    </a:p>
+                    <a:p>
+                      <a:pPr marL="0" indent="0" latinLnBrk="1">
+                        <a:buFontTx/>
+                        <a:buNone/>
+                      </a:pPr>
+                      <a:br>
+                        <a:rPr lang="en-US" altLang="ko-KR" baseline="0"/>
+                      </a:br>
+                      <a:endParaRPr lang="ko-KR" altLang="en-US" dirty="0"/>
+                    </a:p>
+                  </a:txBody>
+                  <a:tcPr/>
+                </a:tc>
+                <a:tc>
+                  <a:txBody>
+                    <a:bodyPr/>
+                    <a:lstStyle/>
+                    <a:p>
+                      <a:pPr marL="285750" indent="-285750" latinLnBrk="1">
+                        <a:buFontTx/>
+                        <a:buChar char="-"/>
+                      </a:pPr>
+                      <a:endParaRPr lang="en-US" altLang="ko-KR"/>
+                    </a:p>
+                    <a:p>
+                      <a:pPr marL="285750" indent="-285750" latinLnBrk="1">
+                        <a:buFontTx/>
+                        <a:buChar char="-"/>
+                      </a:pPr>
+                      <a:endParaRPr lang="en-US" altLang="ko-KR"/>
+                    </a:p>
+                  </a:txBody>
+                  <a:tcPr/>
+                </a:tc>
+                <a:extLst>
+                  <a:ext uri="{0D108BD9-81ED-4DB2-BD59-A6C34878D82A}">
+                    <a16:rowId xmlns:a16="http://schemas.microsoft.com/office/drawing/2014/main" val="1333542250"/>
+                  </a:ext>
+                </a:extLst>
+              </a:tr>
+            </a:tbl>
+          </a:graphicData>
+        </a:graphic>
+      </p:graphicFrame>
+    </p:spTree>
+    <p:extLst>
+      <p:ext uri="{BB962C8B-B14F-4D97-AF65-F5344CB8AC3E}">
+        <p14:creationId xmlns:p14="http://schemas.microsoft.com/office/powerpoint/2010/main" val="3010800604"/>
+      </p:ext>
+    </p:extLst>
+  </p:cSld>
+  <p:clrMapOvr>
+    <a:masterClrMapping/>
+  </p:clrMapOvr>
+</p:sld>
+</file>
+
 <file path=ppt/slides/slide4.xml><?xml version="1.0" encoding="utf-8"?>
 <p:sld xmlns:a="http://schemas.openxmlformats.org/drawingml/2006/main" xmlns:r="http://schemas.openxmlformats.org/officeDocument/2006/relationships" xmlns:p="http://schemas.openxmlformats.org/presentationml/2006/main">
   <p:cSld>
@@ -10004,7 +10947,7 @@
             <a:pPr algn="ctr"/>
             <a:r>
               <a:rPr lang="en-US" sz="4000" b="1"/>
-              <a:t>4- Build Membership Management APIs (Day 9-16)</a:t>
+              <a:t>4- Build Membership Management APIs (Day 9-20)</a:t>
             </a:r>
             <a:br>
               <a:rPr lang="en-US" sz="3200" b="1"/>
@@ -10023,14 +10966,14 @@
             <p:ph idx="1"/>
             <p:extLst>
               <p:ext uri="{D42A27DB-BD31-4B8C-83A1-F6EECF244321}">
-                <p14:modId xmlns:p14="http://schemas.microsoft.com/office/powerpoint/2010/main" val="1554785895"/>
+                <p14:modId xmlns:p14="http://schemas.microsoft.com/office/powerpoint/2010/main" val="651774847"/>
               </p:ext>
             </p:extLst>
           </p:nvPr>
         </p:nvGraphicFramePr>
         <p:xfrm>
           <a:off x="838200" y="1590675"/>
-          <a:ext cx="10515600" cy="5394960"/>
+          <a:ext cx="10515600" cy="4846320"/>
         </p:xfrm>
         <a:graphic>
           <a:graphicData uri="http://schemas.openxmlformats.org/drawingml/2006/table">
@@ -10214,16 +11157,6 @@
                         <a:buChar char="•"/>
                       </a:pPr>
                       <a:endParaRPr lang="en-US"/>
-                    </a:p>
-                    <a:p>
-                      <a:pPr marL="742950" lvl="1" indent="-285750">
-                        <a:buFont typeface="Arial" panose="020B0604020202020204" pitchFamily="34" charset="0"/>
-                        <a:buChar char="•"/>
-                      </a:pPr>
-                      <a:r>
-                        <a:rPr lang="en-US"/>
-                        <a:t>4-5 - /user/maxwin ( maximum member history)</a:t>
-                      </a:r>
                     </a:p>
                     <a:p>
                       <a:pPr marL="742950" lvl="1" indent="-285750">
@@ -10326,7 +11259,7 @@
             <a:pPr algn="ctr"/>
             <a:r>
               <a:rPr lang="en-US" sz="4000" b="1"/>
-              <a:t>4- Build Membership Management APIs (Day 9-16)</a:t>
+              <a:t>4- Build Membership Management APIs (Day 9-20)</a:t>
             </a:r>
             <a:br>
               <a:rPr lang="en-US" sz="3200" b="1"/>
@@ -10345,14 +11278,14 @@
             <p:ph idx="1"/>
             <p:extLst>
               <p:ext uri="{D42A27DB-BD31-4B8C-83A1-F6EECF244321}">
-                <p14:modId xmlns:p14="http://schemas.microsoft.com/office/powerpoint/2010/main" val="1521151001"/>
+                <p14:modId xmlns:p14="http://schemas.microsoft.com/office/powerpoint/2010/main" val="3343037207"/>
               </p:ext>
             </p:extLst>
           </p:nvPr>
         </p:nvGraphicFramePr>
         <p:xfrm>
           <a:off x="838200" y="1590675"/>
-          <a:ext cx="10515600" cy="4572000"/>
+          <a:ext cx="10515600" cy="4846320"/>
         </p:xfrm>
         <a:graphic>
           <a:graphicData uri="http://schemas.openxmlformats.org/drawingml/2006/table">
@@ -10434,9 +11367,72 @@
                       <a:endParaRPr lang="en-US" altLang="ko-KR" baseline="0"/>
                     </a:p>
                     <a:p>
-                      <a:pPr marL="742950" lvl="1" indent="-285750">
-                        <a:buFont typeface="Arial" panose="020B0604020202020204" pitchFamily="34" charset="0"/>
-                        <a:buChar char="•"/>
+                      <a:pPr marL="457200" lvl="1" indent="0">
+                        <a:buFont typeface="Arial" panose="020B0604020202020204" pitchFamily="34" charset="0"/>
+                        <a:buNone/>
+                      </a:pPr>
+                      <a:endParaRPr lang="en-US" altLang="ko-KR" baseline="0"/>
+                    </a:p>
+                    <a:p>
+                      <a:pPr marL="742950" marR="0" lvl="1" indent="-285750" algn="l" defTabSz="914400" rtl="0" eaLnBrk="1" fontAlgn="auto" latinLnBrk="0" hangingPunct="1">
+                        <a:lnSpc>
+                          <a:spcPct val="100000"/>
+                        </a:lnSpc>
+                        <a:spcBef>
+                          <a:spcPts val="0"/>
+                        </a:spcBef>
+                        <a:spcAft>
+                          <a:spcPts val="0"/>
+                        </a:spcAft>
+                        <a:buClrTx/>
+                        <a:buSzTx/>
+                        <a:buFont typeface="Arial" panose="020B0604020202020204" pitchFamily="34" charset="0"/>
+                        <a:buChar char="•"/>
+                        <a:tabLst/>
+                        <a:defRPr/>
+                      </a:pPr>
+                      <a:r>
+                        <a:rPr lang="en-US"/>
+                        <a:t>4-5 - /user/maxwin ( maximum member history)</a:t>
+                      </a:r>
+                    </a:p>
+                    <a:p>
+                      <a:pPr marL="742950" marR="0" lvl="1" indent="-285750" algn="l" defTabSz="914400" rtl="0" eaLnBrk="1" fontAlgn="auto" latinLnBrk="0" hangingPunct="1">
+                        <a:lnSpc>
+                          <a:spcPct val="100000"/>
+                        </a:lnSpc>
+                        <a:spcBef>
+                          <a:spcPts val="0"/>
+                        </a:spcBef>
+                        <a:spcAft>
+                          <a:spcPts val="0"/>
+                        </a:spcAft>
+                        <a:buClrTx/>
+                        <a:buSzTx/>
+                        <a:buFont typeface="Arial" panose="020B0604020202020204" pitchFamily="34" charset="0"/>
+                        <a:buChar char="•"/>
+                        <a:tabLst/>
+                        <a:defRPr/>
+                      </a:pPr>
+                      <a:endParaRPr lang="en-US"/>
+                    </a:p>
+                    <a:p>
+                      <a:pPr marL="742950" marR="0" lvl="1" indent="-285750" algn="l" defTabSz="914400" rtl="0" eaLnBrk="1" fontAlgn="auto" latinLnBrk="0" hangingPunct="1">
+                        <a:lnSpc>
+                          <a:spcPct val="100000"/>
+                        </a:lnSpc>
+                        <a:spcBef>
+                          <a:spcPts val="0"/>
+                        </a:spcBef>
+                        <a:spcAft>
+                          <a:spcPts val="0"/>
+                        </a:spcAft>
+                        <a:buClrTx/>
+                        <a:buSzTx/>
+                        <a:buFont typeface="Arial" panose="020B0604020202020204" pitchFamily="34" charset="0"/>
+                        <a:buChar char="•"/>
+                        <a:tabLst/>
+                        <a:defRPr/>
                       </a:pPr>
                       <a:r>
                         <a:rPr lang="en-US" b="1"/>
@@ -10448,6 +11444,33 @@
                       </a:r>
                     </a:p>
                     <a:p>
+                      <a:pPr marL="742950" marR="0" lvl="1" indent="-285750" algn="l" defTabSz="914400" rtl="0" eaLnBrk="1" fontAlgn="auto" latinLnBrk="0" hangingPunct="1">
+                        <a:lnSpc>
+                          <a:spcPct val="100000"/>
+                        </a:lnSpc>
+                        <a:spcBef>
+                          <a:spcPts val="0"/>
+                        </a:spcBef>
+                        <a:spcAft>
+                          <a:spcPts val="0"/>
+                        </a:spcAft>
+                        <a:buClrTx/>
+                        <a:buSzTx/>
+                        <a:buFont typeface="Arial" panose="020B0604020202020204" pitchFamily="34" charset="0"/>
+                        <a:buChar char="•"/>
+                        <a:tabLst/>
+                        <a:defRPr/>
+                      </a:pPr>
+                      <a:endParaRPr lang="en-US"/>
+                    </a:p>
+                    <a:p>
+                      <a:pPr marL="742950" lvl="1" indent="-285750">
+                        <a:buFont typeface="Arial" panose="020B0604020202020204" pitchFamily="34" charset="0"/>
+                        <a:buChar char="•"/>
+                      </a:pPr>
+                      <a:endParaRPr lang="en-US"/>
+                    </a:p>
+                    <a:p>
                       <a:pPr marL="742950" lvl="1" indent="-285750">
                         <a:buFont typeface="Arial" panose="020B0604020202020204" pitchFamily="34" charset="0"/>
                         <a:buChar char="•"/>
@@ -10491,33 +11514,6 @@
                         <a:buChar char="•"/>
                       </a:pPr>
                       <a:endParaRPr lang="en-US"/>
-                    </a:p>
-                    <a:p>
-                      <a:pPr marL="742950" lvl="1" indent="-285750">
-                        <a:buFont typeface="Arial" panose="020B0604020202020204" pitchFamily="34" charset="0"/>
-                        <a:buChar char="•"/>
-                      </a:pPr>
-                      <a:r>
-                        <a:rPr lang="en-US"/>
-                        <a:t>4-9- /user/lists?keyword=&amp;date_from=2024-12-31&amp;date_to=2024-12-31&amp;page=1 (search user)</a:t>
-                      </a:r>
-                    </a:p>
-                    <a:p>
-                      <a:pPr marL="742950" lvl="1" indent="-285750">
-                        <a:buFont typeface="Arial" panose="020B0604020202020204" pitchFamily="34" charset="0"/>
-                        <a:buChar char="•"/>
-                      </a:pPr>
-                      <a:endParaRPr lang="en-US"/>
-                    </a:p>
-                    <a:p>
-                      <a:pPr marL="742950" lvl="1" indent="-285750">
-                        <a:buFont typeface="Arial" panose="020B0604020202020204" pitchFamily="34" charset="0"/>
-                        <a:buChar char="•"/>
-                      </a:pPr>
-                      <a:r>
-                        <a:rPr lang="en-US"/>
-                        <a:t>4-10 - /user/detail?section=info&amp;user_id=2 (user deatail )</a:t>
-                      </a:r>
                     </a:p>
                     <a:p>
                       <a:pPr marL="742950" lvl="1" indent="-285750">
@@ -10620,7 +11616,7 @@
             <a:pPr algn="ctr"/>
             <a:r>
               <a:rPr lang="en-US" sz="4000" b="1"/>
-              <a:t>5- Build System APIs(Day 17-23)</a:t>
+              <a:t>4- Build Membership Management APIs (Day 9-20)</a:t>
             </a:r>
             <a:br>
               <a:rPr lang="en-US" sz="3200" b="1"/>
@@ -10639,14 +11635,14 @@
             <p:ph idx="1"/>
             <p:extLst>
               <p:ext uri="{D42A27DB-BD31-4B8C-83A1-F6EECF244321}">
-                <p14:modId xmlns:p14="http://schemas.microsoft.com/office/powerpoint/2010/main" val="1872491719"/>
+                <p14:modId xmlns:p14="http://schemas.microsoft.com/office/powerpoint/2010/main" val="3101970217"/>
               </p:ext>
             </p:extLst>
           </p:nvPr>
         </p:nvGraphicFramePr>
         <p:xfrm>
-          <a:off x="838200" y="1276350"/>
-          <a:ext cx="10515600" cy="5120640"/>
+          <a:off x="838200" y="1590675"/>
+          <a:ext cx="10515600" cy="4846320"/>
         </p:xfrm>
         <a:graphic>
           <a:graphicData uri="http://schemas.openxmlformats.org/drawingml/2006/table">
@@ -10655,14 +11651,14 @@
                 <a:tableStyleId>{073A0DAA-6AF3-43AB-8588-CEC1D06C72B9}</a:tableStyleId>
               </a:tblPr>
               <a:tblGrid>
-                <a:gridCol w="6515100">
+                <a:gridCol w="6429375">
                   <a:extLst>
                     <a:ext uri="{9D8B030D-6E8A-4147-A177-3AD203B41FA5}">
                       <a16:colId xmlns:a16="http://schemas.microsoft.com/office/drawing/2014/main" val="436794892"/>
                     </a:ext>
                   </a:extLst>
                 </a:gridCol>
-                <a:gridCol w="4000500">
+                <a:gridCol w="4086225">
                   <a:extLst>
                     <a:ext uri="{9D8B030D-6E8A-4147-A177-3AD203B41FA5}">
                       <a16:colId xmlns:a16="http://schemas.microsoft.com/office/drawing/2014/main" val="2058214037"/>
@@ -10670,7 +11666,7 @@
                   </a:extLst>
                 </a:gridCol>
               </a:tblGrid>
-              <a:tr h="332353">
+              <a:tr h="276225">
                 <a:tc>
                   <a:txBody>
                     <a:bodyPr/>
@@ -10715,29 +11711,92 @@
                   </a:ext>
                 </a:extLst>
               </a:tr>
-              <a:tr h="4569847">
+              <a:tr h="4011659">
                 <a:tc>
                   <a:txBody>
                     <a:bodyPr/>
                     <a:lstStyle/>
                     <a:p>
-                      <a:endParaRPr lang="en-US" b="1"/>
-                    </a:p>
-                    <a:p>
-                      <a:endParaRPr lang="en-US" b="1"/>
-                    </a:p>
-                    <a:p>
-                      <a:endParaRPr lang="en-US" b="1"/>
-                    </a:p>
-                    <a:p>
-                      <a:pPr marL="742950" lvl="1" indent="-285750">
-                        <a:buFont typeface="Arial" panose="020B0604020202020204" pitchFamily="34" charset="0"/>
-                        <a:buChar char="•"/>
+                      <a:pPr marL="457200" lvl="1" indent="0">
+                        <a:buFont typeface="Arial" panose="020B0604020202020204" pitchFamily="34" charset="0"/>
+                        <a:buNone/>
+                      </a:pPr>
+                      <a:endParaRPr lang="en-US" altLang="ko-KR" baseline="0"/>
+                    </a:p>
+                    <a:p>
+                      <a:pPr marL="742950" lvl="1" indent="-285750">
+                        <a:buFont typeface="Arial" panose="020B0604020202020204" pitchFamily="34" charset="0"/>
+                        <a:buChar char="•"/>
+                      </a:pPr>
+                      <a:r>
+                        <a:rPr lang="en-US"/>
+                        <a:t>4-9- /user/lists?keyword=&amp;date_from=2024-12-31&amp;date_to=2024-12-31&amp;page=1 (search user)</a:t>
+                      </a:r>
+                    </a:p>
+                    <a:p>
+                      <a:pPr marL="742950" lvl="1" indent="-285750">
+                        <a:buFont typeface="Arial" panose="020B0604020202020204" pitchFamily="34" charset="0"/>
+                        <a:buChar char="•"/>
+                      </a:pPr>
+                      <a:endParaRPr lang="en-US"/>
+                    </a:p>
+                    <a:p>
+                      <a:pPr marL="742950" lvl="1" indent="-285750">
+                        <a:buFont typeface="Arial" panose="020B0604020202020204" pitchFamily="34" charset="0"/>
+                        <a:buChar char="•"/>
+                      </a:pPr>
+                      <a:r>
+                        <a:rPr lang="en-US"/>
+                        <a:t>4-10 - /user/detail?section=info&amp;user_id=2 (user deatail )</a:t>
+                      </a:r>
+                    </a:p>
+                    <a:p>
+                      <a:pPr marL="742950" lvl="1" indent="-285750">
+                        <a:buFont typeface="Arial" panose="020B0604020202020204" pitchFamily="34" charset="0"/>
+                        <a:buChar char="•"/>
+                      </a:pPr>
+                      <a:endParaRPr lang="en-US"/>
+                    </a:p>
+                    <a:p>
+                      <a:pPr marL="742950" marR="0" lvl="1" indent="-285750" algn="l" defTabSz="914400" rtl="0" eaLnBrk="1" fontAlgn="auto" latinLnBrk="0" hangingPunct="1">
+                        <a:lnSpc>
+                          <a:spcPct val="100000"/>
+                        </a:lnSpc>
+                        <a:spcBef>
+                          <a:spcPts val="0"/>
+                        </a:spcBef>
+                        <a:spcAft>
+                          <a:spcPts val="0"/>
+                        </a:spcAft>
+                        <a:buClrTx/>
+                        <a:buSzTx/>
+                        <a:buFont typeface="Arial" panose="020B0604020202020204" pitchFamily="34" charset="0"/>
+                        <a:buChar char="•"/>
+                        <a:tabLst/>
+                        <a:defRPr/>
                       </a:pPr>
                       <a:r>
                         <a:rPr lang="en-US" b="1"/>
-                        <a:t>5-1- /system/notice (Announcement)</a:t>
-                      </a:r>
+                        <a:t>4-11</a:t>
+                      </a:r>
+                      <a:r>
+                        <a:rPr lang="en-US"/>
+                        <a:t> - /user/detail?section=default&amp;user_id=2 (Recent login history)</a:t>
+                      </a:r>
+                    </a:p>
+                    <a:p>
+                      <a:pPr marL="742950" lvl="1" indent="-285750">
+                        <a:buFont typeface="Arial" panose="020B0604020202020204" pitchFamily="34" charset="0"/>
+                        <a:buChar char="•"/>
+                      </a:pPr>
+                      <a:endParaRPr lang="en-US"/>
+                    </a:p>
+                    <a:p>
+                      <a:pPr marL="742950" lvl="1" indent="-285750">
+                        <a:buFont typeface="Arial" panose="020B0604020202020204" pitchFamily="34" charset="0"/>
+                        <a:buChar char="•"/>
+                      </a:pPr>
+                      <a:endParaRPr lang="en-US"/>
                     </a:p>
                     <a:p>
                       <a:pPr marL="742950" lvl="1" indent="-285750">
@@ -10753,80 +11812,18 @@
                       </a:pPr>
                       <a:r>
                         <a:rPr lang="en-US" b="1"/>
-                        <a:t>5-2-</a:t>
+                        <a:t>4-12- </a:t>
                       </a:r>
                       <a:r>
                         <a:rPr lang="en-US"/>
-                        <a:t> /system/bank (Set up deposit account)</a:t>
-                      </a:r>
-                    </a:p>
-                    <a:p>
-                      <a:pPr marL="742950" lvl="1" indent="-285750">
-                        <a:buFont typeface="Arial" panose="020B0604020202020204" pitchFamily="34" charset="0"/>
-                        <a:buChar char="•"/>
-                      </a:pPr>
-                      <a:endParaRPr lang="en-US"/>
-                    </a:p>
-                    <a:p>
-                      <a:pPr marL="742950" lvl="1" indent="-285750">
-                        <a:buFont typeface="Arial" panose="020B0604020202020204" pitchFamily="34" charset="0"/>
-                        <a:buChar char="•"/>
-                      </a:pPr>
-                      <a:r>
-                        <a:rPr lang="en-US"/>
-                        <a:t>5-3- /system/councel (1:1 inquiry (waiting))</a:t>
-                      </a:r>
-                    </a:p>
-                    <a:p>
-                      <a:pPr marL="742950" lvl="1" indent="-285750">
-                        <a:buFont typeface="Arial" panose="020B0604020202020204" pitchFamily="34" charset="0"/>
-                        <a:buChar char="•"/>
-                      </a:pPr>
-                      <a:endParaRPr lang="en-US"/>
-                    </a:p>
-                    <a:p>
-                      <a:pPr marL="742950" lvl="1" indent="-285750">
-                        <a:buFont typeface="Arial" panose="020B0604020202020204" pitchFamily="34" charset="0"/>
-                        <a:buChar char="•"/>
-                      </a:pPr>
-                      <a:r>
-                        <a:rPr lang="en-US"/>
-                        <a:t>5-4- /system/councel/all (1:1 inquiry (All))</a:t>
-                      </a:r>
-                    </a:p>
-                    <a:p>
-                      <a:pPr marL="742950" lvl="1" indent="-285750">
-                        <a:buFont typeface="Arial" panose="020B0604020202020204" pitchFamily="34" charset="0"/>
-                        <a:buChar char="•"/>
-                      </a:pPr>
-                      <a:endParaRPr lang="en-US"/>
-                    </a:p>
-                    <a:p>
-                      <a:pPr marL="742950" lvl="1" indent="-285750">
-                        <a:buFont typeface="Arial" panose="020B0604020202020204" pitchFamily="34" charset="0"/>
-                        <a:buChar char="•"/>
-                      </a:pPr>
-                      <a:r>
-                        <a:rPr lang="en-US"/>
-                        <a:t>5-5- /system/councel/macro (  1:1 macro management)</a:t>
-                      </a:r>
-                    </a:p>
-                    <a:p>
-                      <a:pPr marL="742950" lvl="1" indent="-285750">
-                        <a:buFont typeface="Arial" panose="020B0604020202020204" pitchFamily="34" charset="0"/>
-                        <a:buChar char="•"/>
-                      </a:pPr>
-                      <a:endParaRPr lang="en-US"/>
-                    </a:p>
-                    <a:p>
-                      <a:pPr marL="742950" lvl="1" indent="-285750">
-                        <a:buFont typeface="Arial" panose="020B0604020202020204" pitchFamily="34" charset="0"/>
-                        <a:buChar char="•"/>
-                      </a:pPr>
-                      <a:endParaRPr lang="en-US"/>
-                    </a:p>
-                    <a:p>
-                      <a:pPr lvl="1"/>
+                        <a:t> /user/detail?section=asset&amp;user_id=1 (Manager money change history)</a:t>
+                      </a:r>
+                    </a:p>
+                    <a:p>
+                      <a:pPr marL="742950" lvl="1" indent="-285750">
+                        <a:buFont typeface="Arial" panose="020B0604020202020204" pitchFamily="34" charset="0"/>
+                        <a:buChar char="•"/>
+                      </a:pPr>
                       <a:endParaRPr lang="en-US"/>
                     </a:p>
                     <a:p>
@@ -10876,7 +11873,7 @@
     </p:spTree>
     <p:extLst>
       <p:ext uri="{BB962C8B-B14F-4D97-AF65-F5344CB8AC3E}">
-        <p14:creationId xmlns:p14="http://schemas.microsoft.com/office/powerpoint/2010/main" val="2066070089"/>
+        <p14:creationId xmlns:p14="http://schemas.microsoft.com/office/powerpoint/2010/main" val="432811422"/>
       </p:ext>
     </p:extLst>
   </p:cSld>
@@ -10923,7 +11920,7 @@
             <a:pPr algn="ctr"/>
             <a:r>
               <a:rPr lang="en-US" sz="4000" b="1"/>
-              <a:t>5- Build System APIs(Day 17-23)</a:t>
+              <a:t>4- Build Membership Management APIs (Day 9-20)</a:t>
             </a:r>
             <a:br>
               <a:rPr lang="en-US" sz="3200" b="1"/>
@@ -10942,14 +11939,14 @@
             <p:ph idx="1"/>
             <p:extLst>
               <p:ext uri="{D42A27DB-BD31-4B8C-83A1-F6EECF244321}">
-                <p14:modId xmlns:p14="http://schemas.microsoft.com/office/powerpoint/2010/main" val="3827885710"/>
+                <p14:modId xmlns:p14="http://schemas.microsoft.com/office/powerpoint/2010/main" val="3961358473"/>
               </p:ext>
             </p:extLst>
           </p:nvPr>
         </p:nvGraphicFramePr>
         <p:xfrm>
-          <a:off x="838200" y="1276350"/>
-          <a:ext cx="10515600" cy="5120640"/>
+          <a:off x="838200" y="1590675"/>
+          <a:ext cx="10515600" cy="4846320"/>
         </p:xfrm>
         <a:graphic>
           <a:graphicData uri="http://schemas.openxmlformats.org/drawingml/2006/table">
@@ -10958,14 +11955,14 @@
                 <a:tableStyleId>{073A0DAA-6AF3-43AB-8588-CEC1D06C72B9}</a:tableStyleId>
               </a:tblPr>
               <a:tblGrid>
-                <a:gridCol w="6838950">
+                <a:gridCol w="6429375">
                   <a:extLst>
                     <a:ext uri="{9D8B030D-6E8A-4147-A177-3AD203B41FA5}">
                       <a16:colId xmlns:a16="http://schemas.microsoft.com/office/drawing/2014/main" val="436794892"/>
                     </a:ext>
                   </a:extLst>
                 </a:gridCol>
-                <a:gridCol w="3676650">
+                <a:gridCol w="4086225">
                   <a:extLst>
                     <a:ext uri="{9D8B030D-6E8A-4147-A177-3AD203B41FA5}">
                       <a16:colId xmlns:a16="http://schemas.microsoft.com/office/drawing/2014/main" val="2058214037"/>
@@ -10973,7 +11970,7 @@
                   </a:extLst>
                 </a:gridCol>
               </a:tblGrid>
-              <a:tr h="336777">
+              <a:tr h="276225">
                 <a:tc>
                   <a:txBody>
                     <a:bodyPr/>
@@ -11018,16 +12015,24 @@
                   </a:ext>
                 </a:extLst>
               </a:tr>
-              <a:tr h="4378098">
+              <a:tr h="4011659">
                 <a:tc>
                   <a:txBody>
                     <a:bodyPr/>
                     <a:lstStyle/>
                     <a:p>
-                      <a:endParaRPr lang="en-US" b="1"/>
-                    </a:p>
-                    <a:p>
-                      <a:endParaRPr lang="en-US" b="1"/>
+                      <a:pPr marL="457200" lvl="1" indent="0">
+                        <a:buFont typeface="Arial" panose="020B0604020202020204" pitchFamily="34" charset="0"/>
+                        <a:buNone/>
+                      </a:pPr>
+                      <a:endParaRPr lang="en-US" altLang="ko-KR" baseline="0"/>
+                    </a:p>
+                    <a:p>
+                      <a:pPr marL="742950" lvl="1" indent="-285750">
+                        <a:buFont typeface="Arial" panose="020B0604020202020204" pitchFamily="34" charset="0"/>
+                        <a:buChar char="•"/>
+                      </a:pPr>
+                      <a:endParaRPr lang="en-US"/>
                     </a:p>
                     <a:p>
                       <a:pPr marL="742950" lvl="1" indent="-285750">
@@ -11036,47 +12041,25 @@
                       </a:pPr>
                       <a:r>
                         <a:rPr lang="en-US"/>
-                        <a:t>5-6- /system/account ( List of bank account changes)</a:t>
-                      </a:r>
-                    </a:p>
-                    <a:p>
-                      <a:pPr marL="742950" lvl="1" indent="-285750">
-                        <a:buFont typeface="Arial" panose="020B0604020202020204" pitchFamily="34" charset="0"/>
-                        <a:buChar char="•"/>
-                      </a:pPr>
-                      <a:endParaRPr lang="en-US"/>
-                    </a:p>
-                    <a:p>
-                      <a:pPr marL="742950" lvl="1" indent="-285750">
-                        <a:buFont typeface="Arial" panose="020B0604020202020204" pitchFamily="34" charset="0"/>
-                        <a:buChar char="•"/>
-                      </a:pPr>
-                      <a:endParaRPr lang="en-US"/>
-                    </a:p>
-                    <a:p>
-                      <a:pPr marL="742950" lvl="1" indent="-285750">
-                        <a:buFont typeface="Arial" panose="020B0604020202020204" pitchFamily="34" charset="0"/>
-                        <a:buChar char="•"/>
-                      </a:pPr>
-                      <a:r>
-                        <a:rPr lang="en-US" b="1"/>
-                        <a:t>5-7-</a:t>
-                      </a:r>
+                        <a:t>4-13-  /user/detail?section=deposit1&amp;user_id=2 (History of recharge)) </a:t>
+                      </a:r>
+                    </a:p>
+                    <a:p>
+                      <a:pPr marL="742950" lvl="1" indent="-285750">
+                        <a:buFont typeface="Arial" panose="020B0604020202020204" pitchFamily="34" charset="0"/>
+                        <a:buChar char="•"/>
+                      </a:pPr>
+                      <a:endParaRPr lang="en-US"/>
+                    </a:p>
+                    <a:p>
+                      <a:pPr marL="742950" lvl="1" indent="-285750">
+                        <a:buFont typeface="Arial" panose="020B0604020202020204" pitchFamily="34" charset="0"/>
+                        <a:buChar char="•"/>
+                      </a:pPr>
                       <a:r>
                         <a:rPr lang="en-US"/>
-                        <a:t> </a:t>
-                      </a:r>
-                      <a:r>
-                        <a:rPr lang="sv-SE"/>
-                        <a:t>/system/ip (IP block list)</a:t>
-                      </a:r>
-                    </a:p>
-                    <a:p>
-                      <a:pPr marL="742950" lvl="1" indent="-285750">
-                        <a:buFont typeface="Arial" panose="020B0604020202020204" pitchFamily="34" charset="0"/>
-                        <a:buChar char="•"/>
-                      </a:pPr>
-                      <a:endParaRPr lang="en-US"/>
+                        <a:t>4-14- /user/detail?section=withdraw1&amp;user_id=2(History of currency exchange)</a:t>
+                      </a:r>
                     </a:p>
                     <a:p>
                       <a:pPr marL="742950" lvl="1" indent="-285750">
@@ -11092,15 +12075,8 @@
                       </a:pPr>
                       <a:r>
                         <a:rPr lang="en-US"/>
-                        <a:t>5-8- /system/block (Blocked members and partners)</a:t>
-                      </a:r>
-                    </a:p>
-                    <a:p>
-                      <a:pPr marL="742950" lvl="1" indent="-285750">
-                        <a:buFont typeface="Arial" panose="020B0604020202020204" pitchFamily="34" charset="0"/>
-                        <a:buChar char="•"/>
-                      </a:pPr>
-                      <a:endParaRPr lang="en-US"/>
+                        <a:t>4-15 - /user/detail?section=deposit10&amp;user_id=2(Details of payment received)</a:t>
+                      </a:r>
                     </a:p>
                     <a:p>
                       <a:pPr marL="742950" lvl="1" indent="-285750">
@@ -11116,36 +12092,15 @@
                       </a:pPr>
                       <a:r>
                         <a:rPr lang="en-US"/>
-                        <a:t>5-9- </a:t>
-                      </a:r>
-                      <a:r>
-                        <a:rPr lang="en-US" b="1"/>
-                        <a:t>/system/councel/all (1:1 inquiry (All))</a:t>
-                      </a:r>
-                    </a:p>
-                    <a:p>
-                      <a:pPr marL="742950" lvl="1" indent="-285750">
-                        <a:buFont typeface="Arial" panose="020B0604020202020204" pitchFamily="34" charset="0"/>
-                        <a:buChar char="•"/>
-                      </a:pPr>
-                      <a:endParaRPr lang="en-US"/>
-                    </a:p>
-                    <a:p>
-                      <a:pPr marL="742950" lvl="1" indent="-285750">
-                        <a:buFont typeface="Arial" panose="020B0604020202020204" pitchFamily="34" charset="0"/>
-                        <a:buChar char="•"/>
-                      </a:pPr>
-                      <a:endParaRPr lang="en-US"/>
-                    </a:p>
-                    <a:p>
-                      <a:pPr marL="742950" lvl="1" indent="-285750">
-                        <a:buFont typeface="Arial" panose="020B0604020202020204" pitchFamily="34" charset="0"/>
-                        <a:buChar char="•"/>
-                      </a:pPr>
-                      <a:r>
-                        <a:rPr lang="en-US"/>
-                        <a:t>5-10- /system/limit_provider (game company restrictions)</a:t>
-                      </a:r>
+                        <a:t>4-16- /user/detail?section=withdraw10&amp;user_id=2 (Details of egg recovery)</a:t>
+                      </a:r>
+                    </a:p>
+                    <a:p>
+                      <a:pPr marL="742950" lvl="1" indent="-285750">
+                        <a:buFont typeface="Arial" panose="020B0604020202020204" pitchFamily="34" charset="0"/>
+                        <a:buChar char="•"/>
+                      </a:pPr>
+                      <a:endParaRPr lang="en-US"/>
                     </a:p>
                     <a:p>
                       <a:pPr marL="0" indent="0" latinLnBrk="1">
@@ -11194,7 +12149,7 @@
     </p:spTree>
     <p:extLst>
       <p:ext uri="{BB962C8B-B14F-4D97-AF65-F5344CB8AC3E}">
-        <p14:creationId xmlns:p14="http://schemas.microsoft.com/office/powerpoint/2010/main" val="1790297973"/>
+        <p14:creationId xmlns:p14="http://schemas.microsoft.com/office/powerpoint/2010/main" val="3948167048"/>
       </p:ext>
     </p:extLst>
   </p:cSld>

</xml_diff>